<commit_message>
Add new rcpp Weibull distribution suitable for NMA
</commit_message>
<xml_diff>
--- a/vignettes/figures.pptx
+++ b/vignettes/figures.pptx
@@ -114,7 +114,7 @@
   </p:defaultTextStyle>
   <p:extLst>
     <p:ext uri="{EFAFB233-063F-42B5-8137-9DF3F51BA10A}">
-      <p15:sldGuideLst xmlns="" xmlns:p15="http://schemas.microsoft.com/office/powerpoint/2012/main">
+      <p15:sldGuideLst xmlns:p15="http://schemas.microsoft.com/office/powerpoint/2012/main" xmlns="">
         <p15:guide id="1" orient="horz" pos="3146">
           <p15:clr>
             <a:srgbClr val="A4A3A4"/>
@@ -252,7 +252,7 @@
               <a:rPr lang="en-US" smtClean="0">
                 <a:latin typeface="Helvetica"/>
               </a:rPr>
-              <a:t>6/2/18</a:t>
+              <a:t>6/5/18</a:t>
             </a:fld>
             <a:endParaRPr lang="en-US" dirty="0">
               <a:latin typeface="Helvetica"/>
@@ -431,7 +431,7 @@
             <a:fld id="{9BBF7E23-A315-CF44-AB07-C8184967DF75}" type="datetimeFigureOut">
               <a:rPr lang="en-US" smtClean="0"/>
               <a:pPr/>
-              <a:t>6/2/18</a:t>
+              <a:t>6/5/18</a:t>
             </a:fld>
             <a:endParaRPr lang="en-US" dirty="0"/>
           </a:p>
@@ -2810,7 +2810,7 @@
           <p:cNvPr id="10" name="Elbow Connector 9">
             <a:extLst>
               <a:ext uri="{FF2B5EF4-FFF2-40B4-BE49-F238E27FC236}">
-                <a16:creationId xmlns="" xmlns:a16="http://schemas.microsoft.com/office/drawing/2014/main" id="{78955D2A-0645-9E4F-A488-02ABF000BB63}"/>
+                <a16:creationId xmlns:a16="http://schemas.microsoft.com/office/drawing/2014/main" xmlns="" id="{78955D2A-0645-9E4F-A488-02ABF000BB63}"/>
               </a:ext>
             </a:extLst>
           </p:cNvPr>
@@ -2860,7 +2860,7 @@
           <p:cNvPr id="11" name="Elbow Connector 10">
             <a:extLst>
               <a:ext uri="{FF2B5EF4-FFF2-40B4-BE49-F238E27FC236}">
-                <a16:creationId xmlns:a16="http://schemas.microsoft.com/office/drawing/2014/main" xmlns="" xmlns:lc="http://schemas.openxmlformats.org/drawingml/2006/lockedCanvas" id="{78955D2A-0645-9E4F-A488-02ABF000BB63}"/>
+                <a16:creationId xmlns:lc="http://schemas.openxmlformats.org/drawingml/2006/lockedCanvas" xmlns="" xmlns:a16="http://schemas.microsoft.com/office/drawing/2014/main" id="{78955D2A-0645-9E4F-A488-02ABF000BB63}"/>
               </a:ext>
             </a:extLst>
           </p:cNvPr>
@@ -2910,7 +2910,7 @@
           <p:cNvPr id="12" name="Elbow Connector 11">
             <a:extLst>
               <a:ext uri="{FF2B5EF4-FFF2-40B4-BE49-F238E27FC236}">
-                <a16:creationId xmlns:a16="http://schemas.microsoft.com/office/drawing/2014/main" xmlns="" xmlns:lc="http://schemas.openxmlformats.org/drawingml/2006/lockedCanvas" id="{6FF03218-89BD-5E44-88F2-2ED4DDD4F35B}"/>
+                <a16:creationId xmlns:lc="http://schemas.openxmlformats.org/drawingml/2006/lockedCanvas" xmlns="" xmlns:a16="http://schemas.microsoft.com/office/drawing/2014/main" id="{6FF03218-89BD-5E44-88F2-2ED4DDD4F35B}"/>
               </a:ext>
             </a:extLst>
           </p:cNvPr>
@@ -2997,7 +2997,7 @@
           <p:cNvPr id="10" name="Elbow Connector 9">
             <a:extLst>
               <a:ext uri="{FF2B5EF4-FFF2-40B4-BE49-F238E27FC236}">
-                <a16:creationId xmlns="" xmlns:a16="http://schemas.microsoft.com/office/drawing/2014/main" id="{78955D2A-0645-9E4F-A488-02ABF000BB63}"/>
+                <a16:creationId xmlns:a16="http://schemas.microsoft.com/office/drawing/2014/main" xmlns="" id="{78955D2A-0645-9E4F-A488-02ABF000BB63}"/>
               </a:ext>
             </a:extLst>
           </p:cNvPr>
@@ -5750,7 +5750,7 @@
           <p:cNvPr id="10" name="Elbow Connector 9">
             <a:extLst>
               <a:ext uri="{FF2B5EF4-FFF2-40B4-BE49-F238E27FC236}">
-                <a16:creationId xmlns="" xmlns:a16="http://schemas.microsoft.com/office/drawing/2014/main" id="{78955D2A-0645-9E4F-A488-02ABF000BB63}"/>
+                <a16:creationId xmlns:a16="http://schemas.microsoft.com/office/drawing/2014/main" xmlns="" id="{78955D2A-0645-9E4F-A488-02ABF000BB63}"/>
               </a:ext>
             </a:extLst>
           </p:cNvPr>
@@ -5804,7 +5804,7 @@
           <p:nvPr>
             <p:extLst>
               <p:ext uri="{D42A27DB-BD31-4B8C-83A1-F6EECF244321}">
-                <p14:modId xmlns:p14="http://schemas.microsoft.com/office/powerpoint/2010/main" val="733567697"/>
+                <p14:modId xmlns:p14="http://schemas.microsoft.com/office/powerpoint/2010/main" val="794282200"/>
               </p:ext>
             </p:extLst>
           </p:nvPr>
@@ -6055,7 +6055,7 @@
           <p:nvPr>
             <p:extLst>
               <p:ext uri="{D42A27DB-BD31-4B8C-83A1-F6EECF244321}">
-                <p14:modId xmlns:p14="http://schemas.microsoft.com/office/powerpoint/2010/main" val="63022522"/>
+                <p14:modId xmlns:p14="http://schemas.microsoft.com/office/powerpoint/2010/main" val="4214519293"/>
               </p:ext>
             </p:extLst>
           </p:nvPr>
@@ -6263,7 +6263,7 @@
                       <a:pPr algn="ctr"/>
                       <a:r>
                         <a:rPr lang="en-US" sz="1200" dirty="0" smtClean="0"/>
-                        <a:t>female</a:t>
+                        <a:t>Female</a:t>
                       </a:r>
                       <a:endParaRPr lang="en-US" sz="1200" dirty="0"/>
                     </a:p>
@@ -6361,7 +6361,7 @@
                       <a:pPr algn="ctr"/>
                       <a:r>
                         <a:rPr lang="en-US" sz="1200" dirty="0" smtClean="0"/>
-                        <a:t>male</a:t>
+                        <a:t>Male</a:t>
                       </a:r>
                       <a:endParaRPr lang="en-US" sz="1200" dirty="0"/>
                     </a:p>
@@ -6399,7 +6399,7 @@
           <p:nvPr>
             <p:extLst>
               <p:ext uri="{D42A27DB-BD31-4B8C-83A1-F6EECF244321}">
-                <p14:modId xmlns:p14="http://schemas.microsoft.com/office/powerpoint/2010/main" val="1280297239"/>
+                <p14:modId xmlns:p14="http://schemas.microsoft.com/office/powerpoint/2010/main" val="3604477968"/>
               </p:ext>
             </p:extLst>
           </p:nvPr>
@@ -7887,7 +7887,7 @@
           <p:cNvPr id="81" name="Elbow Connector 80">
             <a:extLst>
               <a:ext uri="{FF2B5EF4-FFF2-40B4-BE49-F238E27FC236}">
-                <a16:creationId xmlns:a16="http://schemas.microsoft.com/office/drawing/2014/main" xmlns="" xmlns:lc="http://schemas.openxmlformats.org/drawingml/2006/lockedCanvas" id="{78955D2A-0645-9E4F-A488-02ABF000BB63}"/>
+                <a16:creationId xmlns:lc="http://schemas.openxmlformats.org/drawingml/2006/lockedCanvas" xmlns="" xmlns:a16="http://schemas.microsoft.com/office/drawing/2014/main" id="{78955D2A-0645-9E4F-A488-02ABF000BB63}"/>
               </a:ext>
             </a:extLst>
           </p:cNvPr>
@@ -7937,7 +7937,7 @@
           <p:cNvPr id="88" name="Elbow Connector 87">
             <a:extLst>
               <a:ext uri="{FF2B5EF4-FFF2-40B4-BE49-F238E27FC236}">
-                <a16:creationId xmlns:a16="http://schemas.microsoft.com/office/drawing/2014/main" xmlns="" xmlns:lc="http://schemas.openxmlformats.org/drawingml/2006/lockedCanvas" id="{6FF03218-89BD-5E44-88F2-2ED4DDD4F35B}"/>
+                <a16:creationId xmlns:lc="http://schemas.openxmlformats.org/drawingml/2006/lockedCanvas" xmlns="" xmlns:a16="http://schemas.microsoft.com/office/drawing/2014/main" id="{6FF03218-89BD-5E44-88F2-2ED4DDD4F35B}"/>
               </a:ext>
             </a:extLst>
           </p:cNvPr>
@@ -7991,7 +7991,7 @@
           <p:nvPr>
             <p:extLst>
               <p:ext uri="{D42A27DB-BD31-4B8C-83A1-F6EECF244321}">
-                <p14:modId xmlns:p14="http://schemas.microsoft.com/office/powerpoint/2010/main" val="341123250"/>
+                <p14:modId xmlns:p14="http://schemas.microsoft.com/office/powerpoint/2010/main" val="2397990636"/>
               </p:ext>
             </p:extLst>
           </p:nvPr>
@@ -8272,7 +8272,7 @@
           <p:nvPr>
             <p:extLst>
               <p:ext uri="{D42A27DB-BD31-4B8C-83A1-F6EECF244321}">
-                <p14:modId xmlns:p14="http://schemas.microsoft.com/office/powerpoint/2010/main" val="1240802329"/>
+                <p14:modId xmlns:p14="http://schemas.microsoft.com/office/powerpoint/2010/main" val="880259246"/>
               </p:ext>
             </p:extLst>
           </p:nvPr>
@@ -9622,7 +9622,7 @@
           <p:nvPr>
             <p:extLst>
               <p:ext uri="{D42A27DB-BD31-4B8C-83A1-F6EECF244321}">
-                <p14:modId xmlns:p14="http://schemas.microsoft.com/office/powerpoint/2010/main" val="3716820231"/>
+                <p14:modId xmlns:p14="http://schemas.microsoft.com/office/powerpoint/2010/main" val="1359519268"/>
               </p:ext>
             </p:extLst>
           </p:nvPr>
@@ -10934,7 +10934,7 @@
           <p:cNvPr id="57" name="Elbow Connector 56">
             <a:extLst>
               <a:ext uri="{FF2B5EF4-FFF2-40B4-BE49-F238E27FC236}">
-                <a16:creationId xmlns:a16="http://schemas.microsoft.com/office/drawing/2014/main" xmlns="" xmlns:lc="http://schemas.openxmlformats.org/drawingml/2006/lockedCanvas" id="{6FF03218-89BD-5E44-88F2-2ED4DDD4F35B}"/>
+                <a16:creationId xmlns:lc="http://schemas.openxmlformats.org/drawingml/2006/lockedCanvas" xmlns="" xmlns:a16="http://schemas.microsoft.com/office/drawing/2014/main" id="{6FF03218-89BD-5E44-88F2-2ED4DDD4F35B}"/>
               </a:ext>
             </a:extLst>
           </p:cNvPr>
@@ -10984,7 +10984,7 @@
           <p:cNvPr id="61" name="Elbow Connector 60">
             <a:extLst>
               <a:ext uri="{FF2B5EF4-FFF2-40B4-BE49-F238E27FC236}">
-                <a16:creationId xmlns:a16="http://schemas.microsoft.com/office/drawing/2014/main" xmlns="" xmlns:lc="http://schemas.openxmlformats.org/drawingml/2006/lockedCanvas" id="{78955D2A-0645-9E4F-A488-02ABF000BB63}"/>
+                <a16:creationId xmlns:lc="http://schemas.openxmlformats.org/drawingml/2006/lockedCanvas" xmlns="" xmlns:a16="http://schemas.microsoft.com/office/drawing/2014/main" id="{78955D2A-0645-9E4F-A488-02ABF000BB63}"/>
               </a:ext>
             </a:extLst>
           </p:cNvPr>

</xml_diff>

<commit_message>
stateval_tbl now supports pre-sampled values
</commit_message>
<xml_diff>
--- a/vignettes/figures.pptx
+++ b/vignettes/figures.pptx
@@ -5,14 +5,15 @@
     <p:sldMasterId id="2147483648" r:id="rId1"/>
   </p:sldMasterIdLst>
   <p:notesMasterIdLst>
-    <p:notesMasterId r:id="rId4"/>
+    <p:notesMasterId r:id="rId5"/>
   </p:notesMasterIdLst>
   <p:handoutMasterIdLst>
-    <p:handoutMasterId r:id="rId5"/>
+    <p:handoutMasterId r:id="rId6"/>
   </p:handoutMasterIdLst>
   <p:sldIdLst>
     <p:sldId id="305" r:id="rId2"/>
     <p:sldId id="307" r:id="rId3"/>
+    <p:sldId id="308" r:id="rId4"/>
   </p:sldIdLst>
   <p:sldSz cx="11887200" cy="8229600"/>
   <p:notesSz cx="6858000" cy="9144000"/>
@@ -113,7 +114,7 @@
   </p:defaultTextStyle>
   <p:extLst>
     <p:ext uri="{EFAFB233-063F-42B5-8137-9DF3F51BA10A}">
-      <p15:sldGuideLst xmlns="" xmlns:p15="http://schemas.microsoft.com/office/powerpoint/2012/main">
+      <p15:sldGuideLst xmlns:p15="http://schemas.microsoft.com/office/powerpoint/2012/main" xmlns="">
         <p15:guide id="1" orient="horz" pos="3146">
           <p15:clr>
             <a:srgbClr val="A4A3A4"/>
@@ -251,7 +252,7 @@
               <a:rPr lang="en-US" smtClean="0">
                 <a:latin typeface="Helvetica"/>
               </a:rPr>
-              <a:t>9/22/18</a:t>
+              <a:t>10/19/18</a:t>
             </a:fld>
             <a:endParaRPr lang="en-US" dirty="0">
               <a:latin typeface="Helvetica"/>
@@ -430,7 +431,7 @@
             <a:fld id="{9BBF7E23-A315-CF44-AB07-C8184967DF75}" type="datetimeFigureOut">
               <a:rPr lang="en-US" smtClean="0"/>
               <a:pPr/>
-              <a:t>9/22/18</a:t>
+              <a:t>10/19/18</a:t>
             </a:fld>
             <a:endParaRPr lang="en-US" dirty="0"/>
           </a:p>
@@ -2351,7 +2352,7 @@
           <p:cNvPr id="10" name="Elbow Connector 9">
             <a:extLst>
               <a:ext uri="{FF2B5EF4-FFF2-40B4-BE49-F238E27FC236}">
-                <a16:creationId xmlns="" xmlns:a16="http://schemas.microsoft.com/office/drawing/2014/main" id="{78955D2A-0645-9E4F-A488-02ABF000BB63}"/>
+                <a16:creationId xmlns:a16="http://schemas.microsoft.com/office/drawing/2014/main" xmlns="" id="{78955D2A-0645-9E4F-A488-02ABF000BB63}"/>
               </a:ext>
             </a:extLst>
           </p:cNvPr>
@@ -2468,11 +2469,6 @@
                 </a:rPr>
                 <a:t>)</a:t>
               </a:r>
-              <a:endParaRPr lang="en-US" sz="1600" b="1" dirty="0" smtClean="0">
-                <a:solidFill>
-                  <a:srgbClr val="FFFFFF"/>
-                </a:solidFill>
-              </a:endParaRPr>
             </a:p>
           </p:txBody>
         </p:sp>
@@ -2863,7 +2859,7 @@
           <p:cNvPr id="10" name="Elbow Connector 9">
             <a:extLst>
               <a:ext uri="{FF2B5EF4-FFF2-40B4-BE49-F238E27FC236}">
-                <a16:creationId xmlns="" xmlns:a16="http://schemas.microsoft.com/office/drawing/2014/main" id="{78955D2A-0645-9E4F-A488-02ABF000BB63}"/>
+                <a16:creationId xmlns:a16="http://schemas.microsoft.com/office/drawing/2014/main" xmlns="" id="{78955D2A-0645-9E4F-A488-02ABF000BB63}"/>
               </a:ext>
             </a:extLst>
           </p:cNvPr>
@@ -3141,9 +3137,6 @@
                         </a:rPr>
                         <a:t>QALYs</a:t>
                       </a:r>
-                      <a:endParaRPr lang="en-US" sz="1000" kern="1200" dirty="0" smtClean="0">
-                        <a:effectLst/>
-                      </a:endParaRPr>
                     </a:p>
                   </a:txBody>
                   <a:tcPr marL="118872" marR="118872" marT="73152" marB="73152"/>
@@ -3234,9 +3227,6 @@
                         </a:rPr>
                         <a:t>Patients</a:t>
                       </a:r>
-                      <a:endParaRPr lang="en-US" sz="1000" kern="1200" dirty="0" smtClean="0">
-                        <a:effectLst/>
-                      </a:endParaRPr>
                     </a:p>
                     <a:p>
                       <a:pPr marL="171450" indent="-171450">
@@ -3249,9 +3239,6 @@
                         </a:rPr>
                         <a:t>Health states</a:t>
                       </a:r>
-                      <a:endParaRPr lang="en-US" sz="1000" kern="1200" dirty="0" smtClean="0">
-                        <a:effectLst/>
-                      </a:endParaRPr>
                     </a:p>
                   </a:txBody>
                   <a:tcPr marL="118872" marR="118872" marT="73152" marB="73152"/>
@@ -3506,11 +3493,6 @@
                 </a:rPr>
                 <a:t>2. Economic model</a:t>
               </a:r>
-              <a:endParaRPr lang="en-US" sz="1600" b="1" dirty="0" smtClean="0">
-                <a:solidFill>
-                  <a:schemeClr val="tx1"/>
-                </a:solidFill>
-              </a:endParaRPr>
             </a:p>
           </p:txBody>
         </p:sp>
@@ -3548,11 +3530,6 @@
                 </a:rPr>
                 <a:t>. Statistical model(s)</a:t>
               </a:r>
-              <a:endParaRPr lang="en-US" sz="1600" b="1" dirty="0" smtClean="0">
-                <a:solidFill>
-                  <a:schemeClr val="tx1"/>
-                </a:solidFill>
-              </a:endParaRPr>
             </a:p>
           </p:txBody>
         </p:sp>
@@ -3775,11 +3752,6 @@
                 </a:rPr>
                 <a:t>3. Decision analysis</a:t>
               </a:r>
-              <a:endParaRPr lang="en-US" sz="1600" b="1" dirty="0" smtClean="0">
-                <a:solidFill>
-                  <a:schemeClr val="tx1"/>
-                </a:solidFill>
-              </a:endParaRPr>
             </a:p>
           </p:txBody>
         </p:sp>
@@ -3928,6 +3900,1187 @@
     <p:extLst>
       <p:ext uri="{BB962C8B-B14F-4D97-AF65-F5344CB8AC3E}">
         <p14:creationId xmlns:p14="http://schemas.microsoft.com/office/powerpoint/2010/main" val="2133624557"/>
+      </p:ext>
+    </p:extLst>
+  </p:cSld>
+  <p:clrMapOvr>
+    <a:masterClrMapping/>
+  </p:clrMapOvr>
+  <p:timing>
+    <p:tnLst>
+      <p:par>
+        <p:cTn xmlns:p14="http://schemas.microsoft.com/office/powerpoint/2010/main" id="1" dur="indefinite" restart="never" nodeType="tmRoot"/>
+      </p:par>
+    </p:tnLst>
+  </p:timing>
+</p:sld>
+</file>
+
+<file path=ppt/slides/slide3.xml><?xml version="1.0" encoding="utf-8"?>
+<p:sld xmlns:a="http://schemas.openxmlformats.org/drawingml/2006/main" xmlns:r="http://schemas.openxmlformats.org/officeDocument/2006/relationships" xmlns:p="http://schemas.openxmlformats.org/presentationml/2006/main">
+  <p:cSld>
+    <p:spTree>
+      <p:nvGrpSpPr>
+        <p:cNvPr id="1" name=""/>
+        <p:cNvGrpSpPr/>
+        <p:nvPr/>
+      </p:nvGrpSpPr>
+      <p:grpSpPr>
+        <a:xfrm>
+          <a:off x="0" y="0"/>
+          <a:ext cx="0" cy="0"/>
+          <a:chOff x="0" y="0"/>
+          <a:chExt cx="0" cy="0"/>
+        </a:xfrm>
+      </p:grpSpPr>
+      <p:cxnSp>
+        <p:nvCxnSpPr>
+          <p:cNvPr id="10" name="Elbow Connector 9">
+            <a:extLst>
+              <a:ext uri="{FF2B5EF4-FFF2-40B4-BE49-F238E27FC236}">
+                <a16:creationId xmlns:a16="http://schemas.microsoft.com/office/drawing/2014/main" xmlns="" id="{78955D2A-0645-9E4F-A488-02ABF000BB63}"/>
+              </a:ext>
+            </a:extLst>
+          </p:cNvPr>
+          <p:cNvCxnSpPr>
+            <a:cxnSpLocks/>
+          </p:cNvCxnSpPr>
+          <p:nvPr/>
+        </p:nvCxnSpPr>
+        <p:spPr>
+          <a:xfrm>
+            <a:off x="1994514" y="26182296"/>
+            <a:ext cx="712362" cy="1023780"/>
+          </a:xfrm>
+          <a:prstGeom prst="bentConnector3">
+            <a:avLst>
+              <a:gd name="adj1" fmla="val 50000"/>
+            </a:avLst>
+          </a:prstGeom>
+          <a:ln w="22225" cap="flat" cmpd="sng" algn="ctr">
+            <a:solidFill>
+              <a:schemeClr val="tx1"/>
+            </a:solidFill>
+            <a:prstDash val="solid"/>
+            <a:round/>
+            <a:headEnd type="none" w="med" len="med"/>
+            <a:tailEnd type="arrow"/>
+          </a:ln>
+          <a:effectLst/>
+        </p:spPr>
+        <p:style>
+          <a:lnRef idx="2">
+            <a:schemeClr val="accent1"/>
+          </a:lnRef>
+          <a:fillRef idx="0">
+            <a:schemeClr val="accent1"/>
+          </a:fillRef>
+          <a:effectRef idx="1">
+            <a:schemeClr val="accent1"/>
+          </a:effectRef>
+          <a:fontRef idx="minor">
+            <a:schemeClr val="tx1"/>
+          </a:fontRef>
+        </p:style>
+      </p:cxnSp>
+      <p:graphicFrame>
+        <p:nvGraphicFramePr>
+          <p:cNvPr id="47" name="Table 46"/>
+          <p:cNvGraphicFramePr>
+            <a:graphicFrameLocks noGrp="1"/>
+          </p:cNvGraphicFramePr>
+          <p:nvPr>
+            <p:extLst>
+              <p:ext uri="{D42A27DB-BD31-4B8C-83A1-F6EECF244321}">
+                <p14:modId xmlns:p14="http://schemas.microsoft.com/office/powerpoint/2010/main" val="455077554"/>
+              </p:ext>
+            </p:extLst>
+          </p:nvPr>
+        </p:nvGraphicFramePr>
+        <p:xfrm>
+          <a:off x="247772" y="5756840"/>
+          <a:ext cx="1591056" cy="902208"/>
+        </p:xfrm>
+        <a:graphic>
+          <a:graphicData uri="http://schemas.openxmlformats.org/drawingml/2006/table">
+            <a:tbl>
+              <a:tblPr firstRow="1" bandRow="1">
+                <a:tableStyleId>{72833802-FEF1-4C79-8D5D-14CF1EAF98D9}</a:tableStyleId>
+              </a:tblPr>
+              <a:tblGrid>
+                <a:gridCol w="1591056"/>
+              </a:tblGrid>
+              <a:tr h="265429">
+                <a:tc>
+                  <a:txBody>
+                    <a:bodyPr/>
+                    <a:lstStyle/>
+                    <a:p>
+                      <a:pPr algn="ctr"/>
+                      <a:r>
+                        <a:rPr lang="en-US" sz="1000" dirty="0" smtClean="0"/>
+                        <a:t>Input data</a:t>
+                      </a:r>
+                      <a:endParaRPr lang="en-US" sz="1000" dirty="0"/>
+                    </a:p>
+                  </a:txBody>
+                  <a:tcPr marL="118872" marR="118872" marT="73152" marB="73152" anchor="ctr"/>
+                </a:tc>
+              </a:tr>
+              <a:tr h="567167">
+                <a:tc>
+                  <a:txBody>
+                    <a:bodyPr/>
+                    <a:lstStyle/>
+                    <a:p>
+                      <a:pPr marL="171450" indent="-171450">
+                        <a:buFont typeface="Arial"/>
+                        <a:buChar char="•"/>
+                      </a:pPr>
+                      <a:r>
+                        <a:rPr lang="en-US" sz="1000" kern="1200" dirty="0" smtClean="0">
+                          <a:effectLst/>
+                        </a:rPr>
+                        <a:t>Treatment</a:t>
+                      </a:r>
+                      <a:r>
+                        <a:rPr lang="en-US" sz="1000" kern="1200" baseline="0" dirty="0" smtClean="0">
+                          <a:effectLst/>
+                        </a:rPr>
+                        <a:t> strategies</a:t>
+                      </a:r>
+                      <a:endParaRPr lang="en-US" sz="1000" kern="1200" dirty="0" smtClean="0">
+                        <a:effectLst/>
+                      </a:endParaRPr>
+                    </a:p>
+                    <a:p>
+                      <a:pPr marL="171450" indent="-171450">
+                        <a:buFont typeface="Arial"/>
+                        <a:buChar char="•"/>
+                      </a:pPr>
+                      <a:r>
+                        <a:rPr lang="en-US" sz="1000" kern="1200" dirty="0" smtClean="0">
+                          <a:effectLst/>
+                        </a:rPr>
+                        <a:t>Patients</a:t>
+                      </a:r>
+                    </a:p>
+                    <a:p>
+                      <a:pPr marL="171450" indent="-171450">
+                        <a:buFont typeface="Arial"/>
+                        <a:buChar char="•"/>
+                      </a:pPr>
+                      <a:r>
+                        <a:rPr lang="en-US" sz="1000" kern="1200" dirty="0" smtClean="0">
+                          <a:effectLst/>
+                        </a:rPr>
+                        <a:t>Health </a:t>
+                      </a:r>
+                      <a:r>
+                        <a:rPr lang="en-US" sz="1000" kern="1200" dirty="0" smtClean="0">
+                          <a:effectLst/>
+                        </a:rPr>
+                        <a:t>states</a:t>
+                      </a:r>
+                      <a:endParaRPr lang="en-US" sz="1000" kern="1200" dirty="0" smtClean="0">
+                        <a:effectLst/>
+                      </a:endParaRPr>
+                    </a:p>
+                  </a:txBody>
+                  <a:tcPr marL="118872" marR="118872" marT="73152" marB="73152"/>
+                </a:tc>
+              </a:tr>
+            </a:tbl>
+          </a:graphicData>
+        </a:graphic>
+      </p:graphicFrame>
+      <p:cxnSp>
+        <p:nvCxnSpPr>
+          <p:cNvPr id="99" name="Straight Arrow Connector 98"/>
+          <p:cNvCxnSpPr>
+            <a:stCxn id="127" idx="2"/>
+            <a:endCxn id="46" idx="0"/>
+          </p:cNvCxnSpPr>
+          <p:nvPr/>
+        </p:nvCxnSpPr>
+        <p:spPr>
+          <a:xfrm>
+            <a:off x="3471426" y="4354342"/>
+            <a:ext cx="2826" cy="366856"/>
+          </a:xfrm>
+          <a:prstGeom prst="straightConnector1">
+            <a:avLst/>
+          </a:prstGeom>
+          <a:ln w="25400" cap="flat" cmpd="sng" algn="ctr">
+            <a:solidFill>
+              <a:schemeClr val="tx1"/>
+            </a:solidFill>
+            <a:prstDash val="solid"/>
+            <a:round/>
+            <a:headEnd type="none" w="med" len="med"/>
+            <a:tailEnd type="arrow"/>
+          </a:ln>
+          <a:effectLst/>
+        </p:spPr>
+        <p:style>
+          <a:lnRef idx="2">
+            <a:schemeClr val="accent1"/>
+          </a:lnRef>
+          <a:fillRef idx="0">
+            <a:schemeClr val="accent1"/>
+          </a:fillRef>
+          <a:effectRef idx="1">
+            <a:schemeClr val="accent1"/>
+          </a:effectRef>
+          <a:fontRef idx="minor">
+            <a:schemeClr val="tx1"/>
+          </a:fontRef>
+        </p:style>
+      </p:cxnSp>
+      <p:sp>
+        <p:nvSpPr>
+          <p:cNvPr id="21" name="TextBox 20"/>
+          <p:cNvSpPr txBox="1"/>
+          <p:nvPr/>
+        </p:nvSpPr>
+        <p:spPr>
+          <a:xfrm>
+            <a:off x="413868" y="2720773"/>
+            <a:ext cx="1361360" cy="312854"/>
+          </a:xfrm>
+          <a:prstGeom prst="rect">
+            <a:avLst/>
+          </a:prstGeom>
+          <a:ln/>
+        </p:spPr>
+        <p:style>
+          <a:lnRef idx="2">
+            <a:schemeClr val="accent2"/>
+          </a:lnRef>
+          <a:fillRef idx="1">
+            <a:schemeClr val="lt1"/>
+          </a:fillRef>
+          <a:effectRef idx="0">
+            <a:schemeClr val="accent2"/>
+          </a:effectRef>
+          <a:fontRef idx="minor">
+            <a:schemeClr val="dk1"/>
+          </a:fontRef>
+        </p:style>
+        <p:txBody>
+          <a:bodyPr wrap="none" lIns="0" tIns="0" rIns="0" bIns="0" rtlCol="0" anchor="ctr" anchorCtr="1">
+            <a:noAutofit/>
+          </a:bodyPr>
+          <a:lstStyle/>
+          <a:p>
+            <a:pPr algn="ctr"/>
+            <a:r>
+              <a:rPr lang="en-US" sz="1000" b="1" dirty="0" smtClean="0">
+                <a:solidFill>
+                  <a:schemeClr val="accent2"/>
+                </a:solidFill>
+              </a:rPr>
+              <a:t>Estimation </a:t>
+            </a:r>
+            <a:r>
+              <a:rPr lang="en-US" sz="1000" b="1" dirty="0" smtClean="0">
+                <a:solidFill>
+                  <a:schemeClr val="accent2"/>
+                </a:solidFill>
+              </a:rPr>
+              <a:t>data         </a:t>
+            </a:r>
+            <a:endParaRPr lang="en-US" sz="1000" b="1" dirty="0" smtClean="0">
+              <a:solidFill>
+                <a:schemeClr val="accent2"/>
+              </a:solidFill>
+            </a:endParaRPr>
+          </a:p>
+        </p:txBody>
+      </p:sp>
+      <p:cxnSp>
+        <p:nvCxnSpPr>
+          <p:cNvPr id="40" name="Straight Arrow Connector 39"/>
+          <p:cNvCxnSpPr>
+            <a:stCxn id="21" idx="3"/>
+            <a:endCxn id="127" idx="1"/>
+          </p:cNvCxnSpPr>
+          <p:nvPr/>
+        </p:nvCxnSpPr>
+        <p:spPr>
+          <a:xfrm>
+            <a:off x="1775228" y="2877200"/>
+            <a:ext cx="502360" cy="1253"/>
+          </a:xfrm>
+          <a:prstGeom prst="straightConnector1">
+            <a:avLst/>
+          </a:prstGeom>
+          <a:ln w="25400" cap="flat" cmpd="sng" algn="ctr">
+            <a:solidFill>
+              <a:schemeClr val="tx1"/>
+            </a:solidFill>
+            <a:prstDash val="solid"/>
+            <a:round/>
+            <a:headEnd type="none" w="med" len="med"/>
+            <a:tailEnd type="arrow"/>
+          </a:ln>
+          <a:effectLst/>
+        </p:spPr>
+        <p:style>
+          <a:lnRef idx="2">
+            <a:schemeClr val="accent1"/>
+          </a:lnRef>
+          <a:fillRef idx="0">
+            <a:schemeClr val="accent1"/>
+          </a:fillRef>
+          <a:effectRef idx="1">
+            <a:schemeClr val="accent1"/>
+          </a:effectRef>
+          <a:fontRef idx="minor">
+            <a:schemeClr val="tx1"/>
+          </a:fontRef>
+        </p:style>
+      </p:cxnSp>
+      <p:grpSp>
+        <p:nvGrpSpPr>
+          <p:cNvPr id="137" name="Group 136"/>
+          <p:cNvGrpSpPr/>
+          <p:nvPr/>
+        </p:nvGrpSpPr>
+        <p:grpSpPr>
+          <a:xfrm>
+            <a:off x="2280414" y="4721198"/>
+            <a:ext cx="2387676" cy="2951779"/>
+            <a:chOff x="2280414" y="4721198"/>
+            <a:chExt cx="2387676" cy="2951779"/>
+          </a:xfrm>
+        </p:grpSpPr>
+        <p:sp>
+          <p:nvSpPr>
+            <p:cNvPr id="42" name="TextBox 41"/>
+            <p:cNvSpPr txBox="1"/>
+            <p:nvPr/>
+          </p:nvSpPr>
+          <p:spPr>
+            <a:xfrm>
+              <a:off x="2932968" y="4834079"/>
+              <a:ext cx="1229935" cy="287815"/>
+            </a:xfrm>
+            <a:prstGeom prst="rect">
+              <a:avLst/>
+            </a:prstGeom>
+            <a:noFill/>
+          </p:spPr>
+          <p:txBody>
+            <a:bodyPr wrap="none" lIns="0" tIns="0" rIns="0" bIns="0" rtlCol="0">
+              <a:noAutofit/>
+            </a:bodyPr>
+            <a:lstStyle/>
+            <a:p>
+              <a:r>
+                <a:rPr lang="en-US" sz="1600" b="1" dirty="0" smtClean="0"/>
+                <a:t>2. Simulate </a:t>
+              </a:r>
+              <a:endParaRPr lang="en-US" sz="1600" b="1" dirty="0" smtClean="0">
+                <a:solidFill>
+                  <a:schemeClr val="tx1"/>
+                </a:solidFill>
+              </a:endParaRPr>
+            </a:p>
+          </p:txBody>
+        </p:sp>
+        <p:sp>
+          <p:nvSpPr>
+            <p:cNvPr id="43" name="TextBox 42"/>
+            <p:cNvSpPr txBox="1"/>
+            <p:nvPr/>
+          </p:nvSpPr>
+          <p:spPr>
+            <a:xfrm>
+              <a:off x="2807174" y="5226719"/>
+              <a:ext cx="1361360" cy="535803"/>
+            </a:xfrm>
+            <a:prstGeom prst="rect">
+              <a:avLst/>
+            </a:prstGeom>
+            <a:ln>
+              <a:solidFill>
+                <a:schemeClr val="accent2"/>
+              </a:solidFill>
+            </a:ln>
+          </p:spPr>
+          <p:style>
+            <a:lnRef idx="2">
+              <a:schemeClr val="accent2">
+                <a:shade val="50000"/>
+              </a:schemeClr>
+            </a:lnRef>
+            <a:fillRef idx="1">
+              <a:schemeClr val="accent2"/>
+            </a:fillRef>
+            <a:effectRef idx="0">
+              <a:schemeClr val="accent2"/>
+            </a:effectRef>
+            <a:fontRef idx="minor">
+              <a:schemeClr val="lt1"/>
+            </a:fontRef>
+          </p:style>
+          <p:txBody>
+            <a:bodyPr wrap="none" lIns="0" tIns="0" rIns="0" bIns="0" rtlCol="0" anchor="ctr" anchorCtr="1">
+              <a:noAutofit/>
+            </a:bodyPr>
+            <a:lstStyle/>
+            <a:p>
+              <a:pPr algn="ctr"/>
+              <a:r>
+                <a:rPr lang="en-US" sz="1000" b="1" dirty="0" smtClean="0">
+                  <a:solidFill>
+                    <a:schemeClr val="bg1"/>
+                  </a:solidFill>
+                </a:rPr>
+                <a:t>Disease model(s) </a:t>
+              </a:r>
+              <a:endParaRPr lang="en-US" sz="1000" b="1" dirty="0" smtClean="0">
+                <a:solidFill>
+                  <a:srgbClr val="FFFFFF"/>
+                </a:solidFill>
+              </a:endParaRPr>
+            </a:p>
+          </p:txBody>
+        </p:sp>
+        <p:sp>
+          <p:nvSpPr>
+            <p:cNvPr id="44" name="TextBox 43"/>
+            <p:cNvSpPr txBox="1"/>
+            <p:nvPr/>
+          </p:nvSpPr>
+          <p:spPr>
+            <a:xfrm>
+              <a:off x="2804348" y="6056395"/>
+              <a:ext cx="1361360" cy="535803"/>
+            </a:xfrm>
+            <a:prstGeom prst="rect">
+              <a:avLst/>
+            </a:prstGeom>
+            <a:ln>
+              <a:solidFill>
+                <a:schemeClr val="accent2"/>
+              </a:solidFill>
+            </a:ln>
+          </p:spPr>
+          <p:style>
+            <a:lnRef idx="2">
+              <a:schemeClr val="accent2">
+                <a:shade val="50000"/>
+              </a:schemeClr>
+            </a:lnRef>
+            <a:fillRef idx="1">
+              <a:schemeClr val="accent2"/>
+            </a:fillRef>
+            <a:effectRef idx="0">
+              <a:schemeClr val="accent2"/>
+            </a:effectRef>
+            <a:fontRef idx="minor">
+              <a:schemeClr val="lt1"/>
+            </a:fontRef>
+          </p:style>
+          <p:txBody>
+            <a:bodyPr wrap="none" lIns="0" tIns="0" rIns="0" bIns="0" rtlCol="0" anchor="ctr" anchorCtr="1">
+              <a:noAutofit/>
+            </a:bodyPr>
+            <a:lstStyle/>
+            <a:p>
+              <a:pPr algn="ctr"/>
+              <a:r>
+                <a:rPr lang="en-US" sz="1000" b="1" dirty="0" smtClean="0">
+                  <a:solidFill>
+                    <a:schemeClr val="bg1"/>
+                  </a:solidFill>
+                </a:rPr>
+                <a:t>Utility model</a:t>
+              </a:r>
+              <a:endParaRPr lang="en-US" sz="1000" b="1" dirty="0" smtClean="0">
+                <a:solidFill>
+                  <a:srgbClr val="FFFFFF"/>
+                </a:solidFill>
+              </a:endParaRPr>
+            </a:p>
+          </p:txBody>
+        </p:sp>
+        <p:sp>
+          <p:nvSpPr>
+            <p:cNvPr id="45" name="TextBox 44"/>
+            <p:cNvSpPr txBox="1"/>
+            <p:nvPr/>
+          </p:nvSpPr>
+          <p:spPr>
+            <a:xfrm>
+              <a:off x="2815631" y="6914290"/>
+              <a:ext cx="1361360" cy="535803"/>
+            </a:xfrm>
+            <a:prstGeom prst="rect">
+              <a:avLst/>
+            </a:prstGeom>
+            <a:ln>
+              <a:solidFill>
+                <a:schemeClr val="accent2"/>
+              </a:solidFill>
+            </a:ln>
+          </p:spPr>
+          <p:style>
+            <a:lnRef idx="2">
+              <a:schemeClr val="accent2">
+                <a:shade val="50000"/>
+              </a:schemeClr>
+            </a:lnRef>
+            <a:fillRef idx="1">
+              <a:schemeClr val="accent2"/>
+            </a:fillRef>
+            <a:effectRef idx="0">
+              <a:schemeClr val="accent2"/>
+            </a:effectRef>
+            <a:fontRef idx="minor">
+              <a:schemeClr val="lt1"/>
+            </a:fontRef>
+          </p:style>
+          <p:txBody>
+            <a:bodyPr wrap="none" lIns="0" tIns="0" rIns="0" bIns="0" rtlCol="0" anchor="ctr" anchorCtr="1">
+              <a:noAutofit/>
+            </a:bodyPr>
+            <a:lstStyle/>
+            <a:p>
+              <a:pPr algn="ctr"/>
+              <a:r>
+                <a:rPr lang="en-US" sz="1000" b="1" dirty="0" smtClean="0">
+                  <a:solidFill>
+                    <a:schemeClr val="bg1"/>
+                  </a:solidFill>
+                </a:rPr>
+                <a:t>Cost model(s)</a:t>
+              </a:r>
+              <a:endParaRPr lang="en-US" sz="1000" b="1" dirty="0" smtClean="0">
+                <a:solidFill>
+                  <a:srgbClr val="FFFFFF"/>
+                </a:solidFill>
+              </a:endParaRPr>
+            </a:p>
+          </p:txBody>
+        </p:sp>
+        <p:sp>
+          <p:nvSpPr>
+            <p:cNvPr id="46" name="Rectangle 45"/>
+            <p:cNvSpPr/>
+            <p:nvPr/>
+          </p:nvSpPr>
+          <p:spPr>
+            <a:xfrm>
+              <a:off x="2280414" y="4721198"/>
+              <a:ext cx="2387676" cy="2951779"/>
+            </a:xfrm>
+            <a:prstGeom prst="rect">
+              <a:avLst/>
+            </a:prstGeom>
+            <a:noFill/>
+            <a:ln>
+              <a:solidFill>
+                <a:schemeClr val="accent2"/>
+              </a:solidFill>
+              <a:prstDash val="sysDash"/>
+            </a:ln>
+            <a:effectLst/>
+          </p:spPr>
+          <p:style>
+            <a:lnRef idx="1">
+              <a:schemeClr val="accent1"/>
+            </a:lnRef>
+            <a:fillRef idx="3">
+              <a:schemeClr val="accent1"/>
+            </a:fillRef>
+            <a:effectRef idx="2">
+              <a:schemeClr val="accent1"/>
+            </a:effectRef>
+            <a:fontRef idx="minor">
+              <a:schemeClr val="lt1"/>
+            </a:fontRef>
+          </p:style>
+          <p:txBody>
+            <a:bodyPr rtlCol="0" anchor="ctr"/>
+            <a:lstStyle/>
+            <a:p>
+              <a:pPr algn="ctr"/>
+              <a:endParaRPr lang="en-US"/>
+            </a:p>
+          </p:txBody>
+        </p:sp>
+      </p:grpSp>
+      <p:cxnSp>
+        <p:nvCxnSpPr>
+          <p:cNvPr id="48" name="Straight Arrow Connector 47"/>
+          <p:cNvCxnSpPr>
+            <a:stCxn id="47" idx="3"/>
+            <a:endCxn id="46" idx="1"/>
+          </p:cNvCxnSpPr>
+          <p:nvPr/>
+        </p:nvCxnSpPr>
+        <p:spPr>
+          <a:xfrm flipV="1">
+            <a:off x="1852939" y="6197088"/>
+            <a:ext cx="427475" cy="10856"/>
+          </a:xfrm>
+          <a:prstGeom prst="straightConnector1">
+            <a:avLst/>
+          </a:prstGeom>
+          <a:ln w="25400" cap="flat" cmpd="sng" algn="ctr">
+            <a:solidFill>
+              <a:schemeClr val="tx1"/>
+            </a:solidFill>
+            <a:prstDash val="solid"/>
+            <a:round/>
+            <a:headEnd type="none" w="med" len="med"/>
+            <a:tailEnd type="arrow"/>
+          </a:ln>
+          <a:effectLst/>
+        </p:spPr>
+        <p:style>
+          <a:lnRef idx="2">
+            <a:schemeClr val="accent1"/>
+          </a:lnRef>
+          <a:fillRef idx="0">
+            <a:schemeClr val="accent1"/>
+          </a:fillRef>
+          <a:effectRef idx="1">
+            <a:schemeClr val="accent1"/>
+          </a:effectRef>
+          <a:fontRef idx="minor">
+            <a:schemeClr val="tx1"/>
+          </a:fontRef>
+        </p:style>
+      </p:cxnSp>
+      <p:grpSp>
+        <p:nvGrpSpPr>
+          <p:cNvPr id="136" name="Group 135"/>
+          <p:cNvGrpSpPr/>
+          <p:nvPr/>
+        </p:nvGrpSpPr>
+        <p:grpSpPr>
+          <a:xfrm>
+            <a:off x="5170112" y="5531082"/>
+            <a:ext cx="3198024" cy="1326331"/>
+            <a:chOff x="5254781" y="5531082"/>
+            <a:chExt cx="3198024" cy="1326331"/>
+          </a:xfrm>
+        </p:grpSpPr>
+        <p:sp>
+          <p:nvSpPr>
+            <p:cNvPr id="69" name="TextBox 68"/>
+            <p:cNvSpPr txBox="1"/>
+            <p:nvPr/>
+          </p:nvSpPr>
+          <p:spPr>
+            <a:xfrm>
+              <a:off x="5505302" y="5963242"/>
+              <a:ext cx="1166625" cy="637382"/>
+            </a:xfrm>
+            <a:prstGeom prst="rect">
+              <a:avLst/>
+            </a:prstGeom>
+            <a:ln>
+              <a:solidFill>
+                <a:schemeClr val="accent2"/>
+              </a:solidFill>
+            </a:ln>
+          </p:spPr>
+          <p:style>
+            <a:lnRef idx="2">
+              <a:schemeClr val="accent2">
+                <a:shade val="50000"/>
+              </a:schemeClr>
+            </a:lnRef>
+            <a:fillRef idx="1">
+              <a:schemeClr val="accent2"/>
+            </a:fillRef>
+            <a:effectRef idx="0">
+              <a:schemeClr val="accent2"/>
+            </a:effectRef>
+            <a:fontRef idx="minor">
+              <a:schemeClr val="lt1"/>
+            </a:fontRef>
+          </p:style>
+          <p:txBody>
+            <a:bodyPr wrap="none" lIns="0" tIns="0" rIns="0" bIns="0" rtlCol="0" anchor="ctr" anchorCtr="1">
+              <a:noAutofit/>
+            </a:bodyPr>
+            <a:lstStyle/>
+            <a:p>
+              <a:pPr algn="ctr"/>
+              <a:r>
+                <a:rPr lang="en-US" sz="1000" b="1" dirty="0" smtClean="0">
+                  <a:solidFill>
+                    <a:schemeClr val="bg1"/>
+                  </a:solidFill>
+                </a:rPr>
+                <a:t>CEA</a:t>
+              </a:r>
+            </a:p>
+          </p:txBody>
+        </p:sp>
+        <p:sp>
+          <p:nvSpPr>
+            <p:cNvPr id="70" name="TextBox 69"/>
+            <p:cNvSpPr txBox="1"/>
+            <p:nvPr/>
+          </p:nvSpPr>
+          <p:spPr>
+            <a:xfrm>
+              <a:off x="7018064" y="5966052"/>
+              <a:ext cx="1166625" cy="637382"/>
+            </a:xfrm>
+            <a:prstGeom prst="rect">
+              <a:avLst/>
+            </a:prstGeom>
+            <a:ln>
+              <a:solidFill>
+                <a:schemeClr val="accent2"/>
+              </a:solidFill>
+            </a:ln>
+          </p:spPr>
+          <p:style>
+            <a:lnRef idx="2">
+              <a:schemeClr val="accent2">
+                <a:shade val="50000"/>
+              </a:schemeClr>
+            </a:lnRef>
+            <a:fillRef idx="1">
+              <a:schemeClr val="accent2"/>
+            </a:fillRef>
+            <a:effectRef idx="0">
+              <a:schemeClr val="accent2"/>
+            </a:effectRef>
+            <a:fontRef idx="minor">
+              <a:schemeClr val="lt1"/>
+            </a:fontRef>
+          </p:style>
+          <p:txBody>
+            <a:bodyPr wrap="none" lIns="0" tIns="0" rIns="0" bIns="0" rtlCol="0" anchor="ctr" anchorCtr="1">
+              <a:noAutofit/>
+            </a:bodyPr>
+            <a:lstStyle/>
+            <a:p>
+              <a:pPr algn="ctr"/>
+              <a:r>
+                <a:rPr lang="en-US" sz="1000" b="1" dirty="0" smtClean="0">
+                  <a:solidFill>
+                    <a:schemeClr val="bg1"/>
+                  </a:solidFill>
+                </a:rPr>
+                <a:t>MCDA</a:t>
+              </a:r>
+            </a:p>
+          </p:txBody>
+        </p:sp>
+        <p:sp>
+          <p:nvSpPr>
+            <p:cNvPr id="71" name="TextBox 70"/>
+            <p:cNvSpPr txBox="1"/>
+            <p:nvPr/>
+          </p:nvSpPr>
+          <p:spPr>
+            <a:xfrm>
+              <a:off x="5897449" y="5584714"/>
+              <a:ext cx="2089219" cy="310418"/>
+            </a:xfrm>
+            <a:prstGeom prst="rect">
+              <a:avLst/>
+            </a:prstGeom>
+            <a:noFill/>
+          </p:spPr>
+          <p:txBody>
+            <a:bodyPr wrap="none" lIns="0" tIns="0" rIns="0" bIns="0" rtlCol="0">
+              <a:noAutofit/>
+            </a:bodyPr>
+            <a:lstStyle/>
+            <a:p>
+              <a:r>
+                <a:rPr lang="en-US" sz="1600" b="1" dirty="0" smtClean="0">
+                  <a:solidFill>
+                    <a:schemeClr val="tx1"/>
+                  </a:solidFill>
+                </a:rPr>
+                <a:t>3. Decision analysis</a:t>
+              </a:r>
+            </a:p>
+          </p:txBody>
+        </p:sp>
+        <p:sp>
+          <p:nvSpPr>
+            <p:cNvPr id="68" name="Rectangle 67"/>
+            <p:cNvSpPr/>
+            <p:nvPr/>
+          </p:nvSpPr>
+          <p:spPr>
+            <a:xfrm>
+              <a:off x="5254781" y="5531082"/>
+              <a:ext cx="3198024" cy="1326331"/>
+            </a:xfrm>
+            <a:prstGeom prst="rect">
+              <a:avLst/>
+            </a:prstGeom>
+            <a:noFill/>
+            <a:ln>
+              <a:solidFill>
+                <a:schemeClr val="accent2"/>
+              </a:solidFill>
+              <a:prstDash val="sysDash"/>
+            </a:ln>
+            <a:effectLst/>
+          </p:spPr>
+          <p:style>
+            <a:lnRef idx="1">
+              <a:schemeClr val="accent1"/>
+            </a:lnRef>
+            <a:fillRef idx="3">
+              <a:schemeClr val="accent1"/>
+            </a:fillRef>
+            <a:effectRef idx="2">
+              <a:schemeClr val="accent1"/>
+            </a:effectRef>
+            <a:fontRef idx="minor">
+              <a:schemeClr val="lt1"/>
+            </a:fontRef>
+          </p:style>
+          <p:txBody>
+            <a:bodyPr rtlCol="0" anchor="ctr"/>
+            <a:lstStyle/>
+            <a:p>
+              <a:pPr algn="ctr"/>
+              <a:endParaRPr lang="en-US"/>
+            </a:p>
+          </p:txBody>
+        </p:sp>
+      </p:grpSp>
+      <p:cxnSp>
+        <p:nvCxnSpPr>
+          <p:cNvPr id="72" name="Straight Arrow Connector 71"/>
+          <p:cNvCxnSpPr>
+            <a:stCxn id="46" idx="3"/>
+            <a:endCxn id="68" idx="1"/>
+          </p:cNvCxnSpPr>
+          <p:nvPr/>
+        </p:nvCxnSpPr>
+        <p:spPr>
+          <a:xfrm flipV="1">
+            <a:off x="4668090" y="6194248"/>
+            <a:ext cx="502022" cy="2840"/>
+          </a:xfrm>
+          <a:prstGeom prst="straightConnector1">
+            <a:avLst/>
+          </a:prstGeom>
+          <a:ln w="25400" cap="flat" cmpd="sng" algn="ctr">
+            <a:solidFill>
+              <a:schemeClr val="tx1"/>
+            </a:solidFill>
+            <a:prstDash val="solid"/>
+            <a:round/>
+            <a:headEnd type="none" w="med" len="med"/>
+            <a:tailEnd type="arrow"/>
+          </a:ln>
+          <a:effectLst/>
+        </p:spPr>
+        <p:style>
+          <a:lnRef idx="2">
+            <a:schemeClr val="accent1"/>
+          </a:lnRef>
+          <a:fillRef idx="0">
+            <a:schemeClr val="accent1"/>
+          </a:fillRef>
+          <a:effectRef idx="1">
+            <a:schemeClr val="accent1"/>
+          </a:effectRef>
+          <a:fontRef idx="minor">
+            <a:schemeClr val="tx1"/>
+          </a:fontRef>
+        </p:style>
+      </p:cxnSp>
+      <p:grpSp>
+        <p:nvGrpSpPr>
+          <p:cNvPr id="128" name="Group 127"/>
+          <p:cNvGrpSpPr/>
+          <p:nvPr/>
+        </p:nvGrpSpPr>
+        <p:grpSpPr>
+          <a:xfrm>
+            <a:off x="2277588" y="1402563"/>
+            <a:ext cx="2387676" cy="2951779"/>
+            <a:chOff x="5452681" y="1684760"/>
+            <a:chExt cx="2387676" cy="2951779"/>
+          </a:xfrm>
+        </p:grpSpPr>
+        <p:sp>
+          <p:nvSpPr>
+            <p:cNvPr id="123" name="TextBox 122"/>
+            <p:cNvSpPr txBox="1"/>
+            <p:nvPr/>
+          </p:nvSpPr>
+          <p:spPr>
+            <a:xfrm>
+              <a:off x="6105235" y="1797641"/>
+              <a:ext cx="1229935" cy="287815"/>
+            </a:xfrm>
+            <a:prstGeom prst="rect">
+              <a:avLst/>
+            </a:prstGeom>
+            <a:noFill/>
+          </p:spPr>
+          <p:txBody>
+            <a:bodyPr wrap="none" lIns="0" tIns="0" rIns="0" bIns="0" rtlCol="0">
+              <a:noAutofit/>
+            </a:bodyPr>
+            <a:lstStyle/>
+            <a:p>
+              <a:r>
+                <a:rPr lang="en-US" sz="1600" b="1" dirty="0"/>
+                <a:t>1</a:t>
+              </a:r>
+              <a:r>
+                <a:rPr lang="en-US" sz="1600" b="1" dirty="0" smtClean="0"/>
+                <a:t>. Estimate</a:t>
+              </a:r>
+              <a:endParaRPr lang="en-US" sz="1600" b="1" dirty="0" smtClean="0">
+                <a:solidFill>
+                  <a:schemeClr val="tx1"/>
+                </a:solidFill>
+              </a:endParaRPr>
+            </a:p>
+          </p:txBody>
+        </p:sp>
+        <p:sp>
+          <p:nvSpPr>
+            <p:cNvPr id="124" name="TextBox 123"/>
+            <p:cNvSpPr txBox="1"/>
+            <p:nvPr/>
+          </p:nvSpPr>
+          <p:spPr>
+            <a:xfrm>
+              <a:off x="5979441" y="2190281"/>
+              <a:ext cx="1361360" cy="535803"/>
+            </a:xfrm>
+            <a:prstGeom prst="rect">
+              <a:avLst/>
+            </a:prstGeom>
+            <a:ln>
+              <a:solidFill>
+                <a:schemeClr val="accent2"/>
+              </a:solidFill>
+            </a:ln>
+          </p:spPr>
+          <p:style>
+            <a:lnRef idx="2">
+              <a:schemeClr val="accent2">
+                <a:shade val="50000"/>
+              </a:schemeClr>
+            </a:lnRef>
+            <a:fillRef idx="1">
+              <a:schemeClr val="accent2"/>
+            </a:fillRef>
+            <a:effectRef idx="0">
+              <a:schemeClr val="accent2"/>
+            </a:effectRef>
+            <a:fontRef idx="minor">
+              <a:schemeClr val="lt1"/>
+            </a:fontRef>
+          </p:style>
+          <p:txBody>
+            <a:bodyPr wrap="none" lIns="0" tIns="0" rIns="0" bIns="0" rtlCol="0" anchor="ctr" anchorCtr="1">
+              <a:noAutofit/>
+            </a:bodyPr>
+            <a:lstStyle/>
+            <a:p>
+              <a:pPr algn="ctr"/>
+              <a:r>
+                <a:rPr lang="en-US" sz="1000" b="1" dirty="0" smtClean="0">
+                  <a:solidFill>
+                    <a:schemeClr val="bg1"/>
+                  </a:solidFill>
+                </a:rPr>
+                <a:t>Disease model(s) </a:t>
+              </a:r>
+              <a:endParaRPr lang="en-US" sz="1000" b="1" dirty="0" smtClean="0">
+                <a:solidFill>
+                  <a:srgbClr val="FFFFFF"/>
+                </a:solidFill>
+              </a:endParaRPr>
+            </a:p>
+          </p:txBody>
+        </p:sp>
+        <p:sp>
+          <p:nvSpPr>
+            <p:cNvPr id="125" name="TextBox 124"/>
+            <p:cNvSpPr txBox="1"/>
+            <p:nvPr/>
+          </p:nvSpPr>
+          <p:spPr>
+            <a:xfrm>
+              <a:off x="5976615" y="3019957"/>
+              <a:ext cx="1361360" cy="535803"/>
+            </a:xfrm>
+            <a:prstGeom prst="rect">
+              <a:avLst/>
+            </a:prstGeom>
+            <a:ln>
+              <a:solidFill>
+                <a:schemeClr val="accent2"/>
+              </a:solidFill>
+            </a:ln>
+          </p:spPr>
+          <p:style>
+            <a:lnRef idx="2">
+              <a:schemeClr val="accent2">
+                <a:shade val="50000"/>
+              </a:schemeClr>
+            </a:lnRef>
+            <a:fillRef idx="1">
+              <a:schemeClr val="accent2"/>
+            </a:fillRef>
+            <a:effectRef idx="0">
+              <a:schemeClr val="accent2"/>
+            </a:effectRef>
+            <a:fontRef idx="minor">
+              <a:schemeClr val="lt1"/>
+            </a:fontRef>
+          </p:style>
+          <p:txBody>
+            <a:bodyPr wrap="none" lIns="0" tIns="0" rIns="0" bIns="0" rtlCol="0" anchor="ctr" anchorCtr="1">
+              <a:noAutofit/>
+            </a:bodyPr>
+            <a:lstStyle/>
+            <a:p>
+              <a:pPr algn="ctr"/>
+              <a:r>
+                <a:rPr lang="en-US" sz="1000" b="1" dirty="0" smtClean="0">
+                  <a:solidFill>
+                    <a:schemeClr val="bg1"/>
+                  </a:solidFill>
+                </a:rPr>
+                <a:t>Utility model</a:t>
+              </a:r>
+              <a:endParaRPr lang="en-US" sz="1000" b="1" dirty="0" smtClean="0">
+                <a:solidFill>
+                  <a:srgbClr val="FFFFFF"/>
+                </a:solidFill>
+              </a:endParaRPr>
+            </a:p>
+          </p:txBody>
+        </p:sp>
+        <p:sp>
+          <p:nvSpPr>
+            <p:cNvPr id="126" name="TextBox 125"/>
+            <p:cNvSpPr txBox="1"/>
+            <p:nvPr/>
+          </p:nvSpPr>
+          <p:spPr>
+            <a:xfrm>
+              <a:off x="5987898" y="3877852"/>
+              <a:ext cx="1361360" cy="535803"/>
+            </a:xfrm>
+            <a:prstGeom prst="rect">
+              <a:avLst/>
+            </a:prstGeom>
+            <a:ln>
+              <a:solidFill>
+                <a:schemeClr val="accent2"/>
+              </a:solidFill>
+            </a:ln>
+          </p:spPr>
+          <p:style>
+            <a:lnRef idx="2">
+              <a:schemeClr val="accent2">
+                <a:shade val="50000"/>
+              </a:schemeClr>
+            </a:lnRef>
+            <a:fillRef idx="1">
+              <a:schemeClr val="accent2"/>
+            </a:fillRef>
+            <a:effectRef idx="0">
+              <a:schemeClr val="accent2"/>
+            </a:effectRef>
+            <a:fontRef idx="minor">
+              <a:schemeClr val="lt1"/>
+            </a:fontRef>
+          </p:style>
+          <p:txBody>
+            <a:bodyPr wrap="none" lIns="0" tIns="0" rIns="0" bIns="0" rtlCol="0" anchor="ctr" anchorCtr="1">
+              <a:noAutofit/>
+            </a:bodyPr>
+            <a:lstStyle/>
+            <a:p>
+              <a:pPr algn="ctr"/>
+              <a:r>
+                <a:rPr lang="en-US" sz="1000" b="1" dirty="0" smtClean="0">
+                  <a:solidFill>
+                    <a:schemeClr val="bg1"/>
+                  </a:solidFill>
+                </a:rPr>
+                <a:t>Cost model(s)</a:t>
+              </a:r>
+              <a:endParaRPr lang="en-US" sz="1000" b="1" dirty="0" smtClean="0">
+                <a:solidFill>
+                  <a:srgbClr val="FFFFFF"/>
+                </a:solidFill>
+              </a:endParaRPr>
+            </a:p>
+          </p:txBody>
+        </p:sp>
+        <p:sp>
+          <p:nvSpPr>
+            <p:cNvPr id="127" name="Rectangle 126"/>
+            <p:cNvSpPr/>
+            <p:nvPr/>
+          </p:nvSpPr>
+          <p:spPr>
+            <a:xfrm>
+              <a:off x="5452681" y="1684760"/>
+              <a:ext cx="2387676" cy="2951779"/>
+            </a:xfrm>
+            <a:prstGeom prst="rect">
+              <a:avLst/>
+            </a:prstGeom>
+            <a:noFill/>
+            <a:ln>
+              <a:solidFill>
+                <a:schemeClr val="accent2"/>
+              </a:solidFill>
+              <a:prstDash val="sysDash"/>
+            </a:ln>
+            <a:effectLst/>
+          </p:spPr>
+          <p:style>
+            <a:lnRef idx="1">
+              <a:schemeClr val="accent1"/>
+            </a:lnRef>
+            <a:fillRef idx="3">
+              <a:schemeClr val="accent1"/>
+            </a:fillRef>
+            <a:effectRef idx="2">
+              <a:schemeClr val="accent1"/>
+            </a:effectRef>
+            <a:fontRef idx="minor">
+              <a:schemeClr val="lt1"/>
+            </a:fontRef>
+          </p:style>
+          <p:txBody>
+            <a:bodyPr rtlCol="0" anchor="ctr"/>
+            <a:lstStyle/>
+            <a:p>
+              <a:pPr algn="ctr"/>
+              <a:endParaRPr lang="en-US"/>
+            </a:p>
+          </p:txBody>
+        </p:sp>
+      </p:grpSp>
+    </p:spTree>
+    <p:extLst>
+      <p:ext uri="{BB962C8B-B14F-4D97-AF65-F5344CB8AC3E}">
+        <p14:creationId xmlns:p14="http://schemas.microsoft.com/office/powerpoint/2010/main" val="3050014883"/>
       </p:ext>
     </p:extLst>
   </p:cSld>

</xml_diff>

<commit_message>
Update vignettes, particular for intro
</commit_message>
<xml_diff>
--- a/vignettes/figures.pptx
+++ b/vignettes/figures.pptx
@@ -114,7 +114,7 @@
   </p:defaultTextStyle>
   <p:extLst>
     <p:ext uri="{EFAFB233-063F-42B5-8137-9DF3F51BA10A}">
-      <p15:sldGuideLst xmlns:p15="http://schemas.microsoft.com/office/powerpoint/2012/main" xmlns="">
+      <p15:sldGuideLst xmlns="" xmlns:p15="http://schemas.microsoft.com/office/powerpoint/2012/main">
         <p15:guide id="1" orient="horz" pos="3146">
           <p15:clr>
             <a:srgbClr val="A4A3A4"/>
@@ -252,7 +252,7 @@
               <a:rPr lang="en-US" smtClean="0">
                 <a:latin typeface="Helvetica"/>
               </a:rPr>
-              <a:t>10/19/18</a:t>
+              <a:t>10/27/18</a:t>
             </a:fld>
             <a:endParaRPr lang="en-US" dirty="0">
               <a:latin typeface="Helvetica"/>
@@ -431,7 +431,7 @@
             <a:fld id="{9BBF7E23-A315-CF44-AB07-C8184967DF75}" type="datetimeFigureOut">
               <a:rPr lang="en-US" smtClean="0"/>
               <a:pPr/>
-              <a:t>10/19/18</a:t>
+              <a:t>10/27/18</a:t>
             </a:fld>
             <a:endParaRPr lang="en-US" dirty="0"/>
           </a:p>
@@ -2352,7 +2352,7 @@
           <p:cNvPr id="10" name="Elbow Connector 9">
             <a:extLst>
               <a:ext uri="{FF2B5EF4-FFF2-40B4-BE49-F238E27FC236}">
-                <a16:creationId xmlns:a16="http://schemas.microsoft.com/office/drawing/2014/main" xmlns="" id="{78955D2A-0645-9E4F-A488-02ABF000BB63}"/>
+                <a16:creationId xmlns="" xmlns:a16="http://schemas.microsoft.com/office/drawing/2014/main" id="{78955D2A-0645-9E4F-A488-02ABF000BB63}"/>
               </a:ext>
             </a:extLst>
           </p:cNvPr>
@@ -2859,7 +2859,7 @@
           <p:cNvPr id="10" name="Elbow Connector 9">
             <a:extLst>
               <a:ext uri="{FF2B5EF4-FFF2-40B4-BE49-F238E27FC236}">
-                <a16:creationId xmlns:a16="http://schemas.microsoft.com/office/drawing/2014/main" xmlns="" id="{78955D2A-0645-9E4F-A488-02ABF000BB63}"/>
+                <a16:creationId xmlns="" xmlns:a16="http://schemas.microsoft.com/office/drawing/2014/main" id="{78955D2A-0645-9E4F-A488-02ABF000BB63}"/>
               </a:ext>
             </a:extLst>
           </p:cNvPr>
@@ -3938,7 +3938,7 @@
           <p:cNvPr id="10" name="Elbow Connector 9">
             <a:extLst>
               <a:ext uri="{FF2B5EF4-FFF2-40B4-BE49-F238E27FC236}">
-                <a16:creationId xmlns:a16="http://schemas.microsoft.com/office/drawing/2014/main" xmlns="" id="{78955D2A-0645-9E4F-A488-02ABF000BB63}"/>
+                <a16:creationId xmlns="" xmlns:a16="http://schemas.microsoft.com/office/drawing/2014/main" id="{78955D2A-0645-9E4F-A488-02ABF000BB63}"/>
               </a:ext>
             </a:extLst>
           </p:cNvPr>
@@ -3992,7 +3992,7 @@
           <p:nvPr>
             <p:extLst>
               <p:ext uri="{D42A27DB-BD31-4B8C-83A1-F6EECF244321}">
-                <p14:modId xmlns:p14="http://schemas.microsoft.com/office/powerpoint/2010/main" val="455077554"/>
+                <p14:modId xmlns:p14="http://schemas.microsoft.com/office/powerpoint/2010/main" val="2722197402"/>
               </p:ext>
             </p:extLst>
           </p:nvPr>
@@ -4074,17 +4074,8 @@
                         <a:rPr lang="en-US" sz="1000" kern="1200" dirty="0" smtClean="0">
                           <a:effectLst/>
                         </a:rPr>
-                        <a:t>Health </a:t>
+                        <a:t>Health states</a:t>
                       </a:r>
-                      <a:r>
-                        <a:rPr lang="en-US" sz="1000" kern="1200" dirty="0" smtClean="0">
-                          <a:effectLst/>
-                        </a:rPr>
-                        <a:t>states</a:t>
-                      </a:r>
-                      <a:endParaRPr lang="en-US" sz="1000" kern="1200" dirty="0" smtClean="0">
-                        <a:effectLst/>
-                      </a:endParaRPr>
                     </a:p>
                   </a:txBody>
                   <a:tcPr marL="118872" marR="118872" marT="73152" marB="73152"/>
@@ -4180,21 +4171,8 @@
                   <a:schemeClr val="accent2"/>
                 </a:solidFill>
               </a:rPr>
-              <a:t>Estimation </a:t>
+              <a:t>Estimation data         </a:t>
             </a:r>
-            <a:r>
-              <a:rPr lang="en-US" sz="1000" b="1" dirty="0" smtClean="0">
-                <a:solidFill>
-                  <a:schemeClr val="accent2"/>
-                </a:solidFill>
-              </a:rPr>
-              <a:t>data         </a:t>
-            </a:r>
-            <a:endParaRPr lang="en-US" sz="1000" b="1" dirty="0" smtClean="0">
-              <a:solidFill>
-                <a:schemeClr val="accent2"/>
-              </a:solidFill>
-            </a:endParaRPr>
           </a:p>
         </p:txBody>
       </p:sp>
@@ -4263,7 +4241,7 @@
           </p:nvSpPr>
           <p:spPr>
             <a:xfrm>
-              <a:off x="2932968" y="4834079"/>
+              <a:off x="2862411" y="4834079"/>
               <a:ext cx="1229935" cy="287815"/>
             </a:xfrm>
             <a:prstGeom prst="rect">
@@ -4279,7 +4257,11 @@
             <a:p>
               <a:r>
                 <a:rPr lang="en-US" sz="1600" b="1" dirty="0" smtClean="0"/>
-                <a:t>2. Simulate </a:t>
+                <a:t>2. </a:t>
+              </a:r>
+              <a:r>
+                <a:rPr lang="en-US" sz="1600" b="1" dirty="0" smtClean="0"/>
+                <a:t>Simulation </a:t>
               </a:r>
               <a:endParaRPr lang="en-US" sz="1600" b="1" dirty="0" smtClean="0">
                 <a:solidFill>
@@ -4823,8 +4805,8 @@
           </p:nvSpPr>
           <p:spPr>
             <a:xfrm>
-              <a:off x="6105235" y="1797641"/>
-              <a:ext cx="1229935" cy="287815"/>
+              <a:off x="5681890" y="1797642"/>
+              <a:ext cx="1952447" cy="220074"/>
             </a:xfrm>
             <a:prstGeom prst="rect">
               <a:avLst/>
@@ -4843,7 +4825,11 @@
               </a:r>
               <a:r>
                 <a:rPr lang="en-US" sz="1600" b="1" dirty="0" smtClean="0"/>
-                <a:t>. Estimate</a:t>
+                <a:t>. </a:t>
+              </a:r>
+              <a:r>
+                <a:rPr lang="en-US" sz="1600" b="1" dirty="0" smtClean="0"/>
+                <a:t>Parameterization</a:t>
               </a:r>
               <a:endParaRPr lang="en-US" sz="1600" b="1" dirty="0" smtClean="0">
                 <a:solidFill>

</xml_diff>

<commit_message>
Update pkgdown website based on added features + update intro article
</commit_message>
<xml_diff>
--- a/vignettes/figures.pptx
+++ b/vignettes/figures.pptx
@@ -5,15 +5,14 @@
     <p:sldMasterId id="2147483648" r:id="rId1"/>
   </p:sldMasterIdLst>
   <p:notesMasterIdLst>
-    <p:notesMasterId r:id="rId5"/>
+    <p:notesMasterId r:id="rId4"/>
   </p:notesMasterIdLst>
   <p:handoutMasterIdLst>
-    <p:handoutMasterId r:id="rId6"/>
+    <p:handoutMasterId r:id="rId5"/>
   </p:handoutMasterIdLst>
   <p:sldIdLst>
     <p:sldId id="305" r:id="rId2"/>
-    <p:sldId id="307" r:id="rId3"/>
-    <p:sldId id="308" r:id="rId4"/>
+    <p:sldId id="308" r:id="rId3"/>
   </p:sldIdLst>
   <p:sldSz cx="11887200" cy="8229600"/>
   <p:notesSz cx="6858000" cy="9144000"/>
@@ -114,7 +113,7 @@
   </p:defaultTextStyle>
   <p:extLst>
     <p:ext uri="{EFAFB233-063F-42B5-8137-9DF3F51BA10A}">
-      <p15:sldGuideLst xmlns="" xmlns:p15="http://schemas.microsoft.com/office/powerpoint/2012/main">
+      <p15:sldGuideLst xmlns:p15="http://schemas.microsoft.com/office/powerpoint/2012/main" xmlns="">
         <p15:guide id="1" orient="horz" pos="3146">
           <p15:clr>
             <a:srgbClr val="A4A3A4"/>
@@ -252,7 +251,7 @@
               <a:rPr lang="en-US" smtClean="0">
                 <a:latin typeface="Helvetica"/>
               </a:rPr>
-              <a:t>10/27/18</a:t>
+              <a:t>11/17/18</a:t>
             </a:fld>
             <a:endParaRPr lang="en-US" dirty="0">
               <a:latin typeface="Helvetica"/>
@@ -431,7 +430,7 @@
             <a:fld id="{9BBF7E23-A315-CF44-AB07-C8184967DF75}" type="datetimeFigureOut">
               <a:rPr lang="en-US" smtClean="0"/>
               <a:pPr/>
-              <a:t>10/27/18</a:t>
+              <a:t>11/17/18</a:t>
             </a:fld>
             <a:endParaRPr lang="en-US" dirty="0"/>
           </a:p>
@@ -2352,7 +2351,7 @@
           <p:cNvPr id="10" name="Elbow Connector 9">
             <a:extLst>
               <a:ext uri="{FF2B5EF4-FFF2-40B4-BE49-F238E27FC236}">
-                <a16:creationId xmlns="" xmlns:a16="http://schemas.microsoft.com/office/drawing/2014/main" id="{78955D2A-0645-9E4F-A488-02ABF000BB63}"/>
+                <a16:creationId xmlns:a16="http://schemas.microsoft.com/office/drawing/2014/main" xmlns="" id="{78955D2A-0645-9E4F-A488-02ABF000BB63}"/>
               </a:ext>
             </a:extLst>
           </p:cNvPr>
@@ -2859,7 +2858,7 @@
           <p:cNvPr id="10" name="Elbow Connector 9">
             <a:extLst>
               <a:ext uri="{FF2B5EF4-FFF2-40B4-BE49-F238E27FC236}">
-                <a16:creationId xmlns="" xmlns:a16="http://schemas.microsoft.com/office/drawing/2014/main" id="{78955D2A-0645-9E4F-A488-02ABF000BB63}"/>
+                <a16:creationId xmlns:a16="http://schemas.microsoft.com/office/drawing/2014/main" xmlns="" id="{78955D2A-0645-9E4F-A488-02ABF000BB63}"/>
               </a:ext>
             </a:extLst>
           </p:cNvPr>
@@ -2904,748 +2903,1029 @@
           </a:fontRef>
         </p:style>
       </p:cxnSp>
-      <p:graphicFrame>
-        <p:nvGraphicFramePr>
-          <p:cNvPr id="24" name="Table 23"/>
-          <p:cNvGraphicFramePr>
-            <a:graphicFrameLocks noGrp="1"/>
-          </p:cNvGraphicFramePr>
-          <p:nvPr>
-            <p:extLst>
-              <p:ext uri="{D42A27DB-BD31-4B8C-83A1-F6EECF244321}">
-                <p14:modId xmlns:p14="http://schemas.microsoft.com/office/powerpoint/2010/main" val="2152614554"/>
-              </p:ext>
-            </p:extLst>
-          </p:nvPr>
-        </p:nvGraphicFramePr>
-        <p:xfrm>
-          <a:off x="3367233" y="3341798"/>
-          <a:ext cx="1710943" cy="975832"/>
-        </p:xfrm>
-        <a:graphic>
-          <a:graphicData uri="http://schemas.openxmlformats.org/drawingml/2006/table">
-            <a:tbl>
-              <a:tblPr firstRow="1" bandRow="1">
-                <a:tableStyleId>{72833802-FEF1-4C79-8D5D-14CF1EAF98D9}</a:tableStyleId>
-              </a:tblPr>
-              <a:tblGrid>
-                <a:gridCol w="1710943"/>
-              </a:tblGrid>
-              <a:tr h="321041">
-                <a:tc>
-                  <a:txBody>
-                    <a:bodyPr/>
-                    <a:lstStyle/>
-                    <a:p>
-                      <a:pPr algn="ctr"/>
-                      <a:r>
-                        <a:rPr lang="en-US" sz="1000" dirty="0" smtClean="0"/>
-                        <a:t>Model</a:t>
-                      </a:r>
-                      <a:r>
-                        <a:rPr lang="en-US" sz="1000" baseline="0" dirty="0" smtClean="0"/>
-                        <a:t> structure</a:t>
-                      </a:r>
-                      <a:endParaRPr lang="en-US" sz="1000" dirty="0"/>
-                    </a:p>
-                  </a:txBody>
-                  <a:tcPr marL="118872" marR="118872" marT="73152" marB="73152" anchor="ctr"/>
-                </a:tc>
-              </a:tr>
-              <a:tr h="654791">
-                <a:tc>
-                  <a:txBody>
-                    <a:bodyPr/>
-                    <a:lstStyle/>
-                    <a:p>
-                      <a:pPr marL="171450" indent="-171450">
-                        <a:buFont typeface="Arial"/>
-                        <a:buChar char="•"/>
-                      </a:pPr>
-                      <a:r>
-                        <a:rPr lang="en-US" sz="1000" kern="1200" dirty="0" smtClean="0">
-                          <a:effectLst/>
-                        </a:rPr>
-                        <a:t>Disease model</a:t>
-                      </a:r>
-                    </a:p>
-                    <a:p>
-                      <a:pPr marL="171450" indent="-171450">
-                        <a:buFont typeface="Arial"/>
-                        <a:buChar char="•"/>
-                      </a:pPr>
-                      <a:r>
-                        <a:rPr lang="en-US" sz="1000" kern="1200" dirty="0" smtClean="0">
-                          <a:effectLst/>
-                        </a:rPr>
-                        <a:t>Utility model</a:t>
-                      </a:r>
-                    </a:p>
-                    <a:p>
-                      <a:pPr marL="171450" indent="-171450">
-                        <a:buFont typeface="Arial"/>
-                        <a:buChar char="•"/>
-                      </a:pPr>
-                      <a:r>
-                        <a:rPr lang="en-US" sz="1000" kern="1200" dirty="0" smtClean="0">
-                          <a:effectLst/>
-                        </a:rPr>
-                        <a:t>Cost model</a:t>
-                      </a:r>
-                    </a:p>
-                  </a:txBody>
-                  <a:tcPr marL="118872" marR="118872" marT="73152" marB="73152"/>
-                </a:tc>
-              </a:tr>
-            </a:tbl>
-          </a:graphicData>
-        </a:graphic>
-      </p:graphicFrame>
-      <p:cxnSp>
-        <p:nvCxnSpPr>
-          <p:cNvPr id="27" name="Straight Arrow Connector 26"/>
-          <p:cNvCxnSpPr>
-            <a:stCxn id="24" idx="3"/>
-            <a:endCxn id="28" idx="1"/>
-          </p:cNvCxnSpPr>
-          <p:nvPr/>
-        </p:nvCxnSpPr>
-        <p:spPr>
-          <a:xfrm flipV="1">
-            <a:off x="5078176" y="3826905"/>
-            <a:ext cx="471960" cy="2809"/>
-          </a:xfrm>
-          <a:prstGeom prst="straightConnector1">
-            <a:avLst/>
-          </a:prstGeom>
-          <a:ln w="25400" cap="flat" cmpd="sng" algn="ctr">
-            <a:solidFill>
-              <a:schemeClr val="tx1"/>
-            </a:solidFill>
-            <a:prstDash val="solid"/>
-            <a:round/>
-            <a:headEnd type="none" w="med" len="med"/>
-            <a:tailEnd type="arrow"/>
-          </a:ln>
-          <a:effectLst/>
-        </p:spPr>
-        <p:style>
-          <a:lnRef idx="2">
-            <a:schemeClr val="accent1"/>
-          </a:lnRef>
-          <a:fillRef idx="0">
-            <a:schemeClr val="accent1"/>
-          </a:fillRef>
-          <a:effectRef idx="1">
-            <a:schemeClr val="accent1"/>
-          </a:effectRef>
-          <a:fontRef idx="minor">
-            <a:schemeClr val="tx1"/>
-          </a:fontRef>
-        </p:style>
-      </p:cxnSp>
-      <p:graphicFrame>
-        <p:nvGraphicFramePr>
-          <p:cNvPr id="28" name="Table 27"/>
-          <p:cNvGraphicFramePr>
-            <a:graphicFrameLocks noGrp="1"/>
-          </p:cNvGraphicFramePr>
-          <p:nvPr>
-            <p:extLst>
-              <p:ext uri="{D42A27DB-BD31-4B8C-83A1-F6EECF244321}">
-                <p14:modId xmlns:p14="http://schemas.microsoft.com/office/powerpoint/2010/main" val="2236799608"/>
-              </p:ext>
-            </p:extLst>
-          </p:nvPr>
-        </p:nvGraphicFramePr>
-        <p:xfrm>
-          <a:off x="5550136" y="3338989"/>
-          <a:ext cx="1576187" cy="975832"/>
-        </p:xfrm>
-        <a:graphic>
-          <a:graphicData uri="http://schemas.openxmlformats.org/drawingml/2006/table">
-            <a:tbl>
-              <a:tblPr firstRow="1" bandRow="1">
-                <a:tableStyleId>{72833802-FEF1-4C79-8D5D-14CF1EAF98D9}</a:tableStyleId>
-              </a:tblPr>
-              <a:tblGrid>
-                <a:gridCol w="1576187"/>
-              </a:tblGrid>
-              <a:tr h="321041">
-                <a:tc>
-                  <a:txBody>
-                    <a:bodyPr/>
-                    <a:lstStyle/>
-                    <a:p>
-                      <a:pPr algn="ctr"/>
-                      <a:r>
-                        <a:rPr lang="en-US" sz="1000" dirty="0" smtClean="0"/>
-                        <a:t>Output</a:t>
-                      </a:r>
-                      <a:endParaRPr lang="en-US" sz="1000" dirty="0"/>
-                    </a:p>
-                  </a:txBody>
-                  <a:tcPr marL="118872" marR="118872" marT="73152" marB="73152" anchor="ctr"/>
-                </a:tc>
-              </a:tr>
-              <a:tr h="654791">
-                <a:tc>
-                  <a:txBody>
-                    <a:bodyPr/>
-                    <a:lstStyle/>
-                    <a:p>
-                      <a:pPr marL="171450" indent="-171450">
-                        <a:buFont typeface="Arial"/>
-                        <a:buChar char="•"/>
-                      </a:pPr>
-                      <a:r>
-                        <a:rPr lang="en-US" sz="1000" kern="1200" dirty="0" smtClean="0">
-                          <a:effectLst/>
-                        </a:rPr>
-                        <a:t>Disease</a:t>
-                      </a:r>
-                      <a:r>
-                        <a:rPr lang="en-US" sz="1000" kern="1200" baseline="0" dirty="0" smtClean="0">
-                          <a:effectLst/>
-                        </a:rPr>
-                        <a:t> progression</a:t>
-                      </a:r>
-                      <a:endParaRPr lang="en-US" sz="1000" kern="1200" dirty="0" smtClean="0">
-                        <a:effectLst/>
-                      </a:endParaRPr>
-                    </a:p>
-                    <a:p>
-                      <a:pPr marL="171450" indent="-171450">
-                        <a:buFont typeface="Arial"/>
-                        <a:buChar char="•"/>
-                      </a:pPr>
-                      <a:r>
-                        <a:rPr lang="en-US" sz="1000" kern="1200" dirty="0" smtClean="0">
-                          <a:effectLst/>
-                        </a:rPr>
-                        <a:t>Costs</a:t>
-                      </a:r>
-                    </a:p>
-                    <a:p>
-                      <a:pPr marL="171450" indent="-171450">
-                        <a:buFont typeface="Arial"/>
-                        <a:buChar char="•"/>
-                      </a:pPr>
-                      <a:r>
-                        <a:rPr lang="en-US" sz="1000" kern="1200" dirty="0" smtClean="0">
-                          <a:effectLst/>
-                        </a:rPr>
-                        <a:t>QALYs</a:t>
-                      </a:r>
-                    </a:p>
-                  </a:txBody>
-                  <a:tcPr marL="118872" marR="118872" marT="73152" marB="73152"/>
-                </a:tc>
-              </a:tr>
-            </a:tbl>
-          </a:graphicData>
-        </a:graphic>
-      </p:graphicFrame>
-      <p:graphicFrame>
-        <p:nvGraphicFramePr>
-          <p:cNvPr id="33" name="Table 32"/>
-          <p:cNvGraphicFramePr>
-            <a:graphicFrameLocks noGrp="1"/>
-          </p:cNvGraphicFramePr>
-          <p:nvPr>
-            <p:extLst>
-              <p:ext uri="{D42A27DB-BD31-4B8C-83A1-F6EECF244321}">
-                <p14:modId xmlns:p14="http://schemas.microsoft.com/office/powerpoint/2010/main" val="3514630894"/>
-              </p:ext>
-            </p:extLst>
-          </p:nvPr>
-        </p:nvGraphicFramePr>
-        <p:xfrm>
-          <a:off x="642894" y="4030376"/>
-          <a:ext cx="1591056" cy="902208"/>
-        </p:xfrm>
-        <a:graphic>
-          <a:graphicData uri="http://schemas.openxmlformats.org/drawingml/2006/table">
-            <a:tbl>
-              <a:tblPr firstRow="1" bandRow="1">
-                <a:tableStyleId>{72833802-FEF1-4C79-8D5D-14CF1EAF98D9}</a:tableStyleId>
-              </a:tblPr>
-              <a:tblGrid>
-                <a:gridCol w="1591056"/>
-              </a:tblGrid>
-              <a:tr h="270373">
-                <a:tc>
-                  <a:txBody>
-                    <a:bodyPr/>
-                    <a:lstStyle/>
-                    <a:p>
-                      <a:pPr algn="ctr"/>
-                      <a:r>
-                        <a:rPr lang="en-US" sz="1000" dirty="0" smtClean="0"/>
-                        <a:t>Input data</a:t>
-                      </a:r>
-                      <a:endParaRPr lang="en-US" sz="1000" dirty="0"/>
-                    </a:p>
-                  </a:txBody>
-                  <a:tcPr marL="118872" marR="118872" marT="73152" marB="73152" anchor="ctr"/>
-                </a:tc>
-              </a:tr>
-              <a:tr h="567167">
-                <a:tc>
-                  <a:txBody>
-                    <a:bodyPr/>
-                    <a:lstStyle/>
-                    <a:p>
-                      <a:pPr marL="171450" indent="-171450">
-                        <a:buFont typeface="Arial"/>
-                        <a:buChar char="•"/>
-                      </a:pPr>
-                      <a:r>
-                        <a:rPr lang="en-US" sz="1000" kern="1200" dirty="0" smtClean="0">
-                          <a:effectLst/>
-                        </a:rPr>
-                        <a:t>Treatment</a:t>
-                      </a:r>
-                      <a:r>
-                        <a:rPr lang="en-US" sz="1000" kern="1200" baseline="0" dirty="0" smtClean="0">
-                          <a:effectLst/>
-                        </a:rPr>
-                        <a:t> strategies</a:t>
-                      </a:r>
-                      <a:endParaRPr lang="en-US" sz="1000" kern="1200" dirty="0" smtClean="0">
-                        <a:effectLst/>
-                      </a:endParaRPr>
-                    </a:p>
-                    <a:p>
-                      <a:pPr marL="171450" indent="-171450">
-                        <a:buFont typeface="Arial"/>
-                        <a:buChar char="•"/>
-                      </a:pPr>
-                      <a:r>
-                        <a:rPr lang="en-US" sz="1000" kern="1200" dirty="0" smtClean="0">
-                          <a:effectLst/>
-                        </a:rPr>
-                        <a:t>Patients</a:t>
-                      </a:r>
-                    </a:p>
-                    <a:p>
-                      <a:pPr marL="171450" indent="-171450">
-                        <a:buFont typeface="Arial"/>
-                        <a:buChar char="•"/>
-                      </a:pPr>
-                      <a:r>
-                        <a:rPr lang="en-US" sz="1000" kern="1200" dirty="0" smtClean="0">
-                          <a:effectLst/>
-                        </a:rPr>
-                        <a:t>Health states</a:t>
-                      </a:r>
-                    </a:p>
-                  </a:txBody>
-                  <a:tcPr marL="118872" marR="118872" marT="73152" marB="73152"/>
-                </a:tc>
-              </a:tr>
-            </a:tbl>
-          </a:graphicData>
-        </a:graphic>
-      </p:graphicFrame>
-      <p:graphicFrame>
-        <p:nvGraphicFramePr>
-          <p:cNvPr id="34" name="Table 33"/>
-          <p:cNvGraphicFramePr>
-            <a:graphicFrameLocks noGrp="1"/>
-          </p:cNvGraphicFramePr>
-          <p:nvPr>
-            <p:extLst>
-              <p:ext uri="{D42A27DB-BD31-4B8C-83A1-F6EECF244321}">
-                <p14:modId xmlns:p14="http://schemas.microsoft.com/office/powerpoint/2010/main" val="658932809"/>
-              </p:ext>
-            </p:extLst>
-          </p:nvPr>
-        </p:nvGraphicFramePr>
-        <p:xfrm>
-          <a:off x="625955" y="2800006"/>
-          <a:ext cx="1586727" cy="902208"/>
-        </p:xfrm>
-        <a:graphic>
-          <a:graphicData uri="http://schemas.openxmlformats.org/drawingml/2006/table">
-            <a:tbl>
-              <a:tblPr firstRow="1" bandRow="1">
-                <a:tableStyleId>{72833802-FEF1-4C79-8D5D-14CF1EAF98D9}</a:tableStyleId>
-              </a:tblPr>
-              <a:tblGrid>
-                <a:gridCol w="1586727"/>
-              </a:tblGrid>
-              <a:tr h="270373">
-                <a:tc>
-                  <a:txBody>
-                    <a:bodyPr/>
-                    <a:lstStyle/>
-                    <a:p>
-                      <a:pPr algn="ctr"/>
-                      <a:r>
-                        <a:rPr lang="en-US" sz="1000" dirty="0" smtClean="0"/>
-                        <a:t>Parameter estimates</a:t>
-                      </a:r>
-                      <a:endParaRPr lang="en-US" sz="1000" dirty="0"/>
-                    </a:p>
-                  </a:txBody>
-                  <a:tcPr marL="118872" marR="118872" marT="73152" marB="73152" anchor="ctr"/>
-                </a:tc>
-              </a:tr>
-              <a:tr h="567167">
-                <a:tc>
-                  <a:txBody>
-                    <a:bodyPr/>
-                    <a:lstStyle/>
-                    <a:p>
-                      <a:pPr marL="171450" indent="-171450">
-                        <a:buFont typeface="Arial"/>
-                        <a:buChar char="•"/>
-                      </a:pPr>
-                      <a:r>
-                        <a:rPr lang="en-US" sz="1000" kern="1200" dirty="0" smtClean="0">
-                          <a:effectLst/>
-                        </a:rPr>
-                        <a:t>Survival model</a:t>
-                      </a:r>
-                    </a:p>
-                    <a:p>
-                      <a:pPr marL="171450" indent="-171450">
-                        <a:buFont typeface="Arial"/>
-                        <a:buChar char="•"/>
-                      </a:pPr>
-                      <a:r>
-                        <a:rPr lang="en-US" sz="1000" kern="1200" dirty="0" smtClean="0">
-                          <a:effectLst/>
-                        </a:rPr>
-                        <a:t>Linear model</a:t>
-                      </a:r>
-                    </a:p>
-                    <a:p>
-                      <a:pPr marL="171450" indent="-171450">
-                        <a:buFont typeface="Arial"/>
-                        <a:buChar char="•"/>
-                      </a:pPr>
-                      <a:r>
-                        <a:rPr lang="mr-IN" sz="1000" kern="1200" dirty="0" smtClean="0">
-                          <a:effectLst/>
-                        </a:rPr>
-                        <a:t>…</a:t>
-                      </a:r>
-                      <a:endParaRPr lang="en-US" sz="1000" kern="1200" dirty="0" smtClean="0">
-                        <a:effectLst/>
-                      </a:endParaRPr>
-                    </a:p>
-                  </a:txBody>
-                  <a:tcPr marL="118872" marR="118872" marT="73152" marB="73152"/>
-                </a:tc>
-              </a:tr>
-            </a:tbl>
-          </a:graphicData>
-        </a:graphic>
-      </p:graphicFrame>
       <p:grpSp>
         <p:nvGrpSpPr>
-          <p:cNvPr id="65" name="Group 64"/>
+          <p:cNvPr id="34" name="Group 33"/>
           <p:cNvGrpSpPr/>
           <p:nvPr/>
         </p:nvGrpSpPr>
         <p:grpSpPr>
           <a:xfrm>
-            <a:off x="237070" y="1185603"/>
-            <a:ext cx="11193268" cy="3936290"/>
-            <a:chOff x="237070" y="1185603"/>
-            <a:chExt cx="11193268" cy="3936290"/>
+            <a:off x="965216" y="2026580"/>
+            <a:ext cx="9866786" cy="3614570"/>
+            <a:chOff x="965216" y="2026580"/>
+            <a:chExt cx="9866786" cy="3614570"/>
           </a:xfrm>
         </p:grpSpPr>
-        <p:sp>
-          <p:nvSpPr>
-            <p:cNvPr id="36" name="Rectangle 35"/>
-            <p:cNvSpPr/>
+        <p:grpSp>
+          <p:nvGrpSpPr>
+            <p:cNvPr id="18" name="Group 17"/>
+            <p:cNvGrpSpPr/>
             <p:nvPr/>
-          </p:nvSpPr>
-          <p:spPr>
+          </p:nvGrpSpPr>
+          <p:grpSpPr>
             <a:xfrm>
-              <a:off x="237070" y="2170114"/>
+              <a:off x="965216" y="2029389"/>
+              <a:ext cx="2387676" cy="3608955"/>
+              <a:chOff x="965216" y="2029389"/>
+              <a:chExt cx="2387676" cy="3608955"/>
+            </a:xfrm>
+          </p:grpSpPr>
+          <p:sp>
+            <p:nvSpPr>
+              <p:cNvPr id="21" name="TextBox 20"/>
+              <p:cNvSpPr txBox="1"/>
+              <p:nvPr/>
+            </p:nvSpPr>
+            <p:spPr>
+              <a:xfrm>
+                <a:off x="1472232" y="2029389"/>
+                <a:ext cx="1361360" cy="312854"/>
+              </a:xfrm>
+              <a:prstGeom prst="rect">
+                <a:avLst/>
+              </a:prstGeom>
+              <a:ln/>
+            </p:spPr>
+            <p:style>
+              <a:lnRef idx="2">
+                <a:schemeClr val="accent2"/>
+              </a:lnRef>
+              <a:fillRef idx="1">
+                <a:schemeClr val="lt1"/>
+              </a:fillRef>
+              <a:effectRef idx="0">
+                <a:schemeClr val="accent2"/>
+              </a:effectRef>
+              <a:fontRef idx="minor">
+                <a:schemeClr val="dk1"/>
+              </a:fontRef>
+            </p:style>
+            <p:txBody>
+              <a:bodyPr wrap="none" lIns="0" tIns="0" rIns="0" bIns="0" rtlCol="0" anchor="ctr" anchorCtr="1">
+                <a:noAutofit/>
+              </a:bodyPr>
+              <a:lstStyle/>
+              <a:p>
+                <a:pPr algn="ctr"/>
+                <a:r>
+                  <a:rPr lang="en-US" sz="1000" b="1" dirty="0" smtClean="0">
+                    <a:solidFill>
+                      <a:schemeClr val="accent2"/>
+                    </a:solidFill>
+                  </a:rPr>
+                  <a:t>Estimation data         </a:t>
+                </a:r>
+              </a:p>
+            </p:txBody>
+          </p:sp>
+          <p:grpSp>
+            <p:nvGrpSpPr>
+              <p:cNvPr id="128" name="Group 127"/>
+              <p:cNvGrpSpPr/>
+              <p:nvPr/>
+            </p:nvGrpSpPr>
+            <p:grpSpPr>
+              <a:xfrm>
+                <a:off x="965216" y="2686565"/>
+                <a:ext cx="2387676" cy="2951779"/>
+                <a:chOff x="5452681" y="1684760"/>
+                <a:chExt cx="2387676" cy="2951779"/>
+              </a:xfrm>
+            </p:grpSpPr>
+            <p:sp>
+              <p:nvSpPr>
+                <p:cNvPr id="123" name="TextBox 122"/>
+                <p:cNvSpPr txBox="1"/>
+                <p:nvPr/>
+              </p:nvSpPr>
+              <p:spPr>
+                <a:xfrm>
+                  <a:off x="5681890" y="1797642"/>
+                  <a:ext cx="1952447" cy="220074"/>
+                </a:xfrm>
+                <a:prstGeom prst="rect">
+                  <a:avLst/>
+                </a:prstGeom>
+                <a:noFill/>
+              </p:spPr>
+              <p:txBody>
+                <a:bodyPr wrap="none" lIns="0" tIns="0" rIns="0" bIns="0" rtlCol="0">
+                  <a:noAutofit/>
+                </a:bodyPr>
+                <a:lstStyle/>
+                <a:p>
+                  <a:r>
+                    <a:rPr lang="en-US" sz="1600" b="1" dirty="0"/>
+                    <a:t>1</a:t>
+                  </a:r>
+                  <a:r>
+                    <a:rPr lang="en-US" sz="1600" b="1" dirty="0" smtClean="0"/>
+                    <a:t>. Parameterization</a:t>
+                  </a:r>
+                  <a:endParaRPr lang="en-US" sz="1600" b="1" dirty="0" smtClean="0">
+                    <a:solidFill>
+                      <a:schemeClr val="tx1"/>
+                    </a:solidFill>
+                  </a:endParaRPr>
+                </a:p>
+              </p:txBody>
+            </p:sp>
+            <p:sp>
+              <p:nvSpPr>
+                <p:cNvPr id="124" name="TextBox 123"/>
+                <p:cNvSpPr txBox="1"/>
+                <p:nvPr/>
+              </p:nvSpPr>
+              <p:spPr>
+                <a:xfrm>
+                  <a:off x="5979441" y="2190281"/>
+                  <a:ext cx="1361360" cy="535803"/>
+                </a:xfrm>
+                <a:prstGeom prst="rect">
+                  <a:avLst/>
+                </a:prstGeom>
+                <a:ln>
+                  <a:solidFill>
+                    <a:schemeClr val="accent2"/>
+                  </a:solidFill>
+                </a:ln>
+              </p:spPr>
+              <p:style>
+                <a:lnRef idx="2">
+                  <a:schemeClr val="accent2">
+                    <a:shade val="50000"/>
+                  </a:schemeClr>
+                </a:lnRef>
+                <a:fillRef idx="1">
+                  <a:schemeClr val="accent2"/>
+                </a:fillRef>
+                <a:effectRef idx="0">
+                  <a:schemeClr val="accent2"/>
+                </a:effectRef>
+                <a:fontRef idx="minor">
+                  <a:schemeClr val="lt1"/>
+                </a:fontRef>
+              </p:style>
+              <p:txBody>
+                <a:bodyPr wrap="none" lIns="0" tIns="0" rIns="0" bIns="0" rtlCol="0" anchor="ctr" anchorCtr="1">
+                  <a:noAutofit/>
+                </a:bodyPr>
+                <a:lstStyle/>
+                <a:p>
+                  <a:pPr algn="ctr"/>
+                  <a:r>
+                    <a:rPr lang="en-US" sz="1000" b="1" dirty="0" smtClean="0">
+                      <a:solidFill>
+                        <a:schemeClr val="bg1"/>
+                      </a:solidFill>
+                    </a:rPr>
+                    <a:t>Disease model(s) </a:t>
+                  </a:r>
+                  <a:endParaRPr lang="en-US" sz="1000" b="1" dirty="0" smtClean="0">
+                    <a:solidFill>
+                      <a:srgbClr val="FFFFFF"/>
+                    </a:solidFill>
+                  </a:endParaRPr>
+                </a:p>
+              </p:txBody>
+            </p:sp>
+            <p:sp>
+              <p:nvSpPr>
+                <p:cNvPr id="125" name="TextBox 124"/>
+                <p:cNvSpPr txBox="1"/>
+                <p:nvPr/>
+              </p:nvSpPr>
+              <p:spPr>
+                <a:xfrm>
+                  <a:off x="5976615" y="3019957"/>
+                  <a:ext cx="1361360" cy="535803"/>
+                </a:xfrm>
+                <a:prstGeom prst="rect">
+                  <a:avLst/>
+                </a:prstGeom>
+                <a:ln>
+                  <a:solidFill>
+                    <a:schemeClr val="accent2"/>
+                  </a:solidFill>
+                </a:ln>
+              </p:spPr>
+              <p:style>
+                <a:lnRef idx="2">
+                  <a:schemeClr val="accent2">
+                    <a:shade val="50000"/>
+                  </a:schemeClr>
+                </a:lnRef>
+                <a:fillRef idx="1">
+                  <a:schemeClr val="accent2"/>
+                </a:fillRef>
+                <a:effectRef idx="0">
+                  <a:schemeClr val="accent2"/>
+                </a:effectRef>
+                <a:fontRef idx="minor">
+                  <a:schemeClr val="lt1"/>
+                </a:fontRef>
+              </p:style>
+              <p:txBody>
+                <a:bodyPr wrap="none" lIns="0" tIns="0" rIns="0" bIns="0" rtlCol="0" anchor="ctr" anchorCtr="1">
+                  <a:noAutofit/>
+                </a:bodyPr>
+                <a:lstStyle/>
+                <a:p>
+                  <a:pPr algn="ctr"/>
+                  <a:r>
+                    <a:rPr lang="en-US" sz="1000" b="1" dirty="0" smtClean="0">
+                      <a:solidFill>
+                        <a:schemeClr val="bg1"/>
+                      </a:solidFill>
+                    </a:rPr>
+                    <a:t>Utility model</a:t>
+                  </a:r>
+                  <a:endParaRPr lang="en-US" sz="1000" b="1" dirty="0" smtClean="0">
+                    <a:solidFill>
+                      <a:srgbClr val="FFFFFF"/>
+                    </a:solidFill>
+                  </a:endParaRPr>
+                </a:p>
+              </p:txBody>
+            </p:sp>
+            <p:sp>
+              <p:nvSpPr>
+                <p:cNvPr id="126" name="TextBox 125"/>
+                <p:cNvSpPr txBox="1"/>
+                <p:nvPr/>
+              </p:nvSpPr>
+              <p:spPr>
+                <a:xfrm>
+                  <a:off x="5987898" y="3877852"/>
+                  <a:ext cx="1361360" cy="535803"/>
+                </a:xfrm>
+                <a:prstGeom prst="rect">
+                  <a:avLst/>
+                </a:prstGeom>
+                <a:ln>
+                  <a:solidFill>
+                    <a:schemeClr val="accent2"/>
+                  </a:solidFill>
+                </a:ln>
+              </p:spPr>
+              <p:style>
+                <a:lnRef idx="2">
+                  <a:schemeClr val="accent2">
+                    <a:shade val="50000"/>
+                  </a:schemeClr>
+                </a:lnRef>
+                <a:fillRef idx="1">
+                  <a:schemeClr val="accent2"/>
+                </a:fillRef>
+                <a:effectRef idx="0">
+                  <a:schemeClr val="accent2"/>
+                </a:effectRef>
+                <a:fontRef idx="minor">
+                  <a:schemeClr val="lt1"/>
+                </a:fontRef>
+              </p:style>
+              <p:txBody>
+                <a:bodyPr wrap="none" lIns="0" tIns="0" rIns="0" bIns="0" rtlCol="0" anchor="ctr" anchorCtr="1">
+                  <a:noAutofit/>
+                </a:bodyPr>
+                <a:lstStyle/>
+                <a:p>
+                  <a:pPr algn="ctr"/>
+                  <a:r>
+                    <a:rPr lang="en-US" sz="1000" b="1" dirty="0" smtClean="0">
+                      <a:solidFill>
+                        <a:schemeClr val="bg1"/>
+                      </a:solidFill>
+                    </a:rPr>
+                    <a:t>Cost model(s)</a:t>
+                  </a:r>
+                  <a:endParaRPr lang="en-US" sz="1000" b="1" dirty="0" smtClean="0">
+                    <a:solidFill>
+                      <a:srgbClr val="FFFFFF"/>
+                    </a:solidFill>
+                  </a:endParaRPr>
+                </a:p>
+              </p:txBody>
+            </p:sp>
+            <p:sp>
+              <p:nvSpPr>
+                <p:cNvPr id="127" name="Rectangle 126"/>
+                <p:cNvSpPr/>
+                <p:nvPr/>
+              </p:nvSpPr>
+              <p:spPr>
+                <a:xfrm>
+                  <a:off x="5452681" y="1684760"/>
+                  <a:ext cx="2387676" cy="2951779"/>
+                </a:xfrm>
+                <a:prstGeom prst="rect">
+                  <a:avLst/>
+                </a:prstGeom>
+                <a:noFill/>
+                <a:ln>
+                  <a:solidFill>
+                    <a:schemeClr val="accent2"/>
+                  </a:solidFill>
+                  <a:prstDash val="sysDash"/>
+                </a:ln>
+                <a:effectLst/>
+              </p:spPr>
+              <p:style>
+                <a:lnRef idx="1">
+                  <a:schemeClr val="accent1"/>
+                </a:lnRef>
+                <a:fillRef idx="3">
+                  <a:schemeClr val="accent1"/>
+                </a:fillRef>
+                <a:effectRef idx="2">
+                  <a:schemeClr val="accent1"/>
+                </a:effectRef>
+                <a:fontRef idx="minor">
+                  <a:schemeClr val="lt1"/>
+                </a:fontRef>
+              </p:style>
+              <p:txBody>
+                <a:bodyPr rtlCol="0" anchor="ctr"/>
+                <a:lstStyle/>
+                <a:p>
+                  <a:pPr algn="ctr"/>
+                  <a:endParaRPr lang="en-US"/>
+                </a:p>
+              </p:txBody>
+            </p:sp>
+          </p:grpSp>
+          <p:cxnSp>
+            <p:nvCxnSpPr>
+              <p:cNvPr id="32" name="Straight Arrow Connector 31"/>
+              <p:cNvCxnSpPr>
+                <a:stCxn id="21" idx="2"/>
+                <a:endCxn id="127" idx="0"/>
+              </p:cNvCxnSpPr>
+              <p:nvPr/>
+            </p:nvCxnSpPr>
+            <p:spPr>
+              <a:xfrm>
+                <a:off x="2152912" y="2342243"/>
+                <a:ext cx="6142" cy="344322"/>
+              </a:xfrm>
+              <a:prstGeom prst="straightConnector1">
+                <a:avLst/>
+              </a:prstGeom>
+              <a:ln w="25400" cap="flat" cmpd="sng" algn="ctr">
+                <a:solidFill>
+                  <a:schemeClr val="tx1"/>
+                </a:solidFill>
+                <a:prstDash val="solid"/>
+                <a:round/>
+                <a:headEnd type="none" w="med" len="med"/>
+                <a:tailEnd type="arrow"/>
+              </a:ln>
+              <a:effectLst/>
+            </p:spPr>
+            <p:style>
+              <a:lnRef idx="2">
+                <a:schemeClr val="accent1"/>
+              </a:lnRef>
+              <a:fillRef idx="0">
+                <a:schemeClr val="accent1"/>
+              </a:fillRef>
+              <a:effectRef idx="1">
+                <a:schemeClr val="accent1"/>
+              </a:effectRef>
+              <a:fontRef idx="minor">
+                <a:schemeClr val="tx1"/>
+              </a:fontRef>
+            </p:style>
+          </p:cxnSp>
+        </p:grpSp>
+        <p:grpSp>
+          <p:nvGrpSpPr>
+            <p:cNvPr id="33" name="Group 32"/>
+            <p:cNvGrpSpPr/>
+            <p:nvPr/>
+          </p:nvGrpSpPr>
+          <p:grpSpPr>
+            <a:xfrm>
+              <a:off x="8444326" y="2686564"/>
               <a:ext cx="2387676" cy="2951779"/>
+              <a:chOff x="8444326" y="2686564"/>
+              <a:chExt cx="2387676" cy="2951779"/>
             </a:xfrm>
-            <a:prstGeom prst="rect">
-              <a:avLst/>
-            </a:prstGeom>
-            <a:noFill/>
-            <a:ln>
-              <a:solidFill>
+          </p:grpSpPr>
+          <p:sp>
+            <p:nvSpPr>
+              <p:cNvPr id="54" name="TextBox 53"/>
+              <p:cNvSpPr txBox="1"/>
+              <p:nvPr/>
+            </p:nvSpPr>
+            <p:spPr>
+              <a:xfrm>
+                <a:off x="9095264" y="3570243"/>
+                <a:ext cx="1361360" cy="535803"/>
+              </a:xfrm>
+              <a:prstGeom prst="rect">
+                <a:avLst/>
+              </a:prstGeom>
+              <a:ln>
+                <a:solidFill>
+                  <a:schemeClr val="accent2"/>
+                </a:solidFill>
+              </a:ln>
+            </p:spPr>
+            <p:style>
+              <a:lnRef idx="2">
+                <a:schemeClr val="accent2">
+                  <a:shade val="50000"/>
+                </a:schemeClr>
+              </a:lnRef>
+              <a:fillRef idx="1">
                 <a:schemeClr val="accent2"/>
-              </a:solidFill>
-              <a:prstDash val="sysDash"/>
-            </a:ln>
-            <a:effectLst/>
-          </p:spPr>
-          <p:style>
-            <a:lnRef idx="1">
-              <a:schemeClr val="accent1"/>
-            </a:lnRef>
-            <a:fillRef idx="3">
-              <a:schemeClr val="accent1"/>
-            </a:fillRef>
-            <a:effectRef idx="2">
-              <a:schemeClr val="accent1"/>
-            </a:effectRef>
-            <a:fontRef idx="minor">
-              <a:schemeClr val="lt1"/>
-            </a:fontRef>
-          </p:style>
-          <p:txBody>
-            <a:bodyPr rtlCol="0" anchor="ctr"/>
-            <a:lstStyle/>
-            <a:p>
-              <a:pPr algn="ctr"/>
-              <a:endParaRPr lang="en-US"/>
-            </a:p>
-          </p:txBody>
-        </p:sp>
-        <p:sp>
-          <p:nvSpPr>
-            <p:cNvPr id="16" name="TextBox 15"/>
-            <p:cNvSpPr txBox="1"/>
+              </a:fillRef>
+              <a:effectRef idx="0">
+                <a:schemeClr val="accent2"/>
+              </a:effectRef>
+              <a:fontRef idx="minor">
+                <a:schemeClr val="lt1"/>
+              </a:fontRef>
+            </p:style>
+            <p:txBody>
+              <a:bodyPr wrap="none" lIns="0" tIns="0" rIns="0" bIns="0" rtlCol="0" anchor="ctr" anchorCtr="1">
+                <a:noAutofit/>
+              </a:bodyPr>
+              <a:lstStyle/>
+              <a:p>
+                <a:pPr algn="ctr"/>
+                <a:r>
+                  <a:rPr lang="en-US" sz="1000" b="1" dirty="0" smtClean="0">
+                    <a:solidFill>
+                      <a:schemeClr val="bg1"/>
+                    </a:solidFill>
+                  </a:rPr>
+                  <a:t>CEA</a:t>
+                </a:r>
+                <a:endParaRPr lang="en-US" sz="1000" b="1" dirty="0" smtClean="0">
+                  <a:solidFill>
+                    <a:srgbClr val="FFFFFF"/>
+                  </a:solidFill>
+                </a:endParaRPr>
+              </a:p>
+            </p:txBody>
+          </p:sp>
+          <p:sp>
+            <p:nvSpPr>
+              <p:cNvPr id="55" name="TextBox 54"/>
+              <p:cNvSpPr txBox="1"/>
+              <p:nvPr/>
+            </p:nvSpPr>
+            <p:spPr>
+              <a:xfrm>
+                <a:off x="9106547" y="4569237"/>
+                <a:ext cx="1361360" cy="535803"/>
+              </a:xfrm>
+              <a:prstGeom prst="rect">
+                <a:avLst/>
+              </a:prstGeom>
+              <a:ln>
+                <a:solidFill>
+                  <a:schemeClr val="accent2"/>
+                </a:solidFill>
+              </a:ln>
+            </p:spPr>
+            <p:style>
+              <a:lnRef idx="2">
+                <a:schemeClr val="accent2">
+                  <a:shade val="50000"/>
+                </a:schemeClr>
+              </a:lnRef>
+              <a:fillRef idx="1">
+                <a:schemeClr val="accent2"/>
+              </a:fillRef>
+              <a:effectRef idx="0">
+                <a:schemeClr val="accent2"/>
+              </a:effectRef>
+              <a:fontRef idx="minor">
+                <a:schemeClr val="lt1"/>
+              </a:fontRef>
+            </p:style>
+            <p:txBody>
+              <a:bodyPr wrap="none" lIns="0" tIns="0" rIns="0" bIns="0" rtlCol="0" anchor="ctr" anchorCtr="1">
+                <a:noAutofit/>
+              </a:bodyPr>
+              <a:lstStyle/>
+              <a:p>
+                <a:pPr algn="ctr"/>
+                <a:r>
+                  <a:rPr lang="en-US" sz="1000" b="1" dirty="0" smtClean="0">
+                    <a:solidFill>
+                      <a:srgbClr val="FFFFFF"/>
+                    </a:solidFill>
+                  </a:rPr>
+                  <a:t>MCDA</a:t>
+                </a:r>
+                <a:endParaRPr lang="en-US" sz="1000" b="1" dirty="0" smtClean="0">
+                  <a:solidFill>
+                    <a:srgbClr val="FFFFFF"/>
+                  </a:solidFill>
+                </a:endParaRPr>
+              </a:p>
+            </p:txBody>
+          </p:sp>
+          <p:grpSp>
+            <p:nvGrpSpPr>
+              <p:cNvPr id="41" name="Group 40"/>
+              <p:cNvGrpSpPr/>
+              <p:nvPr/>
+            </p:nvGrpSpPr>
+            <p:grpSpPr>
+              <a:xfrm>
+                <a:off x="8444326" y="2686564"/>
+                <a:ext cx="2387676" cy="2951779"/>
+                <a:chOff x="2280414" y="4721198"/>
+                <a:chExt cx="2387676" cy="2951779"/>
+              </a:xfrm>
+            </p:grpSpPr>
+            <p:sp>
+              <p:nvSpPr>
+                <p:cNvPr id="49" name="TextBox 48"/>
+                <p:cNvSpPr txBox="1"/>
+                <p:nvPr/>
+              </p:nvSpPr>
+              <p:spPr>
+                <a:xfrm>
+                  <a:off x="2509623" y="4848189"/>
+                  <a:ext cx="1980670" cy="318843"/>
+                </a:xfrm>
+                <a:prstGeom prst="rect">
+                  <a:avLst/>
+                </a:prstGeom>
+                <a:noFill/>
+              </p:spPr>
+              <p:txBody>
+                <a:bodyPr wrap="none" lIns="0" tIns="0" rIns="0" bIns="0" rtlCol="0">
+                  <a:noAutofit/>
+                </a:bodyPr>
+                <a:lstStyle/>
+                <a:p>
+                  <a:r>
+                    <a:rPr lang="en-US" sz="1600" b="1" dirty="0"/>
+                    <a:t>3</a:t>
+                  </a:r>
+                  <a:r>
+                    <a:rPr lang="en-US" sz="1600" b="1" dirty="0" smtClean="0"/>
+                    <a:t>. Decision analysis</a:t>
+                  </a:r>
+                  <a:endParaRPr lang="en-US" sz="1600" b="1" dirty="0" smtClean="0">
+                    <a:solidFill>
+                      <a:schemeClr val="tx1"/>
+                    </a:solidFill>
+                  </a:endParaRPr>
+                </a:p>
+              </p:txBody>
+            </p:sp>
+            <p:sp>
+              <p:nvSpPr>
+                <p:cNvPr id="53" name="Rectangle 52"/>
+                <p:cNvSpPr/>
+                <p:nvPr/>
+              </p:nvSpPr>
+              <p:spPr>
+                <a:xfrm>
+                  <a:off x="2280414" y="4721198"/>
+                  <a:ext cx="2387676" cy="2951779"/>
+                </a:xfrm>
+                <a:prstGeom prst="rect">
+                  <a:avLst/>
+                </a:prstGeom>
+                <a:noFill/>
+                <a:ln>
+                  <a:solidFill>
+                    <a:schemeClr val="accent2"/>
+                  </a:solidFill>
+                  <a:prstDash val="sysDash"/>
+                </a:ln>
+                <a:effectLst/>
+              </p:spPr>
+              <p:style>
+                <a:lnRef idx="1">
+                  <a:schemeClr val="accent1"/>
+                </a:lnRef>
+                <a:fillRef idx="3">
+                  <a:schemeClr val="accent1"/>
+                </a:fillRef>
+                <a:effectRef idx="2">
+                  <a:schemeClr val="accent1"/>
+                </a:effectRef>
+                <a:fontRef idx="minor">
+                  <a:schemeClr val="lt1"/>
+                </a:fontRef>
+              </p:style>
+              <p:txBody>
+                <a:bodyPr rtlCol="0" anchor="ctr"/>
+                <a:lstStyle/>
+                <a:p>
+                  <a:pPr algn="ctr"/>
+                  <a:endParaRPr lang="en-US"/>
+                </a:p>
+              </p:txBody>
+            </p:sp>
+          </p:grpSp>
+        </p:grpSp>
+        <p:grpSp>
+          <p:nvGrpSpPr>
+            <p:cNvPr id="19" name="Group 18"/>
+            <p:cNvGrpSpPr/>
             <p:nvPr/>
-          </p:nvSpPr>
-          <p:spPr>
+          </p:nvGrpSpPr>
+          <p:grpSpPr>
             <a:xfrm>
-              <a:off x="741260" y="1185603"/>
-              <a:ext cx="1361360" cy="535803"/>
+              <a:off x="4707598" y="2026580"/>
+              <a:ext cx="2387676" cy="3614570"/>
+              <a:chOff x="4806378" y="2054800"/>
+              <a:chExt cx="2387676" cy="3614570"/>
             </a:xfrm>
-            <a:prstGeom prst="rect">
-              <a:avLst/>
-            </a:prstGeom>
-            <a:ln>
-              <a:solidFill>
+          </p:grpSpPr>
+          <p:grpSp>
+            <p:nvGrpSpPr>
+              <p:cNvPr id="26" name="Group 25"/>
+              <p:cNvGrpSpPr/>
+              <p:nvPr/>
+            </p:nvGrpSpPr>
+            <p:grpSpPr>
+              <a:xfrm>
+                <a:off x="4806378" y="2717591"/>
+                <a:ext cx="2387676" cy="2951779"/>
+                <a:chOff x="2280414" y="4721198"/>
+                <a:chExt cx="2387676" cy="2951779"/>
+              </a:xfrm>
+            </p:grpSpPr>
+            <p:sp>
+              <p:nvSpPr>
+                <p:cNvPr id="27" name="TextBox 26"/>
+                <p:cNvSpPr txBox="1"/>
+                <p:nvPr/>
+              </p:nvSpPr>
+              <p:spPr>
+                <a:xfrm>
+                  <a:off x="2862411" y="4834079"/>
+                  <a:ext cx="1229935" cy="287815"/>
+                </a:xfrm>
+                <a:prstGeom prst="rect">
+                  <a:avLst/>
+                </a:prstGeom>
+                <a:noFill/>
+              </p:spPr>
+              <p:txBody>
+                <a:bodyPr wrap="none" lIns="0" tIns="0" rIns="0" bIns="0" rtlCol="0">
+                  <a:noAutofit/>
+                </a:bodyPr>
+                <a:lstStyle/>
+                <a:p>
+                  <a:r>
+                    <a:rPr lang="en-US" sz="1600" b="1" dirty="0" smtClean="0"/>
+                    <a:t>2. Simulation </a:t>
+                  </a:r>
+                  <a:endParaRPr lang="en-US" sz="1600" b="1" dirty="0" smtClean="0">
+                    <a:solidFill>
+                      <a:schemeClr val="tx1"/>
+                    </a:solidFill>
+                  </a:endParaRPr>
+                </a:p>
+              </p:txBody>
+            </p:sp>
+            <p:sp>
+              <p:nvSpPr>
+                <p:cNvPr id="28" name="TextBox 27"/>
+                <p:cNvSpPr txBox="1"/>
+                <p:nvPr/>
+              </p:nvSpPr>
+              <p:spPr>
+                <a:xfrm>
+                  <a:off x="2807174" y="5226719"/>
+                  <a:ext cx="1361360" cy="535803"/>
+                </a:xfrm>
+                <a:prstGeom prst="rect">
+                  <a:avLst/>
+                </a:prstGeom>
+                <a:ln>
+                  <a:solidFill>
+                    <a:schemeClr val="accent2"/>
+                  </a:solidFill>
+                </a:ln>
+              </p:spPr>
+              <p:style>
+                <a:lnRef idx="2">
+                  <a:schemeClr val="accent2">
+                    <a:shade val="50000"/>
+                  </a:schemeClr>
+                </a:lnRef>
+                <a:fillRef idx="1">
+                  <a:schemeClr val="accent2"/>
+                </a:fillRef>
+                <a:effectRef idx="0">
+                  <a:schemeClr val="accent2"/>
+                </a:effectRef>
+                <a:fontRef idx="minor">
+                  <a:schemeClr val="lt1"/>
+                </a:fontRef>
+              </p:style>
+              <p:txBody>
+                <a:bodyPr wrap="none" lIns="0" tIns="0" rIns="0" bIns="0" rtlCol="0" anchor="ctr" anchorCtr="1">
+                  <a:noAutofit/>
+                </a:bodyPr>
+                <a:lstStyle/>
+                <a:p>
+                  <a:pPr algn="ctr"/>
+                  <a:r>
+                    <a:rPr lang="en-US" sz="1000" b="1" dirty="0" smtClean="0">
+                      <a:solidFill>
+                        <a:schemeClr val="bg1"/>
+                      </a:solidFill>
+                    </a:rPr>
+                    <a:t>Disease model(s) </a:t>
+                  </a:r>
+                  <a:endParaRPr lang="en-US" sz="1000" b="1" dirty="0" smtClean="0">
+                    <a:solidFill>
+                      <a:srgbClr val="FFFFFF"/>
+                    </a:solidFill>
+                  </a:endParaRPr>
+                </a:p>
+              </p:txBody>
+            </p:sp>
+            <p:sp>
+              <p:nvSpPr>
+                <p:cNvPr id="29" name="TextBox 28"/>
+                <p:cNvSpPr txBox="1"/>
+                <p:nvPr/>
+              </p:nvSpPr>
+              <p:spPr>
+                <a:xfrm>
+                  <a:off x="2804348" y="6056395"/>
+                  <a:ext cx="1361360" cy="535803"/>
+                </a:xfrm>
+                <a:prstGeom prst="rect">
+                  <a:avLst/>
+                </a:prstGeom>
+                <a:ln>
+                  <a:solidFill>
+                    <a:schemeClr val="accent2"/>
+                  </a:solidFill>
+                </a:ln>
+              </p:spPr>
+              <p:style>
+                <a:lnRef idx="2">
+                  <a:schemeClr val="accent2">
+                    <a:shade val="50000"/>
+                  </a:schemeClr>
+                </a:lnRef>
+                <a:fillRef idx="1">
+                  <a:schemeClr val="accent2"/>
+                </a:fillRef>
+                <a:effectRef idx="0">
+                  <a:schemeClr val="accent2"/>
+                </a:effectRef>
+                <a:fontRef idx="minor">
+                  <a:schemeClr val="lt1"/>
+                </a:fontRef>
+              </p:style>
+              <p:txBody>
+                <a:bodyPr wrap="none" lIns="0" tIns="0" rIns="0" bIns="0" rtlCol="0" anchor="ctr" anchorCtr="1">
+                  <a:noAutofit/>
+                </a:bodyPr>
+                <a:lstStyle/>
+                <a:p>
+                  <a:pPr algn="ctr"/>
+                  <a:r>
+                    <a:rPr lang="en-US" sz="1000" b="1" dirty="0" smtClean="0">
+                      <a:solidFill>
+                        <a:schemeClr val="bg1"/>
+                      </a:solidFill>
+                    </a:rPr>
+                    <a:t>Utility model</a:t>
+                  </a:r>
+                  <a:endParaRPr lang="en-US" sz="1000" b="1" dirty="0" smtClean="0">
+                    <a:solidFill>
+                      <a:srgbClr val="FFFFFF"/>
+                    </a:solidFill>
+                  </a:endParaRPr>
+                </a:p>
+              </p:txBody>
+            </p:sp>
+            <p:sp>
+              <p:nvSpPr>
+                <p:cNvPr id="30" name="TextBox 29"/>
+                <p:cNvSpPr txBox="1"/>
+                <p:nvPr/>
+              </p:nvSpPr>
+              <p:spPr>
+                <a:xfrm>
+                  <a:off x="2815631" y="6914290"/>
+                  <a:ext cx="1361360" cy="535803"/>
+                </a:xfrm>
+                <a:prstGeom prst="rect">
+                  <a:avLst/>
+                </a:prstGeom>
+                <a:ln>
+                  <a:solidFill>
+                    <a:schemeClr val="accent2"/>
+                  </a:solidFill>
+                </a:ln>
+              </p:spPr>
+              <p:style>
+                <a:lnRef idx="2">
+                  <a:schemeClr val="accent2">
+                    <a:shade val="50000"/>
+                  </a:schemeClr>
+                </a:lnRef>
+                <a:fillRef idx="1">
+                  <a:schemeClr val="accent2"/>
+                </a:fillRef>
+                <a:effectRef idx="0">
+                  <a:schemeClr val="accent2"/>
+                </a:effectRef>
+                <a:fontRef idx="minor">
+                  <a:schemeClr val="lt1"/>
+                </a:fontRef>
+              </p:style>
+              <p:txBody>
+                <a:bodyPr wrap="none" lIns="0" tIns="0" rIns="0" bIns="0" rtlCol="0" anchor="ctr" anchorCtr="1">
+                  <a:noAutofit/>
+                </a:bodyPr>
+                <a:lstStyle/>
+                <a:p>
+                  <a:pPr algn="ctr"/>
+                  <a:r>
+                    <a:rPr lang="en-US" sz="1000" b="1" dirty="0" smtClean="0">
+                      <a:solidFill>
+                        <a:schemeClr val="bg1"/>
+                      </a:solidFill>
+                    </a:rPr>
+                    <a:t>Cost model(s)</a:t>
+                  </a:r>
+                  <a:endParaRPr lang="en-US" sz="1000" b="1" dirty="0" smtClean="0">
+                    <a:solidFill>
+                      <a:srgbClr val="FFFFFF"/>
+                    </a:solidFill>
+                  </a:endParaRPr>
+                </a:p>
+              </p:txBody>
+            </p:sp>
+            <p:sp>
+              <p:nvSpPr>
+                <p:cNvPr id="31" name="Rectangle 30"/>
+                <p:cNvSpPr/>
+                <p:nvPr/>
+              </p:nvSpPr>
+              <p:spPr>
+                <a:xfrm>
+                  <a:off x="2280414" y="4721198"/>
+                  <a:ext cx="2387676" cy="2951779"/>
+                </a:xfrm>
+                <a:prstGeom prst="rect">
+                  <a:avLst/>
+                </a:prstGeom>
+                <a:noFill/>
+                <a:ln>
+                  <a:solidFill>
+                    <a:schemeClr val="accent2"/>
+                  </a:solidFill>
+                  <a:prstDash val="sysDash"/>
+                </a:ln>
+                <a:effectLst/>
+              </p:spPr>
+              <p:style>
+                <a:lnRef idx="1">
+                  <a:schemeClr val="accent1"/>
+                </a:lnRef>
+                <a:fillRef idx="3">
+                  <a:schemeClr val="accent1"/>
+                </a:fillRef>
+                <a:effectRef idx="2">
+                  <a:schemeClr val="accent1"/>
+                </a:effectRef>
+                <a:fontRef idx="minor">
+                  <a:schemeClr val="lt1"/>
+                </a:fontRef>
+              </p:style>
+              <p:txBody>
+                <a:bodyPr rtlCol="0" anchor="ctr"/>
+                <a:lstStyle/>
+                <a:p>
+                  <a:pPr algn="ctr"/>
+                  <a:endParaRPr lang="en-US"/>
+                </a:p>
+              </p:txBody>
+            </p:sp>
+          </p:grpSp>
+          <p:sp>
+            <p:nvSpPr>
+              <p:cNvPr id="57" name="TextBox 56"/>
+              <p:cNvSpPr txBox="1"/>
+              <p:nvPr/>
+            </p:nvSpPr>
+            <p:spPr>
+              <a:xfrm>
+                <a:off x="5321853" y="2054800"/>
+                <a:ext cx="1361360" cy="312854"/>
+              </a:xfrm>
+              <a:prstGeom prst="rect">
+                <a:avLst/>
+              </a:prstGeom>
+              <a:ln/>
+            </p:spPr>
+            <p:style>
+              <a:lnRef idx="2">
                 <a:schemeClr val="accent2"/>
-              </a:solidFill>
-            </a:ln>
-          </p:spPr>
-          <p:style>
-            <a:lnRef idx="2">
-              <a:schemeClr val="accent2">
-                <a:shade val="50000"/>
-              </a:schemeClr>
-            </a:lnRef>
-            <a:fillRef idx="1">
-              <a:schemeClr val="accent2"/>
-            </a:fillRef>
-            <a:effectRef idx="0">
-              <a:schemeClr val="accent2"/>
-            </a:effectRef>
-            <a:fontRef idx="minor">
-              <a:schemeClr val="lt1"/>
-            </a:fontRef>
-          </p:style>
-          <p:txBody>
-            <a:bodyPr wrap="none" lIns="0" tIns="0" rIns="0" bIns="0" rtlCol="0" anchor="ctr" anchorCtr="1">
-              <a:noAutofit/>
-            </a:bodyPr>
-            <a:lstStyle/>
-            <a:p>
-              <a:pPr algn="ctr"/>
-              <a:r>
-                <a:rPr lang="en-US" sz="1000" b="1" dirty="0" smtClean="0">
+              </a:lnRef>
+              <a:fillRef idx="1">
+                <a:schemeClr val="lt1"/>
+              </a:fillRef>
+              <a:effectRef idx="0">
+                <a:schemeClr val="accent2"/>
+              </a:effectRef>
+              <a:fontRef idx="minor">
+                <a:schemeClr val="dk1"/>
+              </a:fontRef>
+            </p:style>
+            <p:txBody>
+              <a:bodyPr wrap="none" lIns="0" tIns="0" rIns="0" bIns="0" rtlCol="0" anchor="ctr" anchorCtr="1">
+                <a:noAutofit/>
+              </a:bodyPr>
+              <a:lstStyle/>
+              <a:p>
+                <a:pPr algn="ctr"/>
+                <a:r>
+                  <a:rPr lang="en-US" sz="1000" b="1" dirty="0" smtClean="0">
+                    <a:solidFill>
+                      <a:schemeClr val="accent2"/>
+                    </a:solidFill>
+                  </a:rPr>
+                  <a:t>Input data         </a:t>
+                </a:r>
+                <a:endParaRPr lang="en-US" sz="1000" b="1" dirty="0" smtClean="0">
                   <a:solidFill>
-                    <a:schemeClr val="bg1"/>
+                    <a:schemeClr val="accent2"/>
                   </a:solidFill>
-                </a:rPr>
-                <a:t>Estimation data         </a:t>
-              </a:r>
-              <a:endParaRPr lang="en-US" sz="1000" b="1" dirty="0" smtClean="0">
+                </a:endParaRPr>
+              </a:p>
+            </p:txBody>
+          </p:sp>
+          <p:cxnSp>
+            <p:nvCxnSpPr>
+              <p:cNvPr id="58" name="Straight Arrow Connector 57"/>
+              <p:cNvCxnSpPr>
+                <a:stCxn id="57" idx="2"/>
+              </p:cNvCxnSpPr>
+              <p:nvPr/>
+            </p:nvCxnSpPr>
+            <p:spPr>
+              <a:xfrm>
+                <a:off x="6002533" y="2367654"/>
+                <a:ext cx="6142" cy="344322"/>
+              </a:xfrm>
+              <a:prstGeom prst="straightConnector1">
+                <a:avLst/>
+              </a:prstGeom>
+              <a:ln w="25400" cap="flat" cmpd="sng" algn="ctr">
                 <a:solidFill>
-                  <a:srgbClr val="FFFFFF"/>
+                  <a:schemeClr val="tx1"/>
                 </a:solidFill>
-              </a:endParaRPr>
-            </a:p>
-          </p:txBody>
-        </p:sp>
-        <p:sp>
-          <p:nvSpPr>
-            <p:cNvPr id="6" name="TextBox 5"/>
-            <p:cNvSpPr txBox="1"/>
-            <p:nvPr/>
-          </p:nvSpPr>
-          <p:spPr>
-            <a:xfrm>
-              <a:off x="4305675" y="2694991"/>
-              <a:ext cx="2089219" cy="310418"/>
-            </a:xfrm>
-            <a:prstGeom prst="rect">
-              <a:avLst/>
-            </a:prstGeom>
-            <a:noFill/>
-          </p:spPr>
-          <p:txBody>
-            <a:bodyPr wrap="none" lIns="0" tIns="0" rIns="0" bIns="0" rtlCol="0">
-              <a:noAutofit/>
-            </a:bodyPr>
-            <a:lstStyle/>
-            <a:p>
-              <a:r>
-                <a:rPr lang="en-US" sz="1600" b="1" dirty="0" smtClean="0">
-                  <a:solidFill>
-                    <a:schemeClr val="tx1"/>
-                  </a:solidFill>
-                </a:rPr>
-                <a:t>2. Economic model</a:t>
-              </a:r>
-            </a:p>
-          </p:txBody>
-        </p:sp>
-        <p:sp>
-          <p:nvSpPr>
-            <p:cNvPr id="31" name="TextBox 30"/>
-            <p:cNvSpPr txBox="1"/>
-            <p:nvPr/>
-          </p:nvSpPr>
-          <p:spPr>
-            <a:xfrm>
-              <a:off x="438054" y="2268886"/>
-              <a:ext cx="1724862" cy="285006"/>
-            </a:xfrm>
-            <a:prstGeom prst="rect">
-              <a:avLst/>
-            </a:prstGeom>
-            <a:noFill/>
-          </p:spPr>
-          <p:txBody>
-            <a:bodyPr wrap="none" lIns="0" tIns="0" rIns="0" bIns="0" rtlCol="0">
-              <a:noAutofit/>
-            </a:bodyPr>
-            <a:lstStyle/>
-            <a:p>
-              <a:r>
-                <a:rPr lang="en-US" sz="1600" b="1" dirty="0"/>
-                <a:t>1</a:t>
-              </a:r>
-              <a:r>
-                <a:rPr lang="en-US" sz="1600" b="1" dirty="0" smtClean="0">
-                  <a:solidFill>
-                    <a:schemeClr val="tx1"/>
-                  </a:solidFill>
-                </a:rPr>
-                <a:t>. Statistical model(s)</a:t>
-              </a:r>
-            </a:p>
-          </p:txBody>
-        </p:sp>
-        <p:sp>
-          <p:nvSpPr>
-            <p:cNvPr id="7" name="Rectangle 6"/>
-            <p:cNvSpPr/>
-            <p:nvPr/>
-          </p:nvSpPr>
-          <p:spPr>
-            <a:xfrm>
-              <a:off x="3160984" y="2596221"/>
-              <a:ext cx="4191123" cy="2088266"/>
-            </a:xfrm>
-            <a:prstGeom prst="rect">
-              <a:avLst/>
-            </a:prstGeom>
-            <a:noFill/>
-            <a:ln>
-              <a:solidFill>
-                <a:schemeClr val="accent2"/>
-              </a:solidFill>
-              <a:prstDash val="sysDash"/>
-            </a:ln>
-            <a:effectLst/>
-          </p:spPr>
-          <p:style>
-            <a:lnRef idx="1">
-              <a:schemeClr val="accent1"/>
-            </a:lnRef>
-            <a:fillRef idx="3">
-              <a:schemeClr val="accent1"/>
-            </a:fillRef>
-            <a:effectRef idx="2">
-              <a:schemeClr val="accent1"/>
-            </a:effectRef>
-            <a:fontRef idx="minor">
-              <a:schemeClr val="lt1"/>
-            </a:fontRef>
-          </p:style>
-          <p:txBody>
-            <a:bodyPr rtlCol="0" anchor="ctr"/>
-            <a:lstStyle/>
-            <a:p>
-              <a:pPr algn="ctr"/>
-              <a:endParaRPr lang="en-US"/>
-            </a:p>
-          </p:txBody>
-        </p:sp>
-        <p:sp>
-          <p:nvSpPr>
-            <p:cNvPr id="35" name="TextBox 34"/>
-            <p:cNvSpPr txBox="1"/>
-            <p:nvPr/>
-          </p:nvSpPr>
-          <p:spPr>
-            <a:xfrm>
-              <a:off x="9840369" y="3482708"/>
-              <a:ext cx="1166625" cy="637382"/>
-            </a:xfrm>
-            <a:prstGeom prst="rect">
-              <a:avLst/>
-            </a:prstGeom>
-            <a:ln>
-              <a:solidFill>
-                <a:schemeClr val="accent2"/>
-              </a:solidFill>
-            </a:ln>
-          </p:spPr>
-          <p:style>
-            <a:lnRef idx="2">
-              <a:schemeClr val="accent2">
-                <a:shade val="50000"/>
-              </a:schemeClr>
-            </a:lnRef>
-            <a:fillRef idx="1">
-              <a:schemeClr val="accent2"/>
-            </a:fillRef>
-            <a:effectRef idx="0">
-              <a:schemeClr val="accent2"/>
-            </a:effectRef>
-            <a:fontRef idx="minor">
-              <a:schemeClr val="lt1"/>
-            </a:fontRef>
-          </p:style>
-          <p:txBody>
-            <a:bodyPr wrap="none" lIns="0" tIns="0" rIns="0" bIns="0" rtlCol="0" anchor="ctr" anchorCtr="1">
-              <a:noAutofit/>
-            </a:bodyPr>
-            <a:lstStyle/>
-            <a:p>
-              <a:pPr algn="ctr"/>
-              <a:r>
-                <a:rPr lang="en-US" sz="1000" b="1" dirty="0" smtClean="0">
-                  <a:solidFill>
-                    <a:schemeClr val="bg1"/>
-                  </a:solidFill>
-                </a:rPr>
-                <a:t>MCDA</a:t>
-              </a:r>
-            </a:p>
-          </p:txBody>
-        </p:sp>
+                <a:prstDash val="solid"/>
+                <a:round/>
+                <a:headEnd type="none" w="med" len="med"/>
+                <a:tailEnd type="arrow"/>
+              </a:ln>
+              <a:effectLst/>
+            </p:spPr>
+            <p:style>
+              <a:lnRef idx="2">
+                <a:schemeClr val="accent1"/>
+              </a:lnRef>
+              <a:fillRef idx="0">
+                <a:schemeClr val="accent1"/>
+              </a:fillRef>
+              <a:effectRef idx="1">
+                <a:schemeClr val="accent1"/>
+              </a:effectRef>
+              <a:fontRef idx="minor">
+                <a:schemeClr val="tx1"/>
+              </a:fontRef>
+            </p:style>
+          </p:cxnSp>
+        </p:grpSp>
         <p:cxnSp>
           <p:nvCxnSpPr>
-            <p:cNvPr id="9" name="Straight Arrow Connector 8"/>
+            <p:cNvPr id="61" name="Straight Arrow Connector 60"/>
             <p:cNvCxnSpPr>
-              <a:stCxn id="16" idx="2"/>
-              <a:endCxn id="36" idx="0"/>
+              <a:stCxn id="127" idx="3"/>
+              <a:endCxn id="31" idx="1"/>
             </p:cNvCxnSpPr>
             <p:nvPr/>
           </p:nvCxnSpPr>
           <p:spPr>
             <a:xfrm>
-              <a:off x="1421940" y="1721406"/>
-              <a:ext cx="8968" cy="448708"/>
+              <a:off x="3352892" y="4162455"/>
+              <a:ext cx="1354706" cy="2806"/>
             </a:xfrm>
             <a:prstGeom prst="straightConnector1">
               <a:avLst/>
@@ -3676,1392 +3956,49 @@
             </a:fontRef>
           </p:style>
         </p:cxnSp>
-        <p:sp>
-          <p:nvSpPr>
-            <p:cNvPr id="49" name="Rectangle 48"/>
-            <p:cNvSpPr/>
+        <p:cxnSp>
+          <p:nvCxnSpPr>
+            <p:cNvPr id="64" name="Straight Arrow Connector 63"/>
+            <p:cNvCxnSpPr>
+              <a:stCxn id="31" idx="3"/>
+              <a:endCxn id="53" idx="1"/>
+            </p:cNvCxnSpPr>
             <p:nvPr/>
-          </p:nvSpPr>
+          </p:nvCxnSpPr>
           <p:spPr>
-            <a:xfrm>
-              <a:off x="7879527" y="2593412"/>
-              <a:ext cx="3550811" cy="2088266"/>
+            <a:xfrm flipV="1">
+              <a:off x="7095274" y="4162454"/>
+              <a:ext cx="1349052" cy="2807"/>
             </a:xfrm>
-            <a:prstGeom prst="rect">
+            <a:prstGeom prst="straightConnector1">
               <a:avLst/>
             </a:prstGeom>
-            <a:noFill/>
-            <a:ln>
+            <a:ln w="25400" cap="flat" cmpd="sng" algn="ctr">
               <a:solidFill>
-                <a:schemeClr val="accent2"/>
+                <a:schemeClr val="tx1"/>
               </a:solidFill>
-              <a:prstDash val="sysDash"/>
+              <a:prstDash val="solid"/>
+              <a:round/>
+              <a:headEnd type="none" w="med" len="med"/>
+              <a:tailEnd type="arrow"/>
             </a:ln>
             <a:effectLst/>
           </p:spPr>
           <p:style>
-            <a:lnRef idx="1">
+            <a:lnRef idx="2">
               <a:schemeClr val="accent1"/>
             </a:lnRef>
-            <a:fillRef idx="3">
+            <a:fillRef idx="0">
               <a:schemeClr val="accent1"/>
             </a:fillRef>
-            <a:effectRef idx="2">
+            <a:effectRef idx="1">
               <a:schemeClr val="accent1"/>
             </a:effectRef>
             <a:fontRef idx="minor">
-              <a:schemeClr val="lt1"/>
+              <a:schemeClr val="tx1"/>
             </a:fontRef>
           </p:style>
-          <p:txBody>
-            <a:bodyPr rtlCol="0" anchor="ctr"/>
-            <a:lstStyle/>
-            <a:p>
-              <a:pPr algn="ctr"/>
-              <a:endParaRPr lang="en-US"/>
-            </a:p>
-          </p:txBody>
-        </p:sp>
-        <p:sp>
-          <p:nvSpPr>
-            <p:cNvPr id="50" name="TextBox 49"/>
-            <p:cNvSpPr txBox="1"/>
-            <p:nvPr/>
-          </p:nvSpPr>
-          <p:spPr>
-            <a:xfrm>
-              <a:off x="8649198" y="2734512"/>
-              <a:ext cx="2089219" cy="310418"/>
-            </a:xfrm>
-            <a:prstGeom prst="rect">
-              <a:avLst/>
-            </a:prstGeom>
-            <a:noFill/>
-          </p:spPr>
-          <p:txBody>
-            <a:bodyPr wrap="none" lIns="0" tIns="0" rIns="0" bIns="0" rtlCol="0">
-              <a:noAutofit/>
-            </a:bodyPr>
-            <a:lstStyle/>
-            <a:p>
-              <a:r>
-                <a:rPr lang="en-US" sz="1600" b="1" dirty="0" smtClean="0">
-                  <a:solidFill>
-                    <a:schemeClr val="tx1"/>
-                  </a:solidFill>
-                </a:rPr>
-                <a:t>3. Decision analysis</a:t>
-              </a:r>
-            </a:p>
-          </p:txBody>
-        </p:sp>
-        <p:sp>
-          <p:nvSpPr>
-            <p:cNvPr id="52" name="TextBox 51"/>
-            <p:cNvSpPr txBox="1"/>
-            <p:nvPr/>
-          </p:nvSpPr>
-          <p:spPr>
-            <a:xfrm>
-              <a:off x="8158270" y="3494009"/>
-              <a:ext cx="1166625" cy="637382"/>
-            </a:xfrm>
-            <a:prstGeom prst="rect">
-              <a:avLst/>
-            </a:prstGeom>
-            <a:ln>
-              <a:solidFill>
-                <a:schemeClr val="accent2"/>
-              </a:solidFill>
-            </a:ln>
-          </p:spPr>
-          <p:style>
-            <a:lnRef idx="2">
-              <a:schemeClr val="accent2">
-                <a:shade val="50000"/>
-              </a:schemeClr>
-            </a:lnRef>
-            <a:fillRef idx="1">
-              <a:schemeClr val="accent2"/>
-            </a:fillRef>
-            <a:effectRef idx="0">
-              <a:schemeClr val="accent2"/>
-            </a:effectRef>
-            <a:fontRef idx="minor">
-              <a:schemeClr val="lt1"/>
-            </a:fontRef>
-          </p:style>
-          <p:txBody>
-            <a:bodyPr wrap="none" lIns="0" tIns="0" rIns="0" bIns="0" rtlCol="0" anchor="ctr" anchorCtr="1">
-              <a:noAutofit/>
-            </a:bodyPr>
-            <a:lstStyle/>
-            <a:p>
-              <a:pPr algn="ctr"/>
-              <a:r>
-                <a:rPr lang="en-US" sz="1000" b="1" dirty="0" smtClean="0">
-                  <a:solidFill>
-                    <a:schemeClr val="bg1"/>
-                  </a:solidFill>
-                </a:rPr>
-                <a:t>CEA</a:t>
-              </a:r>
-            </a:p>
-          </p:txBody>
-        </p:sp>
-      </p:grpSp>
-      <p:cxnSp>
-        <p:nvCxnSpPr>
-          <p:cNvPr id="54" name="Straight Arrow Connector 53"/>
-          <p:cNvCxnSpPr>
-            <a:stCxn id="36" idx="3"/>
-            <a:endCxn id="7" idx="1"/>
-          </p:cNvCxnSpPr>
-          <p:nvPr/>
-        </p:nvCxnSpPr>
-        <p:spPr>
-          <a:xfrm flipV="1">
-            <a:off x="2624746" y="3640354"/>
-            <a:ext cx="536238" cy="5650"/>
-          </a:xfrm>
-          <a:prstGeom prst="straightConnector1">
-            <a:avLst/>
-          </a:prstGeom>
-          <a:ln w="25400" cap="flat" cmpd="sng" algn="ctr">
-            <a:solidFill>
-              <a:schemeClr val="tx1"/>
-            </a:solidFill>
-            <a:prstDash val="solid"/>
-            <a:round/>
-            <a:headEnd type="none" w="med" len="med"/>
-            <a:tailEnd type="arrow"/>
-          </a:ln>
-          <a:effectLst/>
-        </p:spPr>
-        <p:style>
-          <a:lnRef idx="2">
-            <a:schemeClr val="accent1"/>
-          </a:lnRef>
-          <a:fillRef idx="0">
-            <a:schemeClr val="accent1"/>
-          </a:fillRef>
-          <a:effectRef idx="1">
-            <a:schemeClr val="accent1"/>
-          </a:effectRef>
-          <a:fontRef idx="minor">
-            <a:schemeClr val="tx1"/>
-          </a:fontRef>
-        </p:style>
-      </p:cxnSp>
-      <p:cxnSp>
-        <p:nvCxnSpPr>
-          <p:cNvPr id="56" name="Straight Arrow Connector 55"/>
-          <p:cNvCxnSpPr>
-            <a:stCxn id="7" idx="3"/>
-            <a:endCxn id="49" idx="1"/>
-          </p:cNvCxnSpPr>
-          <p:nvPr/>
-        </p:nvCxnSpPr>
-        <p:spPr>
-          <a:xfrm flipV="1">
-            <a:off x="7352107" y="3637545"/>
-            <a:ext cx="527420" cy="2809"/>
-          </a:xfrm>
-          <a:prstGeom prst="straightConnector1">
-            <a:avLst/>
-          </a:prstGeom>
-          <a:ln w="25400" cap="flat" cmpd="sng" algn="ctr">
-            <a:solidFill>
-              <a:schemeClr val="tx1"/>
-            </a:solidFill>
-            <a:prstDash val="solid"/>
-            <a:round/>
-            <a:headEnd type="none" w="med" len="med"/>
-            <a:tailEnd type="arrow"/>
-          </a:ln>
-          <a:effectLst/>
-        </p:spPr>
-        <p:style>
-          <a:lnRef idx="2">
-            <a:schemeClr val="accent1"/>
-          </a:lnRef>
-          <a:fillRef idx="0">
-            <a:schemeClr val="accent1"/>
-          </a:fillRef>
-          <a:effectRef idx="1">
-            <a:schemeClr val="accent1"/>
-          </a:effectRef>
-          <a:fontRef idx="minor">
-            <a:schemeClr val="tx1"/>
-          </a:fontRef>
-        </p:style>
-      </p:cxnSp>
-    </p:spTree>
-    <p:extLst>
-      <p:ext uri="{BB962C8B-B14F-4D97-AF65-F5344CB8AC3E}">
-        <p14:creationId xmlns:p14="http://schemas.microsoft.com/office/powerpoint/2010/main" val="2133624557"/>
-      </p:ext>
-    </p:extLst>
-  </p:cSld>
-  <p:clrMapOvr>
-    <a:masterClrMapping/>
-  </p:clrMapOvr>
-  <p:timing>
-    <p:tnLst>
-      <p:par>
-        <p:cTn xmlns:p14="http://schemas.microsoft.com/office/powerpoint/2010/main" id="1" dur="indefinite" restart="never" nodeType="tmRoot"/>
-      </p:par>
-    </p:tnLst>
-  </p:timing>
-</p:sld>
-</file>
-
-<file path=ppt/slides/slide3.xml><?xml version="1.0" encoding="utf-8"?>
-<p:sld xmlns:a="http://schemas.openxmlformats.org/drawingml/2006/main" xmlns:r="http://schemas.openxmlformats.org/officeDocument/2006/relationships" xmlns:p="http://schemas.openxmlformats.org/presentationml/2006/main">
-  <p:cSld>
-    <p:spTree>
-      <p:nvGrpSpPr>
-        <p:cNvPr id="1" name=""/>
-        <p:cNvGrpSpPr/>
-        <p:nvPr/>
-      </p:nvGrpSpPr>
-      <p:grpSpPr>
-        <a:xfrm>
-          <a:off x="0" y="0"/>
-          <a:ext cx="0" cy="0"/>
-          <a:chOff x="0" y="0"/>
-          <a:chExt cx="0" cy="0"/>
-        </a:xfrm>
-      </p:grpSpPr>
-      <p:cxnSp>
-        <p:nvCxnSpPr>
-          <p:cNvPr id="10" name="Elbow Connector 9">
-            <a:extLst>
-              <a:ext uri="{FF2B5EF4-FFF2-40B4-BE49-F238E27FC236}">
-                <a16:creationId xmlns="" xmlns:a16="http://schemas.microsoft.com/office/drawing/2014/main" id="{78955D2A-0645-9E4F-A488-02ABF000BB63}"/>
-              </a:ext>
-            </a:extLst>
-          </p:cNvPr>
-          <p:cNvCxnSpPr>
-            <a:cxnSpLocks/>
-          </p:cNvCxnSpPr>
-          <p:nvPr/>
-        </p:nvCxnSpPr>
-        <p:spPr>
-          <a:xfrm>
-            <a:off x="1994514" y="26182296"/>
-            <a:ext cx="712362" cy="1023780"/>
-          </a:xfrm>
-          <a:prstGeom prst="bentConnector3">
-            <a:avLst>
-              <a:gd name="adj1" fmla="val 50000"/>
-            </a:avLst>
-          </a:prstGeom>
-          <a:ln w="22225" cap="flat" cmpd="sng" algn="ctr">
-            <a:solidFill>
-              <a:schemeClr val="tx1"/>
-            </a:solidFill>
-            <a:prstDash val="solid"/>
-            <a:round/>
-            <a:headEnd type="none" w="med" len="med"/>
-            <a:tailEnd type="arrow"/>
-          </a:ln>
-          <a:effectLst/>
-        </p:spPr>
-        <p:style>
-          <a:lnRef idx="2">
-            <a:schemeClr val="accent1"/>
-          </a:lnRef>
-          <a:fillRef idx="0">
-            <a:schemeClr val="accent1"/>
-          </a:fillRef>
-          <a:effectRef idx="1">
-            <a:schemeClr val="accent1"/>
-          </a:effectRef>
-          <a:fontRef idx="minor">
-            <a:schemeClr val="tx1"/>
-          </a:fontRef>
-        </p:style>
-      </p:cxnSp>
-      <p:graphicFrame>
-        <p:nvGraphicFramePr>
-          <p:cNvPr id="47" name="Table 46"/>
-          <p:cNvGraphicFramePr>
-            <a:graphicFrameLocks noGrp="1"/>
-          </p:cNvGraphicFramePr>
-          <p:nvPr>
-            <p:extLst>
-              <p:ext uri="{D42A27DB-BD31-4B8C-83A1-F6EECF244321}">
-                <p14:modId xmlns:p14="http://schemas.microsoft.com/office/powerpoint/2010/main" val="2722197402"/>
-              </p:ext>
-            </p:extLst>
-          </p:nvPr>
-        </p:nvGraphicFramePr>
-        <p:xfrm>
-          <a:off x="247772" y="5756840"/>
-          <a:ext cx="1591056" cy="902208"/>
-        </p:xfrm>
-        <a:graphic>
-          <a:graphicData uri="http://schemas.openxmlformats.org/drawingml/2006/table">
-            <a:tbl>
-              <a:tblPr firstRow="1" bandRow="1">
-                <a:tableStyleId>{72833802-FEF1-4C79-8D5D-14CF1EAF98D9}</a:tableStyleId>
-              </a:tblPr>
-              <a:tblGrid>
-                <a:gridCol w="1591056"/>
-              </a:tblGrid>
-              <a:tr h="265429">
-                <a:tc>
-                  <a:txBody>
-                    <a:bodyPr/>
-                    <a:lstStyle/>
-                    <a:p>
-                      <a:pPr algn="ctr"/>
-                      <a:r>
-                        <a:rPr lang="en-US" sz="1000" dirty="0" smtClean="0"/>
-                        <a:t>Input data</a:t>
-                      </a:r>
-                      <a:endParaRPr lang="en-US" sz="1000" dirty="0"/>
-                    </a:p>
-                  </a:txBody>
-                  <a:tcPr marL="118872" marR="118872" marT="73152" marB="73152" anchor="ctr"/>
-                </a:tc>
-              </a:tr>
-              <a:tr h="567167">
-                <a:tc>
-                  <a:txBody>
-                    <a:bodyPr/>
-                    <a:lstStyle/>
-                    <a:p>
-                      <a:pPr marL="171450" indent="-171450">
-                        <a:buFont typeface="Arial"/>
-                        <a:buChar char="•"/>
-                      </a:pPr>
-                      <a:r>
-                        <a:rPr lang="en-US" sz="1000" kern="1200" dirty="0" smtClean="0">
-                          <a:effectLst/>
-                        </a:rPr>
-                        <a:t>Treatment</a:t>
-                      </a:r>
-                      <a:r>
-                        <a:rPr lang="en-US" sz="1000" kern="1200" baseline="0" dirty="0" smtClean="0">
-                          <a:effectLst/>
-                        </a:rPr>
-                        <a:t> strategies</a:t>
-                      </a:r>
-                      <a:endParaRPr lang="en-US" sz="1000" kern="1200" dirty="0" smtClean="0">
-                        <a:effectLst/>
-                      </a:endParaRPr>
-                    </a:p>
-                    <a:p>
-                      <a:pPr marL="171450" indent="-171450">
-                        <a:buFont typeface="Arial"/>
-                        <a:buChar char="•"/>
-                      </a:pPr>
-                      <a:r>
-                        <a:rPr lang="en-US" sz="1000" kern="1200" dirty="0" smtClean="0">
-                          <a:effectLst/>
-                        </a:rPr>
-                        <a:t>Patients</a:t>
-                      </a:r>
-                    </a:p>
-                    <a:p>
-                      <a:pPr marL="171450" indent="-171450">
-                        <a:buFont typeface="Arial"/>
-                        <a:buChar char="•"/>
-                      </a:pPr>
-                      <a:r>
-                        <a:rPr lang="en-US" sz="1000" kern="1200" dirty="0" smtClean="0">
-                          <a:effectLst/>
-                        </a:rPr>
-                        <a:t>Health states</a:t>
-                      </a:r>
-                    </a:p>
-                  </a:txBody>
-                  <a:tcPr marL="118872" marR="118872" marT="73152" marB="73152"/>
-                </a:tc>
-              </a:tr>
-            </a:tbl>
-          </a:graphicData>
-        </a:graphic>
-      </p:graphicFrame>
-      <p:cxnSp>
-        <p:nvCxnSpPr>
-          <p:cNvPr id="99" name="Straight Arrow Connector 98"/>
-          <p:cNvCxnSpPr>
-            <a:stCxn id="127" idx="2"/>
-            <a:endCxn id="46" idx="0"/>
-          </p:cNvCxnSpPr>
-          <p:nvPr/>
-        </p:nvCxnSpPr>
-        <p:spPr>
-          <a:xfrm>
-            <a:off x="3471426" y="4354342"/>
-            <a:ext cx="2826" cy="366856"/>
-          </a:xfrm>
-          <a:prstGeom prst="straightConnector1">
-            <a:avLst/>
-          </a:prstGeom>
-          <a:ln w="25400" cap="flat" cmpd="sng" algn="ctr">
-            <a:solidFill>
-              <a:schemeClr val="tx1"/>
-            </a:solidFill>
-            <a:prstDash val="solid"/>
-            <a:round/>
-            <a:headEnd type="none" w="med" len="med"/>
-            <a:tailEnd type="arrow"/>
-          </a:ln>
-          <a:effectLst/>
-        </p:spPr>
-        <p:style>
-          <a:lnRef idx="2">
-            <a:schemeClr val="accent1"/>
-          </a:lnRef>
-          <a:fillRef idx="0">
-            <a:schemeClr val="accent1"/>
-          </a:fillRef>
-          <a:effectRef idx="1">
-            <a:schemeClr val="accent1"/>
-          </a:effectRef>
-          <a:fontRef idx="minor">
-            <a:schemeClr val="tx1"/>
-          </a:fontRef>
-        </p:style>
-      </p:cxnSp>
-      <p:sp>
-        <p:nvSpPr>
-          <p:cNvPr id="21" name="TextBox 20"/>
-          <p:cNvSpPr txBox="1"/>
-          <p:nvPr/>
-        </p:nvSpPr>
-        <p:spPr>
-          <a:xfrm>
-            <a:off x="413868" y="2720773"/>
-            <a:ext cx="1361360" cy="312854"/>
-          </a:xfrm>
-          <a:prstGeom prst="rect">
-            <a:avLst/>
-          </a:prstGeom>
-          <a:ln/>
-        </p:spPr>
-        <p:style>
-          <a:lnRef idx="2">
-            <a:schemeClr val="accent2"/>
-          </a:lnRef>
-          <a:fillRef idx="1">
-            <a:schemeClr val="lt1"/>
-          </a:fillRef>
-          <a:effectRef idx="0">
-            <a:schemeClr val="accent2"/>
-          </a:effectRef>
-          <a:fontRef idx="minor">
-            <a:schemeClr val="dk1"/>
-          </a:fontRef>
-        </p:style>
-        <p:txBody>
-          <a:bodyPr wrap="none" lIns="0" tIns="0" rIns="0" bIns="0" rtlCol="0" anchor="ctr" anchorCtr="1">
-            <a:noAutofit/>
-          </a:bodyPr>
-          <a:lstStyle/>
-          <a:p>
-            <a:pPr algn="ctr"/>
-            <a:r>
-              <a:rPr lang="en-US" sz="1000" b="1" dirty="0" smtClean="0">
-                <a:solidFill>
-                  <a:schemeClr val="accent2"/>
-                </a:solidFill>
-              </a:rPr>
-              <a:t>Estimation data         </a:t>
-            </a:r>
-          </a:p>
-        </p:txBody>
-      </p:sp>
-      <p:cxnSp>
-        <p:nvCxnSpPr>
-          <p:cNvPr id="40" name="Straight Arrow Connector 39"/>
-          <p:cNvCxnSpPr>
-            <a:stCxn id="21" idx="3"/>
-            <a:endCxn id="127" idx="1"/>
-          </p:cNvCxnSpPr>
-          <p:nvPr/>
-        </p:nvCxnSpPr>
-        <p:spPr>
-          <a:xfrm>
-            <a:off x="1775228" y="2877200"/>
-            <a:ext cx="502360" cy="1253"/>
-          </a:xfrm>
-          <a:prstGeom prst="straightConnector1">
-            <a:avLst/>
-          </a:prstGeom>
-          <a:ln w="25400" cap="flat" cmpd="sng" algn="ctr">
-            <a:solidFill>
-              <a:schemeClr val="tx1"/>
-            </a:solidFill>
-            <a:prstDash val="solid"/>
-            <a:round/>
-            <a:headEnd type="none" w="med" len="med"/>
-            <a:tailEnd type="arrow"/>
-          </a:ln>
-          <a:effectLst/>
-        </p:spPr>
-        <p:style>
-          <a:lnRef idx="2">
-            <a:schemeClr val="accent1"/>
-          </a:lnRef>
-          <a:fillRef idx="0">
-            <a:schemeClr val="accent1"/>
-          </a:fillRef>
-          <a:effectRef idx="1">
-            <a:schemeClr val="accent1"/>
-          </a:effectRef>
-          <a:fontRef idx="minor">
-            <a:schemeClr val="tx1"/>
-          </a:fontRef>
-        </p:style>
-      </p:cxnSp>
-      <p:grpSp>
-        <p:nvGrpSpPr>
-          <p:cNvPr id="137" name="Group 136"/>
-          <p:cNvGrpSpPr/>
-          <p:nvPr/>
-        </p:nvGrpSpPr>
-        <p:grpSpPr>
-          <a:xfrm>
-            <a:off x="2280414" y="4721198"/>
-            <a:ext cx="2387676" cy="2951779"/>
-            <a:chOff x="2280414" y="4721198"/>
-            <a:chExt cx="2387676" cy="2951779"/>
-          </a:xfrm>
-        </p:grpSpPr>
-        <p:sp>
-          <p:nvSpPr>
-            <p:cNvPr id="42" name="TextBox 41"/>
-            <p:cNvSpPr txBox="1"/>
-            <p:nvPr/>
-          </p:nvSpPr>
-          <p:spPr>
-            <a:xfrm>
-              <a:off x="2862411" y="4834079"/>
-              <a:ext cx="1229935" cy="287815"/>
-            </a:xfrm>
-            <a:prstGeom prst="rect">
-              <a:avLst/>
-            </a:prstGeom>
-            <a:noFill/>
-          </p:spPr>
-          <p:txBody>
-            <a:bodyPr wrap="none" lIns="0" tIns="0" rIns="0" bIns="0" rtlCol="0">
-              <a:noAutofit/>
-            </a:bodyPr>
-            <a:lstStyle/>
-            <a:p>
-              <a:r>
-                <a:rPr lang="en-US" sz="1600" b="1" dirty="0" smtClean="0"/>
-                <a:t>2. </a:t>
-              </a:r>
-              <a:r>
-                <a:rPr lang="en-US" sz="1600" b="1" dirty="0" smtClean="0"/>
-                <a:t>Simulation </a:t>
-              </a:r>
-              <a:endParaRPr lang="en-US" sz="1600" b="1" dirty="0" smtClean="0">
-                <a:solidFill>
-                  <a:schemeClr val="tx1"/>
-                </a:solidFill>
-              </a:endParaRPr>
-            </a:p>
-          </p:txBody>
-        </p:sp>
-        <p:sp>
-          <p:nvSpPr>
-            <p:cNvPr id="43" name="TextBox 42"/>
-            <p:cNvSpPr txBox="1"/>
-            <p:nvPr/>
-          </p:nvSpPr>
-          <p:spPr>
-            <a:xfrm>
-              <a:off x="2807174" y="5226719"/>
-              <a:ext cx="1361360" cy="535803"/>
-            </a:xfrm>
-            <a:prstGeom prst="rect">
-              <a:avLst/>
-            </a:prstGeom>
-            <a:ln>
-              <a:solidFill>
-                <a:schemeClr val="accent2"/>
-              </a:solidFill>
-            </a:ln>
-          </p:spPr>
-          <p:style>
-            <a:lnRef idx="2">
-              <a:schemeClr val="accent2">
-                <a:shade val="50000"/>
-              </a:schemeClr>
-            </a:lnRef>
-            <a:fillRef idx="1">
-              <a:schemeClr val="accent2"/>
-            </a:fillRef>
-            <a:effectRef idx="0">
-              <a:schemeClr val="accent2"/>
-            </a:effectRef>
-            <a:fontRef idx="minor">
-              <a:schemeClr val="lt1"/>
-            </a:fontRef>
-          </p:style>
-          <p:txBody>
-            <a:bodyPr wrap="none" lIns="0" tIns="0" rIns="0" bIns="0" rtlCol="0" anchor="ctr" anchorCtr="1">
-              <a:noAutofit/>
-            </a:bodyPr>
-            <a:lstStyle/>
-            <a:p>
-              <a:pPr algn="ctr"/>
-              <a:r>
-                <a:rPr lang="en-US" sz="1000" b="1" dirty="0" smtClean="0">
-                  <a:solidFill>
-                    <a:schemeClr val="bg1"/>
-                  </a:solidFill>
-                </a:rPr>
-                <a:t>Disease model(s) </a:t>
-              </a:r>
-              <a:endParaRPr lang="en-US" sz="1000" b="1" dirty="0" smtClean="0">
-                <a:solidFill>
-                  <a:srgbClr val="FFFFFF"/>
-                </a:solidFill>
-              </a:endParaRPr>
-            </a:p>
-          </p:txBody>
-        </p:sp>
-        <p:sp>
-          <p:nvSpPr>
-            <p:cNvPr id="44" name="TextBox 43"/>
-            <p:cNvSpPr txBox="1"/>
-            <p:nvPr/>
-          </p:nvSpPr>
-          <p:spPr>
-            <a:xfrm>
-              <a:off x="2804348" y="6056395"/>
-              <a:ext cx="1361360" cy="535803"/>
-            </a:xfrm>
-            <a:prstGeom prst="rect">
-              <a:avLst/>
-            </a:prstGeom>
-            <a:ln>
-              <a:solidFill>
-                <a:schemeClr val="accent2"/>
-              </a:solidFill>
-            </a:ln>
-          </p:spPr>
-          <p:style>
-            <a:lnRef idx="2">
-              <a:schemeClr val="accent2">
-                <a:shade val="50000"/>
-              </a:schemeClr>
-            </a:lnRef>
-            <a:fillRef idx="1">
-              <a:schemeClr val="accent2"/>
-            </a:fillRef>
-            <a:effectRef idx="0">
-              <a:schemeClr val="accent2"/>
-            </a:effectRef>
-            <a:fontRef idx="minor">
-              <a:schemeClr val="lt1"/>
-            </a:fontRef>
-          </p:style>
-          <p:txBody>
-            <a:bodyPr wrap="none" lIns="0" tIns="0" rIns="0" bIns="0" rtlCol="0" anchor="ctr" anchorCtr="1">
-              <a:noAutofit/>
-            </a:bodyPr>
-            <a:lstStyle/>
-            <a:p>
-              <a:pPr algn="ctr"/>
-              <a:r>
-                <a:rPr lang="en-US" sz="1000" b="1" dirty="0" smtClean="0">
-                  <a:solidFill>
-                    <a:schemeClr val="bg1"/>
-                  </a:solidFill>
-                </a:rPr>
-                <a:t>Utility model</a:t>
-              </a:r>
-              <a:endParaRPr lang="en-US" sz="1000" b="1" dirty="0" smtClean="0">
-                <a:solidFill>
-                  <a:srgbClr val="FFFFFF"/>
-                </a:solidFill>
-              </a:endParaRPr>
-            </a:p>
-          </p:txBody>
-        </p:sp>
-        <p:sp>
-          <p:nvSpPr>
-            <p:cNvPr id="45" name="TextBox 44"/>
-            <p:cNvSpPr txBox="1"/>
-            <p:nvPr/>
-          </p:nvSpPr>
-          <p:spPr>
-            <a:xfrm>
-              <a:off x="2815631" y="6914290"/>
-              <a:ext cx="1361360" cy="535803"/>
-            </a:xfrm>
-            <a:prstGeom prst="rect">
-              <a:avLst/>
-            </a:prstGeom>
-            <a:ln>
-              <a:solidFill>
-                <a:schemeClr val="accent2"/>
-              </a:solidFill>
-            </a:ln>
-          </p:spPr>
-          <p:style>
-            <a:lnRef idx="2">
-              <a:schemeClr val="accent2">
-                <a:shade val="50000"/>
-              </a:schemeClr>
-            </a:lnRef>
-            <a:fillRef idx="1">
-              <a:schemeClr val="accent2"/>
-            </a:fillRef>
-            <a:effectRef idx="0">
-              <a:schemeClr val="accent2"/>
-            </a:effectRef>
-            <a:fontRef idx="minor">
-              <a:schemeClr val="lt1"/>
-            </a:fontRef>
-          </p:style>
-          <p:txBody>
-            <a:bodyPr wrap="none" lIns="0" tIns="0" rIns="0" bIns="0" rtlCol="0" anchor="ctr" anchorCtr="1">
-              <a:noAutofit/>
-            </a:bodyPr>
-            <a:lstStyle/>
-            <a:p>
-              <a:pPr algn="ctr"/>
-              <a:r>
-                <a:rPr lang="en-US" sz="1000" b="1" dirty="0" smtClean="0">
-                  <a:solidFill>
-                    <a:schemeClr val="bg1"/>
-                  </a:solidFill>
-                </a:rPr>
-                <a:t>Cost model(s)</a:t>
-              </a:r>
-              <a:endParaRPr lang="en-US" sz="1000" b="1" dirty="0" smtClean="0">
-                <a:solidFill>
-                  <a:srgbClr val="FFFFFF"/>
-                </a:solidFill>
-              </a:endParaRPr>
-            </a:p>
-          </p:txBody>
-        </p:sp>
-        <p:sp>
-          <p:nvSpPr>
-            <p:cNvPr id="46" name="Rectangle 45"/>
-            <p:cNvSpPr/>
-            <p:nvPr/>
-          </p:nvSpPr>
-          <p:spPr>
-            <a:xfrm>
-              <a:off x="2280414" y="4721198"/>
-              <a:ext cx="2387676" cy="2951779"/>
-            </a:xfrm>
-            <a:prstGeom prst="rect">
-              <a:avLst/>
-            </a:prstGeom>
-            <a:noFill/>
-            <a:ln>
-              <a:solidFill>
-                <a:schemeClr val="accent2"/>
-              </a:solidFill>
-              <a:prstDash val="sysDash"/>
-            </a:ln>
-            <a:effectLst/>
-          </p:spPr>
-          <p:style>
-            <a:lnRef idx="1">
-              <a:schemeClr val="accent1"/>
-            </a:lnRef>
-            <a:fillRef idx="3">
-              <a:schemeClr val="accent1"/>
-            </a:fillRef>
-            <a:effectRef idx="2">
-              <a:schemeClr val="accent1"/>
-            </a:effectRef>
-            <a:fontRef idx="minor">
-              <a:schemeClr val="lt1"/>
-            </a:fontRef>
-          </p:style>
-          <p:txBody>
-            <a:bodyPr rtlCol="0" anchor="ctr"/>
-            <a:lstStyle/>
-            <a:p>
-              <a:pPr algn="ctr"/>
-              <a:endParaRPr lang="en-US"/>
-            </a:p>
-          </p:txBody>
-        </p:sp>
-      </p:grpSp>
-      <p:cxnSp>
-        <p:nvCxnSpPr>
-          <p:cNvPr id="48" name="Straight Arrow Connector 47"/>
-          <p:cNvCxnSpPr>
-            <a:stCxn id="47" idx="3"/>
-            <a:endCxn id="46" idx="1"/>
-          </p:cNvCxnSpPr>
-          <p:nvPr/>
-        </p:nvCxnSpPr>
-        <p:spPr>
-          <a:xfrm flipV="1">
-            <a:off x="1852939" y="6197088"/>
-            <a:ext cx="427475" cy="10856"/>
-          </a:xfrm>
-          <a:prstGeom prst="straightConnector1">
-            <a:avLst/>
-          </a:prstGeom>
-          <a:ln w="25400" cap="flat" cmpd="sng" algn="ctr">
-            <a:solidFill>
-              <a:schemeClr val="tx1"/>
-            </a:solidFill>
-            <a:prstDash val="solid"/>
-            <a:round/>
-            <a:headEnd type="none" w="med" len="med"/>
-            <a:tailEnd type="arrow"/>
-          </a:ln>
-          <a:effectLst/>
-        </p:spPr>
-        <p:style>
-          <a:lnRef idx="2">
-            <a:schemeClr val="accent1"/>
-          </a:lnRef>
-          <a:fillRef idx="0">
-            <a:schemeClr val="accent1"/>
-          </a:fillRef>
-          <a:effectRef idx="1">
-            <a:schemeClr val="accent1"/>
-          </a:effectRef>
-          <a:fontRef idx="minor">
-            <a:schemeClr val="tx1"/>
-          </a:fontRef>
-        </p:style>
-      </p:cxnSp>
-      <p:grpSp>
-        <p:nvGrpSpPr>
-          <p:cNvPr id="136" name="Group 135"/>
-          <p:cNvGrpSpPr/>
-          <p:nvPr/>
-        </p:nvGrpSpPr>
-        <p:grpSpPr>
-          <a:xfrm>
-            <a:off x="5170112" y="5531082"/>
-            <a:ext cx="3198024" cy="1326331"/>
-            <a:chOff x="5254781" y="5531082"/>
-            <a:chExt cx="3198024" cy="1326331"/>
-          </a:xfrm>
-        </p:grpSpPr>
-        <p:sp>
-          <p:nvSpPr>
-            <p:cNvPr id="69" name="TextBox 68"/>
-            <p:cNvSpPr txBox="1"/>
-            <p:nvPr/>
-          </p:nvSpPr>
-          <p:spPr>
-            <a:xfrm>
-              <a:off x="5505302" y="5963242"/>
-              <a:ext cx="1166625" cy="637382"/>
-            </a:xfrm>
-            <a:prstGeom prst="rect">
-              <a:avLst/>
-            </a:prstGeom>
-            <a:ln>
-              <a:solidFill>
-                <a:schemeClr val="accent2"/>
-              </a:solidFill>
-            </a:ln>
-          </p:spPr>
-          <p:style>
-            <a:lnRef idx="2">
-              <a:schemeClr val="accent2">
-                <a:shade val="50000"/>
-              </a:schemeClr>
-            </a:lnRef>
-            <a:fillRef idx="1">
-              <a:schemeClr val="accent2"/>
-            </a:fillRef>
-            <a:effectRef idx="0">
-              <a:schemeClr val="accent2"/>
-            </a:effectRef>
-            <a:fontRef idx="minor">
-              <a:schemeClr val="lt1"/>
-            </a:fontRef>
-          </p:style>
-          <p:txBody>
-            <a:bodyPr wrap="none" lIns="0" tIns="0" rIns="0" bIns="0" rtlCol="0" anchor="ctr" anchorCtr="1">
-              <a:noAutofit/>
-            </a:bodyPr>
-            <a:lstStyle/>
-            <a:p>
-              <a:pPr algn="ctr"/>
-              <a:r>
-                <a:rPr lang="en-US" sz="1000" b="1" dirty="0" smtClean="0">
-                  <a:solidFill>
-                    <a:schemeClr val="bg1"/>
-                  </a:solidFill>
-                </a:rPr>
-                <a:t>CEA</a:t>
-              </a:r>
-            </a:p>
-          </p:txBody>
-        </p:sp>
-        <p:sp>
-          <p:nvSpPr>
-            <p:cNvPr id="70" name="TextBox 69"/>
-            <p:cNvSpPr txBox="1"/>
-            <p:nvPr/>
-          </p:nvSpPr>
-          <p:spPr>
-            <a:xfrm>
-              <a:off x="7018064" y="5966052"/>
-              <a:ext cx="1166625" cy="637382"/>
-            </a:xfrm>
-            <a:prstGeom prst="rect">
-              <a:avLst/>
-            </a:prstGeom>
-            <a:ln>
-              <a:solidFill>
-                <a:schemeClr val="accent2"/>
-              </a:solidFill>
-            </a:ln>
-          </p:spPr>
-          <p:style>
-            <a:lnRef idx="2">
-              <a:schemeClr val="accent2">
-                <a:shade val="50000"/>
-              </a:schemeClr>
-            </a:lnRef>
-            <a:fillRef idx="1">
-              <a:schemeClr val="accent2"/>
-            </a:fillRef>
-            <a:effectRef idx="0">
-              <a:schemeClr val="accent2"/>
-            </a:effectRef>
-            <a:fontRef idx="minor">
-              <a:schemeClr val="lt1"/>
-            </a:fontRef>
-          </p:style>
-          <p:txBody>
-            <a:bodyPr wrap="none" lIns="0" tIns="0" rIns="0" bIns="0" rtlCol="0" anchor="ctr" anchorCtr="1">
-              <a:noAutofit/>
-            </a:bodyPr>
-            <a:lstStyle/>
-            <a:p>
-              <a:pPr algn="ctr"/>
-              <a:r>
-                <a:rPr lang="en-US" sz="1000" b="1" dirty="0" smtClean="0">
-                  <a:solidFill>
-                    <a:schemeClr val="bg1"/>
-                  </a:solidFill>
-                </a:rPr>
-                <a:t>MCDA</a:t>
-              </a:r>
-            </a:p>
-          </p:txBody>
-        </p:sp>
-        <p:sp>
-          <p:nvSpPr>
-            <p:cNvPr id="71" name="TextBox 70"/>
-            <p:cNvSpPr txBox="1"/>
-            <p:nvPr/>
-          </p:nvSpPr>
-          <p:spPr>
-            <a:xfrm>
-              <a:off x="5897449" y="5584714"/>
-              <a:ext cx="2089219" cy="310418"/>
-            </a:xfrm>
-            <a:prstGeom prst="rect">
-              <a:avLst/>
-            </a:prstGeom>
-            <a:noFill/>
-          </p:spPr>
-          <p:txBody>
-            <a:bodyPr wrap="none" lIns="0" tIns="0" rIns="0" bIns="0" rtlCol="0">
-              <a:noAutofit/>
-            </a:bodyPr>
-            <a:lstStyle/>
-            <a:p>
-              <a:r>
-                <a:rPr lang="en-US" sz="1600" b="1" dirty="0" smtClean="0">
-                  <a:solidFill>
-                    <a:schemeClr val="tx1"/>
-                  </a:solidFill>
-                </a:rPr>
-                <a:t>3. Decision analysis</a:t>
-              </a:r>
-            </a:p>
-          </p:txBody>
-        </p:sp>
-        <p:sp>
-          <p:nvSpPr>
-            <p:cNvPr id="68" name="Rectangle 67"/>
-            <p:cNvSpPr/>
-            <p:nvPr/>
-          </p:nvSpPr>
-          <p:spPr>
-            <a:xfrm>
-              <a:off x="5254781" y="5531082"/>
-              <a:ext cx="3198024" cy="1326331"/>
-            </a:xfrm>
-            <a:prstGeom prst="rect">
-              <a:avLst/>
-            </a:prstGeom>
-            <a:noFill/>
-            <a:ln>
-              <a:solidFill>
-                <a:schemeClr val="accent2"/>
-              </a:solidFill>
-              <a:prstDash val="sysDash"/>
-            </a:ln>
-            <a:effectLst/>
-          </p:spPr>
-          <p:style>
-            <a:lnRef idx="1">
-              <a:schemeClr val="accent1"/>
-            </a:lnRef>
-            <a:fillRef idx="3">
-              <a:schemeClr val="accent1"/>
-            </a:fillRef>
-            <a:effectRef idx="2">
-              <a:schemeClr val="accent1"/>
-            </a:effectRef>
-            <a:fontRef idx="minor">
-              <a:schemeClr val="lt1"/>
-            </a:fontRef>
-          </p:style>
-          <p:txBody>
-            <a:bodyPr rtlCol="0" anchor="ctr"/>
-            <a:lstStyle/>
-            <a:p>
-              <a:pPr algn="ctr"/>
-              <a:endParaRPr lang="en-US"/>
-            </a:p>
-          </p:txBody>
-        </p:sp>
-      </p:grpSp>
-      <p:cxnSp>
-        <p:nvCxnSpPr>
-          <p:cNvPr id="72" name="Straight Arrow Connector 71"/>
-          <p:cNvCxnSpPr>
-            <a:stCxn id="46" idx="3"/>
-            <a:endCxn id="68" idx="1"/>
-          </p:cNvCxnSpPr>
-          <p:nvPr/>
-        </p:nvCxnSpPr>
-        <p:spPr>
-          <a:xfrm flipV="1">
-            <a:off x="4668090" y="6194248"/>
-            <a:ext cx="502022" cy="2840"/>
-          </a:xfrm>
-          <a:prstGeom prst="straightConnector1">
-            <a:avLst/>
-          </a:prstGeom>
-          <a:ln w="25400" cap="flat" cmpd="sng" algn="ctr">
-            <a:solidFill>
-              <a:schemeClr val="tx1"/>
-            </a:solidFill>
-            <a:prstDash val="solid"/>
-            <a:round/>
-            <a:headEnd type="none" w="med" len="med"/>
-            <a:tailEnd type="arrow"/>
-          </a:ln>
-          <a:effectLst/>
-        </p:spPr>
-        <p:style>
-          <a:lnRef idx="2">
-            <a:schemeClr val="accent1"/>
-          </a:lnRef>
-          <a:fillRef idx="0">
-            <a:schemeClr val="accent1"/>
-          </a:fillRef>
-          <a:effectRef idx="1">
-            <a:schemeClr val="accent1"/>
-          </a:effectRef>
-          <a:fontRef idx="minor">
-            <a:schemeClr val="tx1"/>
-          </a:fontRef>
-        </p:style>
-      </p:cxnSp>
-      <p:grpSp>
-        <p:nvGrpSpPr>
-          <p:cNvPr id="128" name="Group 127"/>
-          <p:cNvGrpSpPr/>
-          <p:nvPr/>
-        </p:nvGrpSpPr>
-        <p:grpSpPr>
-          <a:xfrm>
-            <a:off x="2277588" y="1402563"/>
-            <a:ext cx="2387676" cy="2951779"/>
-            <a:chOff x="5452681" y="1684760"/>
-            <a:chExt cx="2387676" cy="2951779"/>
-          </a:xfrm>
-        </p:grpSpPr>
-        <p:sp>
-          <p:nvSpPr>
-            <p:cNvPr id="123" name="TextBox 122"/>
-            <p:cNvSpPr txBox="1"/>
-            <p:nvPr/>
-          </p:nvSpPr>
-          <p:spPr>
-            <a:xfrm>
-              <a:off x="5681890" y="1797642"/>
-              <a:ext cx="1952447" cy="220074"/>
-            </a:xfrm>
-            <a:prstGeom prst="rect">
-              <a:avLst/>
-            </a:prstGeom>
-            <a:noFill/>
-          </p:spPr>
-          <p:txBody>
-            <a:bodyPr wrap="none" lIns="0" tIns="0" rIns="0" bIns="0" rtlCol="0">
-              <a:noAutofit/>
-            </a:bodyPr>
-            <a:lstStyle/>
-            <a:p>
-              <a:r>
-                <a:rPr lang="en-US" sz="1600" b="1" dirty="0"/>
-                <a:t>1</a:t>
-              </a:r>
-              <a:r>
-                <a:rPr lang="en-US" sz="1600" b="1" dirty="0" smtClean="0"/>
-                <a:t>. </a:t>
-              </a:r>
-              <a:r>
-                <a:rPr lang="en-US" sz="1600" b="1" dirty="0" smtClean="0"/>
-                <a:t>Parameterization</a:t>
-              </a:r>
-              <a:endParaRPr lang="en-US" sz="1600" b="1" dirty="0" smtClean="0">
-                <a:solidFill>
-                  <a:schemeClr val="tx1"/>
-                </a:solidFill>
-              </a:endParaRPr>
-            </a:p>
-          </p:txBody>
-        </p:sp>
-        <p:sp>
-          <p:nvSpPr>
-            <p:cNvPr id="124" name="TextBox 123"/>
-            <p:cNvSpPr txBox="1"/>
-            <p:nvPr/>
-          </p:nvSpPr>
-          <p:spPr>
-            <a:xfrm>
-              <a:off x="5979441" y="2190281"/>
-              <a:ext cx="1361360" cy="535803"/>
-            </a:xfrm>
-            <a:prstGeom prst="rect">
-              <a:avLst/>
-            </a:prstGeom>
-            <a:ln>
-              <a:solidFill>
-                <a:schemeClr val="accent2"/>
-              </a:solidFill>
-            </a:ln>
-          </p:spPr>
-          <p:style>
-            <a:lnRef idx="2">
-              <a:schemeClr val="accent2">
-                <a:shade val="50000"/>
-              </a:schemeClr>
-            </a:lnRef>
-            <a:fillRef idx="1">
-              <a:schemeClr val="accent2"/>
-            </a:fillRef>
-            <a:effectRef idx="0">
-              <a:schemeClr val="accent2"/>
-            </a:effectRef>
-            <a:fontRef idx="minor">
-              <a:schemeClr val="lt1"/>
-            </a:fontRef>
-          </p:style>
-          <p:txBody>
-            <a:bodyPr wrap="none" lIns="0" tIns="0" rIns="0" bIns="0" rtlCol="0" anchor="ctr" anchorCtr="1">
-              <a:noAutofit/>
-            </a:bodyPr>
-            <a:lstStyle/>
-            <a:p>
-              <a:pPr algn="ctr"/>
-              <a:r>
-                <a:rPr lang="en-US" sz="1000" b="1" dirty="0" smtClean="0">
-                  <a:solidFill>
-                    <a:schemeClr val="bg1"/>
-                  </a:solidFill>
-                </a:rPr>
-                <a:t>Disease model(s) </a:t>
-              </a:r>
-              <a:endParaRPr lang="en-US" sz="1000" b="1" dirty="0" smtClean="0">
-                <a:solidFill>
-                  <a:srgbClr val="FFFFFF"/>
-                </a:solidFill>
-              </a:endParaRPr>
-            </a:p>
-          </p:txBody>
-        </p:sp>
-        <p:sp>
-          <p:nvSpPr>
-            <p:cNvPr id="125" name="TextBox 124"/>
-            <p:cNvSpPr txBox="1"/>
-            <p:nvPr/>
-          </p:nvSpPr>
-          <p:spPr>
-            <a:xfrm>
-              <a:off x="5976615" y="3019957"/>
-              <a:ext cx="1361360" cy="535803"/>
-            </a:xfrm>
-            <a:prstGeom prst="rect">
-              <a:avLst/>
-            </a:prstGeom>
-            <a:ln>
-              <a:solidFill>
-                <a:schemeClr val="accent2"/>
-              </a:solidFill>
-            </a:ln>
-          </p:spPr>
-          <p:style>
-            <a:lnRef idx="2">
-              <a:schemeClr val="accent2">
-                <a:shade val="50000"/>
-              </a:schemeClr>
-            </a:lnRef>
-            <a:fillRef idx="1">
-              <a:schemeClr val="accent2"/>
-            </a:fillRef>
-            <a:effectRef idx="0">
-              <a:schemeClr val="accent2"/>
-            </a:effectRef>
-            <a:fontRef idx="minor">
-              <a:schemeClr val="lt1"/>
-            </a:fontRef>
-          </p:style>
-          <p:txBody>
-            <a:bodyPr wrap="none" lIns="0" tIns="0" rIns="0" bIns="0" rtlCol="0" anchor="ctr" anchorCtr="1">
-              <a:noAutofit/>
-            </a:bodyPr>
-            <a:lstStyle/>
-            <a:p>
-              <a:pPr algn="ctr"/>
-              <a:r>
-                <a:rPr lang="en-US" sz="1000" b="1" dirty="0" smtClean="0">
-                  <a:solidFill>
-                    <a:schemeClr val="bg1"/>
-                  </a:solidFill>
-                </a:rPr>
-                <a:t>Utility model</a:t>
-              </a:r>
-              <a:endParaRPr lang="en-US" sz="1000" b="1" dirty="0" smtClean="0">
-                <a:solidFill>
-                  <a:srgbClr val="FFFFFF"/>
-                </a:solidFill>
-              </a:endParaRPr>
-            </a:p>
-          </p:txBody>
-        </p:sp>
-        <p:sp>
-          <p:nvSpPr>
-            <p:cNvPr id="126" name="TextBox 125"/>
-            <p:cNvSpPr txBox="1"/>
-            <p:nvPr/>
-          </p:nvSpPr>
-          <p:spPr>
-            <a:xfrm>
-              <a:off x="5987898" y="3877852"/>
-              <a:ext cx="1361360" cy="535803"/>
-            </a:xfrm>
-            <a:prstGeom prst="rect">
-              <a:avLst/>
-            </a:prstGeom>
-            <a:ln>
-              <a:solidFill>
-                <a:schemeClr val="accent2"/>
-              </a:solidFill>
-            </a:ln>
-          </p:spPr>
-          <p:style>
-            <a:lnRef idx="2">
-              <a:schemeClr val="accent2">
-                <a:shade val="50000"/>
-              </a:schemeClr>
-            </a:lnRef>
-            <a:fillRef idx="1">
-              <a:schemeClr val="accent2"/>
-            </a:fillRef>
-            <a:effectRef idx="0">
-              <a:schemeClr val="accent2"/>
-            </a:effectRef>
-            <a:fontRef idx="minor">
-              <a:schemeClr val="lt1"/>
-            </a:fontRef>
-          </p:style>
-          <p:txBody>
-            <a:bodyPr wrap="none" lIns="0" tIns="0" rIns="0" bIns="0" rtlCol="0" anchor="ctr" anchorCtr="1">
-              <a:noAutofit/>
-            </a:bodyPr>
-            <a:lstStyle/>
-            <a:p>
-              <a:pPr algn="ctr"/>
-              <a:r>
-                <a:rPr lang="en-US" sz="1000" b="1" dirty="0" smtClean="0">
-                  <a:solidFill>
-                    <a:schemeClr val="bg1"/>
-                  </a:solidFill>
-                </a:rPr>
-                <a:t>Cost model(s)</a:t>
-              </a:r>
-              <a:endParaRPr lang="en-US" sz="1000" b="1" dirty="0" smtClean="0">
-                <a:solidFill>
-                  <a:srgbClr val="FFFFFF"/>
-                </a:solidFill>
-              </a:endParaRPr>
-            </a:p>
-          </p:txBody>
-        </p:sp>
-        <p:sp>
-          <p:nvSpPr>
-            <p:cNvPr id="127" name="Rectangle 126"/>
-            <p:cNvSpPr/>
-            <p:nvPr/>
-          </p:nvSpPr>
-          <p:spPr>
-            <a:xfrm>
-              <a:off x="5452681" y="1684760"/>
-              <a:ext cx="2387676" cy="2951779"/>
-            </a:xfrm>
-            <a:prstGeom prst="rect">
-              <a:avLst/>
-            </a:prstGeom>
-            <a:noFill/>
-            <a:ln>
-              <a:solidFill>
-                <a:schemeClr val="accent2"/>
-              </a:solidFill>
-              <a:prstDash val="sysDash"/>
-            </a:ln>
-            <a:effectLst/>
-          </p:spPr>
-          <p:style>
-            <a:lnRef idx="1">
-              <a:schemeClr val="accent1"/>
-            </a:lnRef>
-            <a:fillRef idx="3">
-              <a:schemeClr val="accent1"/>
-            </a:fillRef>
-            <a:effectRef idx="2">
-              <a:schemeClr val="accent1"/>
-            </a:effectRef>
-            <a:fontRef idx="minor">
-              <a:schemeClr val="lt1"/>
-            </a:fontRef>
-          </p:style>
-          <p:txBody>
-            <a:bodyPr rtlCol="0" anchor="ctr"/>
-            <a:lstStyle/>
-            <a:p>
-              <a:pPr algn="ctr"/>
-              <a:endParaRPr lang="en-US"/>
-            </a:p>
-          </p:txBody>
-        </p:sp>
+        </p:cxnSp>
       </p:grpSp>
     </p:spTree>
     <p:extLst>

</xml_diff>

<commit_message>
Update documentation, primarily by adding a vignette for CTSTMs
</commit_message>
<xml_diff>
--- a/vignettes/figures.pptx
+++ b/vignettes/figures.pptx
@@ -5,14 +5,15 @@
     <p:sldMasterId id="2147483648" r:id="rId1"/>
   </p:sldMasterIdLst>
   <p:notesMasterIdLst>
-    <p:notesMasterId r:id="rId4"/>
+    <p:notesMasterId r:id="rId5"/>
   </p:notesMasterIdLst>
   <p:handoutMasterIdLst>
-    <p:handoutMasterId r:id="rId5"/>
+    <p:handoutMasterId r:id="rId6"/>
   </p:handoutMasterIdLst>
   <p:sldIdLst>
     <p:sldId id="305" r:id="rId2"/>
     <p:sldId id="308" r:id="rId3"/>
+    <p:sldId id="310" r:id="rId4"/>
   </p:sldIdLst>
   <p:sldSz cx="11887200" cy="8229600"/>
   <p:notesSz cx="6858000" cy="9144000"/>
@@ -251,7 +252,7 @@
               <a:rPr lang="en-US" smtClean="0">
                 <a:latin typeface="Helvetica"/>
               </a:rPr>
-              <a:t>11/17/18</a:t>
+              <a:t>3/11/19</a:t>
             </a:fld>
             <a:endParaRPr lang="en-US" dirty="0">
               <a:latin typeface="Helvetica"/>
@@ -430,7 +431,7 @@
             <a:fld id="{9BBF7E23-A315-CF44-AB07-C8184967DF75}" type="datetimeFigureOut">
               <a:rPr lang="en-US" smtClean="0"/>
               <a:pPr/>
-              <a:t>11/17/18</a:t>
+              <a:t>3/11/19</a:t>
             </a:fld>
             <a:endParaRPr lang="en-US" dirty="0"/>
           </a:p>
@@ -3321,7 +3322,7 @@
             </p:nvSpPr>
             <p:spPr>
               <a:xfrm>
-                <a:off x="9095264" y="3570243"/>
+                <a:off x="8954149" y="3570243"/>
                 <a:ext cx="1361360" cy="535803"/>
               </a:xfrm>
               <a:prstGeom prst="rect">
@@ -3380,7 +3381,7 @@
             </p:nvSpPr>
             <p:spPr>
               <a:xfrm>
-                <a:off x="9106547" y="4569237"/>
+                <a:off x="8965433" y="4569237"/>
                 <a:ext cx="1361360" cy="535803"/>
               </a:xfrm>
               <a:prstGeom prst="rect">
@@ -3423,11 +3424,6 @@
                   </a:rPr>
                   <a:t>MCDA</a:t>
                 </a:r>
-                <a:endParaRPr lang="en-US" sz="1000" b="1" dirty="0" smtClean="0">
-                  <a:solidFill>
-                    <a:srgbClr val="FFFFFF"/>
-                  </a:solidFill>
-                </a:endParaRPr>
               </a:p>
             </p:txBody>
           </p:sp>
@@ -3862,11 +3858,6 @@
                   </a:rPr>
                   <a:t>Input data         </a:t>
                 </a:r>
-                <a:endParaRPr lang="en-US" sz="1000" b="1" dirty="0" smtClean="0">
-                  <a:solidFill>
-                    <a:schemeClr val="accent2"/>
-                  </a:solidFill>
-                </a:endParaRPr>
               </a:p>
             </p:txBody>
           </p:sp>
@@ -4004,6 +3995,669 @@
     <p:extLst>
       <p:ext uri="{BB962C8B-B14F-4D97-AF65-F5344CB8AC3E}">
         <p14:creationId xmlns:p14="http://schemas.microsoft.com/office/powerpoint/2010/main" val="3050014883"/>
+      </p:ext>
+    </p:extLst>
+  </p:cSld>
+  <p:clrMapOvr>
+    <a:masterClrMapping/>
+  </p:clrMapOvr>
+  <p:timing>
+    <p:tnLst>
+      <p:par>
+        <p:cTn xmlns:p14="http://schemas.microsoft.com/office/powerpoint/2010/main" id="1" dur="indefinite" restart="never" nodeType="tmRoot"/>
+      </p:par>
+    </p:tnLst>
+  </p:timing>
+</p:sld>
+</file>
+
+<file path=ppt/slides/slide3.xml><?xml version="1.0" encoding="utf-8"?>
+<p:sld xmlns:a="http://schemas.openxmlformats.org/drawingml/2006/main" xmlns:r="http://schemas.openxmlformats.org/officeDocument/2006/relationships" xmlns:p="http://schemas.openxmlformats.org/presentationml/2006/main">
+  <p:cSld>
+    <p:spTree>
+      <p:nvGrpSpPr>
+        <p:cNvPr id="1" name=""/>
+        <p:cNvGrpSpPr/>
+        <p:nvPr/>
+      </p:nvGrpSpPr>
+      <p:grpSpPr>
+        <a:xfrm>
+          <a:off x="0" y="0"/>
+          <a:ext cx="0" cy="0"/>
+          <a:chOff x="0" y="0"/>
+          <a:chExt cx="0" cy="0"/>
+        </a:xfrm>
+      </p:grpSpPr>
+      <p:cxnSp>
+        <p:nvCxnSpPr>
+          <p:cNvPr id="10" name="Elbow Connector 9">
+            <a:extLst>
+              <a:ext uri="{FF2B5EF4-FFF2-40B4-BE49-F238E27FC236}">
+                <a16:creationId xmlns:a16="http://schemas.microsoft.com/office/drawing/2014/main" xmlns="" id="{78955D2A-0645-9E4F-A488-02ABF000BB63}"/>
+              </a:ext>
+            </a:extLst>
+          </p:cNvPr>
+          <p:cNvCxnSpPr>
+            <a:cxnSpLocks/>
+          </p:cNvCxnSpPr>
+          <p:nvPr/>
+        </p:nvCxnSpPr>
+        <p:spPr>
+          <a:xfrm>
+            <a:off x="3229746" y="26168186"/>
+            <a:ext cx="712362" cy="1023780"/>
+          </a:xfrm>
+          <a:prstGeom prst="bentConnector3">
+            <a:avLst>
+              <a:gd name="adj1" fmla="val 50000"/>
+            </a:avLst>
+          </a:prstGeom>
+          <a:ln w="22225" cap="flat" cmpd="sng" algn="ctr">
+            <a:solidFill>
+              <a:schemeClr val="tx1"/>
+            </a:solidFill>
+            <a:prstDash val="solid"/>
+            <a:round/>
+            <a:headEnd type="none" w="med" len="med"/>
+            <a:tailEnd type="arrow"/>
+          </a:ln>
+          <a:effectLst/>
+        </p:spPr>
+        <p:style>
+          <a:lnRef idx="2">
+            <a:schemeClr val="accent1"/>
+          </a:lnRef>
+          <a:fillRef idx="0">
+            <a:schemeClr val="accent1"/>
+          </a:fillRef>
+          <a:effectRef idx="1">
+            <a:schemeClr val="accent1"/>
+          </a:effectRef>
+          <a:fontRef idx="minor">
+            <a:schemeClr val="tx1"/>
+          </a:fontRef>
+        </p:style>
+      </p:cxnSp>
+      <p:grpSp>
+        <p:nvGrpSpPr>
+          <p:cNvPr id="48" name="Group 47"/>
+          <p:cNvGrpSpPr/>
+          <p:nvPr/>
+        </p:nvGrpSpPr>
+        <p:grpSpPr>
+          <a:xfrm>
+            <a:off x="1569065" y="2370466"/>
+            <a:ext cx="7815103" cy="3484545"/>
+            <a:chOff x="1569065" y="2370466"/>
+            <a:chExt cx="7815103" cy="3484545"/>
+          </a:xfrm>
+        </p:grpSpPr>
+        <p:grpSp>
+          <p:nvGrpSpPr>
+            <p:cNvPr id="42" name="Group 41"/>
+            <p:cNvGrpSpPr/>
+            <p:nvPr/>
+          </p:nvGrpSpPr>
+          <p:grpSpPr>
+            <a:xfrm>
+              <a:off x="1569065" y="2511932"/>
+              <a:ext cx="7815103" cy="3343079"/>
+              <a:chOff x="2669764" y="2540152"/>
+              <a:chExt cx="6016689" cy="2573768"/>
+            </a:xfrm>
+          </p:grpSpPr>
+          <p:sp>
+            <p:nvSpPr>
+              <p:cNvPr id="3" name="TextBox 2"/>
+              <p:cNvSpPr txBox="1"/>
+              <p:nvPr/>
+            </p:nvSpPr>
+            <p:spPr>
+              <a:xfrm>
+                <a:off x="2669764" y="2540152"/>
+                <a:ext cx="2333178" cy="597176"/>
+              </a:xfrm>
+              <a:prstGeom prst="rect">
+                <a:avLst/>
+              </a:prstGeom>
+              <a:ln>
+                <a:solidFill>
+                  <a:schemeClr val="accent2"/>
+                </a:solidFill>
+              </a:ln>
+            </p:spPr>
+            <p:style>
+              <a:lnRef idx="2">
+                <a:schemeClr val="accent2">
+                  <a:shade val="50000"/>
+                </a:schemeClr>
+              </a:lnRef>
+              <a:fillRef idx="1">
+                <a:schemeClr val="accent2"/>
+              </a:fillRef>
+              <a:effectRef idx="0">
+                <a:schemeClr val="accent2"/>
+              </a:effectRef>
+              <a:fontRef idx="minor">
+                <a:schemeClr val="lt1"/>
+              </a:fontRef>
+            </p:style>
+            <p:txBody>
+              <a:bodyPr wrap="none" lIns="0" tIns="0" rIns="0" bIns="0" rtlCol="0" anchor="ctr" anchorCtr="1">
+                <a:noAutofit/>
+              </a:bodyPr>
+              <a:lstStyle/>
+              <a:p>
+                <a:r>
+                  <a:rPr lang="en-US" sz="2000" b="1" dirty="0" smtClean="0">
+                    <a:solidFill>
+                      <a:schemeClr val="bg1"/>
+                    </a:solidFill>
+                  </a:rPr>
+                  <a:t>1. Healthy</a:t>
+                </a:r>
+                <a:endParaRPr lang="en-US" sz="2000" b="1" dirty="0" smtClean="0">
+                  <a:solidFill>
+                    <a:srgbClr val="FFFFFF"/>
+                  </a:solidFill>
+                </a:endParaRPr>
+              </a:p>
+            </p:txBody>
+          </p:sp>
+          <p:sp>
+            <p:nvSpPr>
+              <p:cNvPr id="13" name="TextBox 12"/>
+              <p:cNvSpPr txBox="1"/>
+              <p:nvPr/>
+            </p:nvSpPr>
+            <p:spPr>
+              <a:xfrm>
+                <a:off x="4720483" y="4515539"/>
+                <a:ext cx="2332080" cy="598381"/>
+              </a:xfrm>
+              <a:prstGeom prst="rect">
+                <a:avLst/>
+              </a:prstGeom>
+              <a:ln>
+                <a:solidFill>
+                  <a:schemeClr val="accent2"/>
+                </a:solidFill>
+              </a:ln>
+            </p:spPr>
+            <p:style>
+              <a:lnRef idx="2">
+                <a:schemeClr val="accent2">
+                  <a:shade val="50000"/>
+                </a:schemeClr>
+              </a:lnRef>
+              <a:fillRef idx="1">
+                <a:schemeClr val="accent2"/>
+              </a:fillRef>
+              <a:effectRef idx="0">
+                <a:schemeClr val="accent2"/>
+              </a:effectRef>
+              <a:fontRef idx="minor">
+                <a:schemeClr val="lt1"/>
+              </a:fontRef>
+            </p:style>
+            <p:txBody>
+              <a:bodyPr wrap="none" lIns="0" tIns="0" rIns="0" bIns="0" rtlCol="0" anchor="ctr" anchorCtr="1">
+                <a:noAutofit/>
+              </a:bodyPr>
+              <a:lstStyle/>
+              <a:p>
+                <a:r>
+                  <a:rPr lang="en-US" sz="2000" b="1" dirty="0">
+                    <a:solidFill>
+                      <a:schemeClr val="bg1"/>
+                    </a:solidFill>
+                  </a:rPr>
+                  <a:t>3</a:t>
+                </a:r>
+                <a:r>
+                  <a:rPr lang="en-US" sz="2000" b="1" dirty="0" smtClean="0">
+                    <a:solidFill>
+                      <a:schemeClr val="bg1"/>
+                    </a:solidFill>
+                  </a:rPr>
+                  <a:t>. </a:t>
+                </a:r>
+                <a:r>
+                  <a:rPr lang="en-US" sz="2000" b="1" smtClean="0">
+                    <a:solidFill>
+                      <a:schemeClr val="bg1"/>
+                    </a:solidFill>
+                  </a:rPr>
+                  <a:t>Dead</a:t>
+                </a:r>
+                <a:endParaRPr lang="en-US" sz="2000" b="1" dirty="0" smtClean="0">
+                  <a:solidFill>
+                    <a:srgbClr val="FFFFFF"/>
+                  </a:solidFill>
+                </a:endParaRPr>
+              </a:p>
+            </p:txBody>
+          </p:sp>
+          <p:sp>
+            <p:nvSpPr>
+              <p:cNvPr id="15" name="TextBox 14"/>
+              <p:cNvSpPr txBox="1"/>
+              <p:nvPr/>
+            </p:nvSpPr>
+            <p:spPr>
+              <a:xfrm>
+                <a:off x="6354373" y="2571029"/>
+                <a:ext cx="2332080" cy="598381"/>
+              </a:xfrm>
+              <a:prstGeom prst="rect">
+                <a:avLst/>
+              </a:prstGeom>
+              <a:ln>
+                <a:solidFill>
+                  <a:schemeClr val="accent2"/>
+                </a:solidFill>
+              </a:ln>
+            </p:spPr>
+            <p:style>
+              <a:lnRef idx="2">
+                <a:schemeClr val="accent2">
+                  <a:shade val="50000"/>
+                </a:schemeClr>
+              </a:lnRef>
+              <a:fillRef idx="1">
+                <a:schemeClr val="accent2"/>
+              </a:fillRef>
+              <a:effectRef idx="0">
+                <a:schemeClr val="accent2"/>
+              </a:effectRef>
+              <a:fontRef idx="minor">
+                <a:schemeClr val="lt1"/>
+              </a:fontRef>
+            </p:style>
+            <p:txBody>
+              <a:bodyPr wrap="none" lIns="0" tIns="0" rIns="0" bIns="0" rtlCol="0" anchor="ctr" anchorCtr="1">
+                <a:noAutofit/>
+              </a:bodyPr>
+              <a:lstStyle/>
+              <a:p>
+                <a:r>
+                  <a:rPr lang="en-US" sz="2000" b="1" dirty="0" smtClean="0">
+                    <a:solidFill>
+                      <a:schemeClr val="bg1"/>
+                    </a:solidFill>
+                  </a:rPr>
+                  <a:t>2. Sick</a:t>
+                </a:r>
+                <a:endParaRPr lang="en-US" sz="2000" b="1" dirty="0" smtClean="0">
+                  <a:solidFill>
+                    <a:srgbClr val="FFFFFF"/>
+                  </a:solidFill>
+                </a:endParaRPr>
+              </a:p>
+            </p:txBody>
+          </p:sp>
+          <p:cxnSp>
+            <p:nvCxnSpPr>
+              <p:cNvPr id="24" name="Straight Arrow Connector 23"/>
+              <p:cNvCxnSpPr/>
+              <p:nvPr/>
+            </p:nvCxnSpPr>
+            <p:spPr>
+              <a:xfrm>
+                <a:off x="5017211" y="2698120"/>
+                <a:ext cx="1354706" cy="0"/>
+              </a:xfrm>
+              <a:prstGeom prst="straightConnector1">
+                <a:avLst/>
+              </a:prstGeom>
+              <a:ln w="25400" cap="flat" cmpd="sng" algn="ctr">
+                <a:solidFill>
+                  <a:schemeClr val="tx1"/>
+                </a:solidFill>
+                <a:prstDash val="solid"/>
+                <a:round/>
+                <a:headEnd type="none" w="med" len="med"/>
+                <a:tailEnd type="arrow"/>
+              </a:ln>
+              <a:effectLst/>
+            </p:spPr>
+            <p:style>
+              <a:lnRef idx="2">
+                <a:schemeClr val="accent1"/>
+              </a:lnRef>
+              <a:fillRef idx="0">
+                <a:schemeClr val="accent1"/>
+              </a:fillRef>
+              <a:effectRef idx="1">
+                <a:schemeClr val="accent1"/>
+              </a:effectRef>
+              <a:fontRef idx="minor">
+                <a:schemeClr val="tx1"/>
+              </a:fontRef>
+            </p:style>
+          </p:cxnSp>
+          <p:cxnSp>
+            <p:nvCxnSpPr>
+              <p:cNvPr id="18" name="Straight Arrow Connector 17"/>
+              <p:cNvCxnSpPr/>
+              <p:nvPr/>
+            </p:nvCxnSpPr>
+            <p:spPr>
+              <a:xfrm flipH="1">
+                <a:off x="4992235" y="3045376"/>
+                <a:ext cx="1382931" cy="0"/>
+              </a:xfrm>
+              <a:prstGeom prst="straightConnector1">
+                <a:avLst/>
+              </a:prstGeom>
+              <a:ln w="25400" cap="flat" cmpd="sng" algn="ctr">
+                <a:solidFill>
+                  <a:schemeClr val="tx1"/>
+                </a:solidFill>
+                <a:prstDash val="solid"/>
+                <a:round/>
+                <a:headEnd type="none" w="med" len="med"/>
+                <a:tailEnd type="arrow"/>
+              </a:ln>
+              <a:effectLst/>
+            </p:spPr>
+            <p:style>
+              <a:lnRef idx="2">
+                <a:schemeClr val="accent1"/>
+              </a:lnRef>
+              <a:fillRef idx="0">
+                <a:schemeClr val="accent1"/>
+              </a:fillRef>
+              <a:effectRef idx="1">
+                <a:schemeClr val="accent1"/>
+              </a:effectRef>
+              <a:fontRef idx="minor">
+                <a:schemeClr val="tx1"/>
+              </a:fontRef>
+            </p:style>
+          </p:cxnSp>
+          <p:cxnSp>
+            <p:nvCxnSpPr>
+              <p:cNvPr id="25" name="Straight Arrow Connector 24"/>
+              <p:cNvCxnSpPr>
+                <a:stCxn id="15" idx="2"/>
+              </p:cNvCxnSpPr>
+              <p:nvPr/>
+            </p:nvCxnSpPr>
+            <p:spPr>
+              <a:xfrm flipH="1">
+                <a:off x="6082070" y="3169410"/>
+                <a:ext cx="1438343" cy="1317540"/>
+              </a:xfrm>
+              <a:prstGeom prst="straightConnector1">
+                <a:avLst/>
+              </a:prstGeom>
+              <a:ln w="25400" cap="flat" cmpd="sng" algn="ctr">
+                <a:solidFill>
+                  <a:schemeClr val="tx1"/>
+                </a:solidFill>
+                <a:prstDash val="solid"/>
+                <a:round/>
+                <a:headEnd type="none" w="med" len="med"/>
+                <a:tailEnd type="arrow"/>
+              </a:ln>
+              <a:effectLst/>
+            </p:spPr>
+            <p:style>
+              <a:lnRef idx="2">
+                <a:schemeClr val="accent1"/>
+              </a:lnRef>
+              <a:fillRef idx="0">
+                <a:schemeClr val="accent1"/>
+              </a:fillRef>
+              <a:effectRef idx="1">
+                <a:schemeClr val="accent1"/>
+              </a:effectRef>
+              <a:fontRef idx="minor">
+                <a:schemeClr val="tx1"/>
+              </a:fontRef>
+            </p:style>
+          </p:cxnSp>
+          <p:cxnSp>
+            <p:nvCxnSpPr>
+              <p:cNvPr id="28" name="Straight Arrow Connector 27"/>
+              <p:cNvCxnSpPr>
+                <a:stCxn id="3" idx="2"/>
+              </p:cNvCxnSpPr>
+              <p:nvPr/>
+            </p:nvCxnSpPr>
+            <p:spPr>
+              <a:xfrm>
+                <a:off x="3836353" y="3137328"/>
+                <a:ext cx="1808257" cy="1349621"/>
+              </a:xfrm>
+              <a:prstGeom prst="straightConnector1">
+                <a:avLst/>
+              </a:prstGeom>
+              <a:ln w="25400" cap="flat" cmpd="sng" algn="ctr">
+                <a:solidFill>
+                  <a:schemeClr val="tx1"/>
+                </a:solidFill>
+                <a:prstDash val="solid"/>
+                <a:round/>
+                <a:headEnd type="none" w="med" len="med"/>
+                <a:tailEnd type="arrow"/>
+              </a:ln>
+              <a:effectLst/>
+            </p:spPr>
+            <p:style>
+              <a:lnRef idx="2">
+                <a:schemeClr val="accent1"/>
+              </a:lnRef>
+              <a:fillRef idx="0">
+                <a:schemeClr val="accent1"/>
+              </a:fillRef>
+              <a:effectRef idx="1">
+                <a:schemeClr val="accent1"/>
+              </a:effectRef>
+              <a:fontRef idx="minor">
+                <a:schemeClr val="tx1"/>
+              </a:fontRef>
+            </p:style>
+          </p:cxnSp>
+        </p:grpSp>
+        <p:sp>
+          <p:nvSpPr>
+            <p:cNvPr id="43" name="TextBox 42"/>
+            <p:cNvSpPr txBox="1"/>
+            <p:nvPr/>
+          </p:nvSpPr>
+          <p:spPr>
+            <a:xfrm>
+              <a:off x="5193043" y="2370466"/>
+              <a:ext cx="564461" cy="253978"/>
+            </a:xfrm>
+            <a:prstGeom prst="rect">
+              <a:avLst/>
+            </a:prstGeom>
+            <a:noFill/>
+          </p:spPr>
+          <p:txBody>
+            <a:bodyPr wrap="square" lIns="0" tIns="0" rIns="0" bIns="0" rtlCol="0">
+              <a:noAutofit/>
+            </a:bodyPr>
+            <a:lstStyle/>
+            <a:p>
+              <a:r>
+                <a:rPr lang="en-US" sz="2000" dirty="0" smtClean="0">
+                  <a:solidFill>
+                    <a:schemeClr val="tx1"/>
+                  </a:solidFill>
+                </a:rPr>
+                <a:t>λ</a:t>
+              </a:r>
+              <a:r>
+                <a:rPr lang="en-US" sz="2000" baseline="-25000" dirty="0" smtClean="0">
+                  <a:solidFill>
+                    <a:schemeClr val="tx1"/>
+                  </a:solidFill>
+                </a:rPr>
+                <a:t>12</a:t>
+              </a:r>
+              <a:r>
+                <a:rPr lang="en-US" sz="2000" dirty="0" smtClean="0">
+                  <a:solidFill>
+                    <a:schemeClr val="tx1"/>
+                  </a:solidFill>
+                </a:rPr>
+                <a:t>(t)</a:t>
+              </a:r>
+            </a:p>
+          </p:txBody>
+        </p:sp>
+        <p:sp>
+          <p:nvSpPr>
+            <p:cNvPr id="44" name="TextBox 43"/>
+            <p:cNvSpPr txBox="1"/>
+            <p:nvPr/>
+          </p:nvSpPr>
+          <p:spPr>
+            <a:xfrm>
+              <a:off x="5161993" y="2819173"/>
+              <a:ext cx="564461" cy="253978"/>
+            </a:xfrm>
+            <a:prstGeom prst="rect">
+              <a:avLst/>
+            </a:prstGeom>
+            <a:noFill/>
+          </p:spPr>
+          <p:txBody>
+            <a:bodyPr wrap="square" lIns="0" tIns="0" rIns="0" bIns="0" rtlCol="0">
+              <a:noAutofit/>
+            </a:bodyPr>
+            <a:lstStyle/>
+            <a:p>
+              <a:r>
+                <a:rPr lang="en-US" sz="2000" dirty="0" smtClean="0">
+                  <a:solidFill>
+                    <a:schemeClr val="tx1"/>
+                  </a:solidFill>
+                </a:rPr>
+                <a:t>λ</a:t>
+              </a:r>
+              <a:r>
+                <a:rPr lang="en-US" sz="2000" baseline="-25000" dirty="0" smtClean="0"/>
+                <a:t>21</a:t>
+              </a:r>
+              <a:r>
+                <a:rPr lang="en-US" sz="2000" dirty="0" smtClean="0">
+                  <a:solidFill>
+                    <a:schemeClr val="tx1"/>
+                  </a:solidFill>
+                </a:rPr>
+                <a:t>(t)</a:t>
+              </a:r>
+            </a:p>
+          </p:txBody>
+        </p:sp>
+        <p:sp>
+          <p:nvSpPr>
+            <p:cNvPr id="45" name="TextBox 44"/>
+            <p:cNvSpPr txBox="1"/>
+            <p:nvPr/>
+          </p:nvSpPr>
+          <p:spPr>
+            <a:xfrm>
+              <a:off x="4213693" y="3902827"/>
+              <a:ext cx="564461" cy="253978"/>
+            </a:xfrm>
+            <a:prstGeom prst="rect">
+              <a:avLst/>
+            </a:prstGeom>
+            <a:noFill/>
+          </p:spPr>
+          <p:txBody>
+            <a:bodyPr wrap="square" lIns="0" tIns="0" rIns="0" bIns="0" rtlCol="0">
+              <a:noAutofit/>
+            </a:bodyPr>
+            <a:lstStyle/>
+            <a:p>
+              <a:r>
+                <a:rPr lang="en-US" sz="2000" dirty="0" smtClean="0">
+                  <a:solidFill>
+                    <a:schemeClr val="tx1"/>
+                  </a:solidFill>
+                </a:rPr>
+                <a:t>λ</a:t>
+              </a:r>
+              <a:r>
+                <a:rPr lang="en-US" sz="2000" baseline="-25000" dirty="0" smtClean="0"/>
+                <a:t>1</a:t>
+              </a:r>
+              <a:r>
+                <a:rPr lang="en-US" sz="2000" baseline="-25000" dirty="0"/>
+                <a:t>3</a:t>
+              </a:r>
+              <a:r>
+                <a:rPr lang="en-US" sz="2000" dirty="0" smtClean="0">
+                  <a:solidFill>
+                    <a:schemeClr val="tx1"/>
+                  </a:solidFill>
+                </a:rPr>
+                <a:t>(t)</a:t>
+              </a:r>
+            </a:p>
+          </p:txBody>
+        </p:sp>
+        <p:sp>
+          <p:nvSpPr>
+            <p:cNvPr id="47" name="TextBox 46"/>
+            <p:cNvSpPr txBox="1"/>
+            <p:nvPr/>
+          </p:nvSpPr>
+          <p:spPr>
+            <a:xfrm>
+              <a:off x="6440488" y="3900018"/>
+              <a:ext cx="564461" cy="253978"/>
+            </a:xfrm>
+            <a:prstGeom prst="rect">
+              <a:avLst/>
+            </a:prstGeom>
+            <a:noFill/>
+          </p:spPr>
+          <p:txBody>
+            <a:bodyPr wrap="square" lIns="0" tIns="0" rIns="0" bIns="0" rtlCol="0">
+              <a:noAutofit/>
+            </a:bodyPr>
+            <a:lstStyle/>
+            <a:p>
+              <a:r>
+                <a:rPr lang="en-US" sz="2000" dirty="0" smtClean="0">
+                  <a:solidFill>
+                    <a:schemeClr val="tx1"/>
+                  </a:solidFill>
+                </a:rPr>
+                <a:t>λ</a:t>
+              </a:r>
+              <a:r>
+                <a:rPr lang="en-US" sz="2000" baseline="-25000" dirty="0"/>
+                <a:t>2</a:t>
+              </a:r>
+              <a:r>
+                <a:rPr lang="en-US" sz="2000" baseline="-25000" dirty="0" smtClean="0"/>
+                <a:t>3</a:t>
+              </a:r>
+              <a:r>
+                <a:rPr lang="en-US" sz="2000" dirty="0" smtClean="0">
+                  <a:solidFill>
+                    <a:schemeClr val="tx1"/>
+                  </a:solidFill>
+                </a:rPr>
+                <a:t>(t)</a:t>
+              </a:r>
+            </a:p>
+          </p:txBody>
+        </p:sp>
+      </p:grpSp>
+    </p:spTree>
+    <p:extLst>
+      <p:ext uri="{BB962C8B-B14F-4D97-AF65-F5344CB8AC3E}">
+        <p14:creationId xmlns:p14="http://schemas.microsoft.com/office/powerpoint/2010/main" val="2977153368"/>
       </p:ext>
     </p:extLst>
   </p:cSld>

</xml_diff>